<commit_message>
RA2 Ch04 Initial Content
</commit_message>
<xml_diff>
--- a/doc/ref_arch/kubernetes/figures/k8s-ref-arch-figures.pptx
+++ b/doc/ref_arch/kubernetes/figures/k8s-ref-arch-figures.pptx
@@ -8,7 +8,7 @@
     <p:sldId id="1078" r:id="rId2"/>
     <p:sldId id="1079" r:id="rId3"/>
     <p:sldId id="1080" r:id="rId4"/>
-    <p:sldId id="1081" r:id="rId5"/>
+    <p:sldId id="1082" r:id="rId5"/>
   </p:sldIdLst>
   <p:sldSz cx="18291175" cy="10288588"/>
   <p:notesSz cx="6858000" cy="9144000"/>
@@ -246,7 +246,7 @@
           <a:p>
             <a:fld id="{F9D3E6FF-AC24-BE43-AFD3-27417514DD0F}" type="datetimeFigureOut">
               <a:rPr lang="en-GB" smtClean="0"/>
-              <a:t>06/11/2019</a:t>
+              <a:t>24/12/2019</a:t>
             </a:fld>
             <a:endParaRPr lang="en-GB"/>
           </a:p>
@@ -416,7 +416,7 @@
           <a:p>
             <a:fld id="{F9D3E6FF-AC24-BE43-AFD3-27417514DD0F}" type="datetimeFigureOut">
               <a:rPr lang="en-GB" smtClean="0"/>
-              <a:t>06/11/2019</a:t>
+              <a:t>24/12/2019</a:t>
             </a:fld>
             <a:endParaRPr lang="en-GB"/>
           </a:p>
@@ -596,7 +596,7 @@
           <a:p>
             <a:fld id="{F9D3E6FF-AC24-BE43-AFD3-27417514DD0F}" type="datetimeFigureOut">
               <a:rPr lang="en-GB" smtClean="0"/>
-              <a:t>06/11/2019</a:t>
+              <a:t>24/12/2019</a:t>
             </a:fld>
             <a:endParaRPr lang="en-GB"/>
           </a:p>
@@ -766,7 +766,7 @@
           <a:p>
             <a:fld id="{F9D3E6FF-AC24-BE43-AFD3-27417514DD0F}" type="datetimeFigureOut">
               <a:rPr lang="en-GB" smtClean="0"/>
-              <a:t>06/11/2019</a:t>
+              <a:t>24/12/2019</a:t>
             </a:fld>
             <a:endParaRPr lang="en-GB"/>
           </a:p>
@@ -1012,7 +1012,7 @@
           <a:p>
             <a:fld id="{F9D3E6FF-AC24-BE43-AFD3-27417514DD0F}" type="datetimeFigureOut">
               <a:rPr lang="en-GB" smtClean="0"/>
-              <a:t>06/11/2019</a:t>
+              <a:t>24/12/2019</a:t>
             </a:fld>
             <a:endParaRPr lang="en-GB"/>
           </a:p>
@@ -1244,7 +1244,7 @@
           <a:p>
             <a:fld id="{F9D3E6FF-AC24-BE43-AFD3-27417514DD0F}" type="datetimeFigureOut">
               <a:rPr lang="en-GB" smtClean="0"/>
-              <a:t>06/11/2019</a:t>
+              <a:t>24/12/2019</a:t>
             </a:fld>
             <a:endParaRPr lang="en-GB"/>
           </a:p>
@@ -1611,7 +1611,7 @@
           <a:p>
             <a:fld id="{F9D3E6FF-AC24-BE43-AFD3-27417514DD0F}" type="datetimeFigureOut">
               <a:rPr lang="en-GB" smtClean="0"/>
-              <a:t>06/11/2019</a:t>
+              <a:t>24/12/2019</a:t>
             </a:fld>
             <a:endParaRPr lang="en-GB"/>
           </a:p>
@@ -1729,7 +1729,7 @@
           <a:p>
             <a:fld id="{F9D3E6FF-AC24-BE43-AFD3-27417514DD0F}" type="datetimeFigureOut">
               <a:rPr lang="en-GB" smtClean="0"/>
-              <a:t>06/11/2019</a:t>
+              <a:t>24/12/2019</a:t>
             </a:fld>
             <a:endParaRPr lang="en-GB"/>
           </a:p>
@@ -1824,7 +1824,7 @@
           <a:p>
             <a:fld id="{F9D3E6FF-AC24-BE43-AFD3-27417514DD0F}" type="datetimeFigureOut">
               <a:rPr lang="en-GB" smtClean="0"/>
-              <a:t>06/11/2019</a:t>
+              <a:t>24/12/2019</a:t>
             </a:fld>
             <a:endParaRPr lang="en-GB"/>
           </a:p>
@@ -2101,7 +2101,7 @@
           <a:p>
             <a:fld id="{F9D3E6FF-AC24-BE43-AFD3-27417514DD0F}" type="datetimeFigureOut">
               <a:rPr lang="en-GB" smtClean="0"/>
-              <a:t>06/11/2019</a:t>
+              <a:t>24/12/2019</a:t>
             </a:fld>
             <a:endParaRPr lang="en-GB"/>
           </a:p>
@@ -2358,7 +2358,7 @@
           <a:p>
             <a:fld id="{F9D3E6FF-AC24-BE43-AFD3-27417514DD0F}" type="datetimeFigureOut">
               <a:rPr lang="en-GB" smtClean="0"/>
-              <a:t>06/11/2019</a:t>
+              <a:t>24/12/2019</a:t>
             </a:fld>
             <a:endParaRPr lang="en-GB"/>
           </a:p>
@@ -2571,7 +2571,7 @@
           <a:p>
             <a:fld id="{F9D3E6FF-AC24-BE43-AFD3-27417514DD0F}" type="datetimeFigureOut">
               <a:rPr lang="en-GB" smtClean="0"/>
-              <a:t>06/11/2019</a:t>
+              <a:t>24/12/2019</a:t>
             </a:fld>
             <a:endParaRPr lang="en-GB"/>
           </a:p>
@@ -21012,14 +21012,6 @@
 <file path=ppt/slides/slide4.xml><?xml version="1.0" encoding="utf-8"?>
 <p:sld xmlns:a="http://schemas.openxmlformats.org/drawingml/2006/main" xmlns:r="http://schemas.openxmlformats.org/officeDocument/2006/relationships" xmlns:p="http://schemas.openxmlformats.org/presentationml/2006/main">
   <p:cSld>
-    <p:bg>
-      <p:bgPr>
-        <a:solidFill>
-          <a:schemeClr val="bg1"/>
-        </a:solidFill>
-        <a:effectLst/>
-      </p:bgPr>
-    </p:bg>
     <p:spTree>
       <p:nvGrpSpPr>
         <p:cNvPr id="1" name=""/>
@@ -21034,10 +21026,1642 @@
           <a:chExt cx="0" cy="0"/>
         </a:xfrm>
       </p:grpSpPr>
+      <p:sp>
+        <p:nvSpPr>
+          <p:cNvPr id="78" name="Rectangle 77">
+            <a:extLst>
+              <a:ext uri="{FF2B5EF4-FFF2-40B4-BE49-F238E27FC236}">
+                <a16:creationId xmlns:a16="http://schemas.microsoft.com/office/drawing/2014/main" id="{D9C614FE-6ACF-AB4D-A41F-F86E774F5CDB}"/>
+              </a:ext>
+            </a:extLst>
+          </p:cNvPr>
+          <p:cNvSpPr/>
+          <p:nvPr/>
+        </p:nvSpPr>
+        <p:spPr>
+          <a:xfrm>
+            <a:off x="1058780" y="2486526"/>
+            <a:ext cx="15399494" cy="5325979"/>
+          </a:xfrm>
+          <a:prstGeom prst="rect">
+            <a:avLst/>
+          </a:prstGeom>
+          <a:solidFill>
+            <a:schemeClr val="bg1"/>
+          </a:solidFill>
+          <a:ln w="9525" cap="flat" cmpd="sng" algn="ctr">
+            <a:noFill/>
+            <a:prstDash val="solid"/>
+            <a:round/>
+            <a:headEnd type="none" w="med" len="med"/>
+            <a:tailEnd type="none" w="med" len="med"/>
+          </a:ln>
+        </p:spPr>
+        <p:style>
+          <a:lnRef idx="0">
+            <a:scrgbClr r="0" g="0" b="0"/>
+          </a:lnRef>
+          <a:fillRef idx="0">
+            <a:scrgbClr r="0" g="0" b="0"/>
+          </a:fillRef>
+          <a:effectRef idx="0">
+            <a:scrgbClr r="0" g="0" b="0"/>
+          </a:effectRef>
+          <a:fontRef idx="minor">
+            <a:schemeClr val="dk1"/>
+          </a:fontRef>
+        </p:style>
+        <p:txBody>
+          <a:bodyPr rtlCol="0" anchor="ctr"/>
+          <a:lstStyle/>
+          <a:p>
+            <a:pPr algn="ctr"/>
+            <a:endParaRPr lang="en-GB" dirty="0"/>
+          </a:p>
+          <a:p>
+            <a:pPr algn="ctr"/>
+            <a:endParaRPr lang="en-GB" dirty="0"/>
+          </a:p>
+        </p:txBody>
+      </p:sp>
+      <p:sp>
+        <p:nvSpPr>
+          <p:cNvPr id="32" name="Rectangle 31">
+            <a:extLst>
+              <a:ext uri="{FF2B5EF4-FFF2-40B4-BE49-F238E27FC236}">
+                <a16:creationId xmlns:a16="http://schemas.microsoft.com/office/drawing/2014/main" id="{6E7A253D-4A85-464F-B905-16EC21F2DF56}"/>
+              </a:ext>
+            </a:extLst>
+          </p:cNvPr>
+          <p:cNvSpPr/>
+          <p:nvPr/>
+        </p:nvSpPr>
+        <p:spPr>
+          <a:xfrm>
+            <a:off x="1694358" y="6715080"/>
+            <a:ext cx="8945648" cy="914400"/>
+          </a:xfrm>
+          <a:prstGeom prst="rect">
+            <a:avLst/>
+          </a:prstGeom>
+          <a:noFill/>
+          <a:ln w="9525" cap="flat" cmpd="sng" algn="ctr">
+            <a:solidFill>
+              <a:schemeClr val="dk1"/>
+            </a:solidFill>
+            <a:prstDash val="solid"/>
+            <a:round/>
+            <a:headEnd type="none" w="med" len="med"/>
+            <a:tailEnd type="none" w="med" len="med"/>
+          </a:ln>
+        </p:spPr>
+        <p:style>
+          <a:lnRef idx="0">
+            <a:scrgbClr r="0" g="0" b="0"/>
+          </a:lnRef>
+          <a:fillRef idx="0">
+            <a:scrgbClr r="0" g="0" b="0"/>
+          </a:fillRef>
+          <a:effectRef idx="0">
+            <a:scrgbClr r="0" g="0" b="0"/>
+          </a:effectRef>
+          <a:fontRef idx="minor">
+            <a:schemeClr val="dk1"/>
+          </a:fontRef>
+        </p:style>
+        <p:txBody>
+          <a:bodyPr rtlCol="0" anchor="ctr"/>
+          <a:lstStyle/>
+          <a:p>
+            <a:pPr algn="ctr"/>
+            <a:r>
+              <a:rPr lang="en-GB" dirty="0"/>
+              <a:t>Physical / virtual compute, storage and network infrastructure</a:t>
+            </a:r>
+          </a:p>
+          <a:p>
+            <a:pPr algn="ctr"/>
+            <a:r>
+              <a:rPr lang="en-GB" dirty="0"/>
+              <a:t>(aligns with NFVI)</a:t>
+            </a:r>
+          </a:p>
+        </p:txBody>
+      </p:sp>
+      <p:sp>
+        <p:nvSpPr>
+          <p:cNvPr id="33" name="Rectangle 32">
+            <a:extLst>
+              <a:ext uri="{FF2B5EF4-FFF2-40B4-BE49-F238E27FC236}">
+                <a16:creationId xmlns:a16="http://schemas.microsoft.com/office/drawing/2014/main" id="{4B378146-B2AF-084B-92D5-0BAB60F8EC08}"/>
+              </a:ext>
+            </a:extLst>
+          </p:cNvPr>
+          <p:cNvSpPr/>
+          <p:nvPr/>
+        </p:nvSpPr>
+        <p:spPr>
+          <a:xfrm>
+            <a:off x="12945865" y="6715080"/>
+            <a:ext cx="3405447" cy="914400"/>
+          </a:xfrm>
+          <a:prstGeom prst="rect">
+            <a:avLst/>
+          </a:prstGeom>
+          <a:noFill/>
+          <a:ln w="9525" cap="flat" cmpd="sng" algn="ctr">
+            <a:solidFill>
+              <a:schemeClr val="dk1"/>
+            </a:solidFill>
+            <a:prstDash val="solid"/>
+            <a:round/>
+            <a:headEnd type="none" w="med" len="med"/>
+            <a:tailEnd type="none" w="med" len="med"/>
+          </a:ln>
+        </p:spPr>
+        <p:style>
+          <a:lnRef idx="0">
+            <a:scrgbClr r="0" g="0" b="0"/>
+          </a:lnRef>
+          <a:fillRef idx="0">
+            <a:scrgbClr r="0" g="0" b="0"/>
+          </a:fillRef>
+          <a:effectRef idx="0">
+            <a:scrgbClr r="0" g="0" b="0"/>
+          </a:effectRef>
+          <a:fontRef idx="minor">
+            <a:schemeClr val="dk1"/>
+          </a:fontRef>
+        </p:style>
+        <p:txBody>
+          <a:bodyPr rtlCol="0" anchor="ctr"/>
+          <a:lstStyle/>
+          <a:p>
+            <a:pPr algn="ctr"/>
+            <a:r>
+              <a:rPr lang="en-GB" dirty="0"/>
+              <a:t>Virtual or physical infrastructure management (largely aligns with VIM)</a:t>
+            </a:r>
+          </a:p>
+        </p:txBody>
+      </p:sp>
+      <p:sp>
+        <p:nvSpPr>
+          <p:cNvPr id="34" name="Rectangle 33">
+            <a:extLst>
+              <a:ext uri="{FF2B5EF4-FFF2-40B4-BE49-F238E27FC236}">
+                <a16:creationId xmlns:a16="http://schemas.microsoft.com/office/drawing/2014/main" id="{AAF9E94A-0E99-3740-A02A-354410EACFBD}"/>
+              </a:ext>
+            </a:extLst>
+          </p:cNvPr>
+          <p:cNvSpPr/>
+          <p:nvPr/>
+        </p:nvSpPr>
+        <p:spPr>
+          <a:xfrm>
+            <a:off x="1694358" y="2774616"/>
+            <a:ext cx="4380808" cy="3455556"/>
+          </a:xfrm>
+          <a:prstGeom prst="rect">
+            <a:avLst/>
+          </a:prstGeom>
+          <a:noFill/>
+          <a:ln w="9525" cap="flat" cmpd="sng" algn="ctr">
+            <a:solidFill>
+              <a:schemeClr val="dk1"/>
+            </a:solidFill>
+            <a:prstDash val="solid"/>
+            <a:round/>
+            <a:headEnd type="none" w="med" len="med"/>
+            <a:tailEnd type="none" w="med" len="med"/>
+          </a:ln>
+        </p:spPr>
+        <p:style>
+          <a:lnRef idx="0">
+            <a:scrgbClr r="0" g="0" b="0"/>
+          </a:lnRef>
+          <a:fillRef idx="0">
+            <a:scrgbClr r="0" g="0" b="0"/>
+          </a:fillRef>
+          <a:effectRef idx="0">
+            <a:scrgbClr r="0" g="0" b="0"/>
+          </a:effectRef>
+          <a:fontRef idx="minor">
+            <a:schemeClr val="dk1"/>
+          </a:fontRef>
+        </p:style>
+        <p:txBody>
+          <a:bodyPr rtlCol="0" anchor="b"/>
+          <a:lstStyle/>
+          <a:p>
+            <a:pPr algn="ctr"/>
+            <a:r>
+              <a:rPr lang="en-GB" dirty="0"/>
+              <a:t>Kubernetes Worker Node Machine (Virtual / Physical)</a:t>
+            </a:r>
+          </a:p>
+        </p:txBody>
+      </p:sp>
+      <p:sp>
+        <p:nvSpPr>
+          <p:cNvPr id="35" name="Rectangle 34">
+            <a:extLst>
+              <a:ext uri="{FF2B5EF4-FFF2-40B4-BE49-F238E27FC236}">
+                <a16:creationId xmlns:a16="http://schemas.microsoft.com/office/drawing/2014/main" id="{60300595-D079-434E-A111-D81143C98E0D}"/>
+              </a:ext>
+            </a:extLst>
+          </p:cNvPr>
+          <p:cNvSpPr/>
+          <p:nvPr/>
+        </p:nvSpPr>
+        <p:spPr>
+          <a:xfrm>
+            <a:off x="2071199" y="3131010"/>
+            <a:ext cx="3535682" cy="1833598"/>
+          </a:xfrm>
+          <a:prstGeom prst="rect">
+            <a:avLst/>
+          </a:prstGeom>
+          <a:noFill/>
+          <a:ln w="9525" cap="flat" cmpd="sng" algn="ctr">
+            <a:solidFill>
+              <a:schemeClr val="dk1"/>
+            </a:solidFill>
+            <a:prstDash val="solid"/>
+            <a:round/>
+            <a:headEnd type="none" w="med" len="med"/>
+            <a:tailEnd type="none" w="med" len="med"/>
+          </a:ln>
+        </p:spPr>
+        <p:style>
+          <a:lnRef idx="0">
+            <a:scrgbClr r="0" g="0" b="0"/>
+          </a:lnRef>
+          <a:fillRef idx="0">
+            <a:scrgbClr r="0" g="0" b="0"/>
+          </a:fillRef>
+          <a:effectRef idx="0">
+            <a:scrgbClr r="0" g="0" b="0"/>
+          </a:effectRef>
+          <a:fontRef idx="minor">
+            <a:schemeClr val="dk1"/>
+          </a:fontRef>
+        </p:style>
+        <p:txBody>
+          <a:bodyPr rtlCol="0" anchor="b"/>
+          <a:lstStyle/>
+          <a:p>
+            <a:pPr algn="ctr"/>
+            <a:r>
+              <a:rPr lang="en-GB" dirty="0"/>
+              <a:t>Kubernetes Container Runtime</a:t>
+            </a:r>
+          </a:p>
+        </p:txBody>
+      </p:sp>
+      <p:sp>
+        <p:nvSpPr>
+          <p:cNvPr id="36" name="Rectangle 35">
+            <a:extLst>
+              <a:ext uri="{FF2B5EF4-FFF2-40B4-BE49-F238E27FC236}">
+                <a16:creationId xmlns:a16="http://schemas.microsoft.com/office/drawing/2014/main" id="{3CE31C79-4CAE-9349-8ABE-86721D12C39F}"/>
+              </a:ext>
+            </a:extLst>
+          </p:cNvPr>
+          <p:cNvSpPr/>
+          <p:nvPr/>
+        </p:nvSpPr>
+        <p:spPr>
+          <a:xfrm>
+            <a:off x="1832902" y="2952416"/>
+            <a:ext cx="4012277" cy="2499130"/>
+          </a:xfrm>
+          <a:prstGeom prst="rect">
+            <a:avLst/>
+          </a:prstGeom>
+          <a:noFill/>
+          <a:ln w="9525" cap="flat" cmpd="sng" algn="ctr">
+            <a:solidFill>
+              <a:schemeClr val="dk1"/>
+            </a:solidFill>
+            <a:prstDash val="solid"/>
+            <a:round/>
+            <a:headEnd type="none" w="med" len="med"/>
+            <a:tailEnd type="none" w="med" len="med"/>
+          </a:ln>
+        </p:spPr>
+        <p:style>
+          <a:lnRef idx="0">
+            <a:scrgbClr r="0" g="0" b="0"/>
+          </a:lnRef>
+          <a:fillRef idx="0">
+            <a:scrgbClr r="0" g="0" b="0"/>
+          </a:fillRef>
+          <a:effectRef idx="0">
+            <a:scrgbClr r="0" g="0" b="0"/>
+          </a:effectRef>
+          <a:fontRef idx="minor">
+            <a:schemeClr val="dk1"/>
+          </a:fontRef>
+        </p:style>
+        <p:txBody>
+          <a:bodyPr rtlCol="0" anchor="b"/>
+          <a:lstStyle/>
+          <a:p>
+            <a:pPr algn="ctr"/>
+            <a:r>
+              <a:rPr lang="en-GB" dirty="0"/>
+              <a:t>Kubernetes Worker Node OS</a:t>
+            </a:r>
+          </a:p>
+        </p:txBody>
+      </p:sp>
+      <p:sp>
+        <p:nvSpPr>
+          <p:cNvPr id="37" name="Rectangle 36">
+            <a:extLst>
+              <a:ext uri="{FF2B5EF4-FFF2-40B4-BE49-F238E27FC236}">
+                <a16:creationId xmlns:a16="http://schemas.microsoft.com/office/drawing/2014/main" id="{D298B356-0DC9-EF41-83BC-4AC205613C75}"/>
+              </a:ext>
+            </a:extLst>
+          </p:cNvPr>
+          <p:cNvSpPr/>
+          <p:nvPr/>
+        </p:nvSpPr>
+        <p:spPr>
+          <a:xfrm>
+            <a:off x="2335018" y="3624128"/>
+            <a:ext cx="3099487" cy="752404"/>
+          </a:xfrm>
+          <a:prstGeom prst="rect">
+            <a:avLst/>
+          </a:prstGeom>
+          <a:noFill/>
+          <a:ln w="9525" cap="flat" cmpd="sng" algn="ctr">
+            <a:solidFill>
+              <a:schemeClr val="dk1"/>
+            </a:solidFill>
+            <a:prstDash val="solid"/>
+            <a:round/>
+            <a:headEnd type="none" w="med" len="med"/>
+            <a:tailEnd type="none" w="med" len="med"/>
+          </a:ln>
+        </p:spPr>
+        <p:style>
+          <a:lnRef idx="0">
+            <a:scrgbClr r="0" g="0" b="0"/>
+          </a:lnRef>
+          <a:fillRef idx="0">
+            <a:scrgbClr r="0" g="0" b="0"/>
+          </a:fillRef>
+          <a:effectRef idx="0">
+            <a:scrgbClr r="0" g="0" b="0"/>
+          </a:effectRef>
+          <a:fontRef idx="minor">
+            <a:schemeClr val="dk1"/>
+          </a:fontRef>
+        </p:style>
+        <p:txBody>
+          <a:bodyPr rtlCol="0" anchor="ctr"/>
+          <a:lstStyle/>
+          <a:p>
+            <a:pPr algn="ctr"/>
+            <a:r>
+              <a:rPr lang="en-GB" dirty="0"/>
+              <a:t>Kubernetes Worker Node Services (</a:t>
+            </a:r>
+            <a:r>
+              <a:rPr lang="en-GB" dirty="0" err="1"/>
+              <a:t>kubelet</a:t>
+            </a:r>
+            <a:r>
+              <a:rPr lang="en-GB" dirty="0"/>
+              <a:t>, </a:t>
+            </a:r>
+            <a:r>
+              <a:rPr lang="en-GB" dirty="0" err="1"/>
+              <a:t>kube</a:t>
+            </a:r>
+            <a:r>
+              <a:rPr lang="en-GB" dirty="0"/>
+              <a:t>-proxy)</a:t>
+            </a:r>
+          </a:p>
+        </p:txBody>
+      </p:sp>
+      <p:sp>
+        <p:nvSpPr>
+          <p:cNvPr id="38" name="Rectangle 37">
+            <a:extLst>
+              <a:ext uri="{FF2B5EF4-FFF2-40B4-BE49-F238E27FC236}">
+                <a16:creationId xmlns:a16="http://schemas.microsoft.com/office/drawing/2014/main" id="{5D2763BD-4157-9143-8B44-26B725491EC8}"/>
+              </a:ext>
+            </a:extLst>
+          </p:cNvPr>
+          <p:cNvSpPr/>
+          <p:nvPr/>
+        </p:nvSpPr>
+        <p:spPr>
+          <a:xfrm>
+            <a:off x="6259198" y="2774616"/>
+            <a:ext cx="4380808" cy="3455555"/>
+          </a:xfrm>
+          <a:prstGeom prst="rect">
+            <a:avLst/>
+          </a:prstGeom>
+          <a:noFill/>
+          <a:ln w="9525" cap="flat" cmpd="sng" algn="ctr">
+            <a:solidFill>
+              <a:schemeClr val="dk1"/>
+            </a:solidFill>
+            <a:prstDash val="solid"/>
+            <a:round/>
+            <a:headEnd type="none" w="med" len="med"/>
+            <a:tailEnd type="none" w="med" len="med"/>
+          </a:ln>
+        </p:spPr>
+        <p:style>
+          <a:lnRef idx="0">
+            <a:scrgbClr r="0" g="0" b="0"/>
+          </a:lnRef>
+          <a:fillRef idx="0">
+            <a:scrgbClr r="0" g="0" b="0"/>
+          </a:fillRef>
+          <a:effectRef idx="0">
+            <a:scrgbClr r="0" g="0" b="0"/>
+          </a:effectRef>
+          <a:fontRef idx="minor">
+            <a:schemeClr val="dk1"/>
+          </a:fontRef>
+        </p:style>
+        <p:txBody>
+          <a:bodyPr rtlCol="0" anchor="b"/>
+          <a:lstStyle/>
+          <a:p>
+            <a:pPr algn="ctr"/>
+            <a:r>
+              <a:rPr lang="en-GB" dirty="0"/>
+              <a:t>Kubernetes Master Machine (Virtual / Physical)</a:t>
+            </a:r>
+          </a:p>
+        </p:txBody>
+      </p:sp>
+      <p:sp>
+        <p:nvSpPr>
+          <p:cNvPr id="39" name="Rectangle 38">
+            <a:extLst>
+              <a:ext uri="{FF2B5EF4-FFF2-40B4-BE49-F238E27FC236}">
+                <a16:creationId xmlns:a16="http://schemas.microsoft.com/office/drawing/2014/main" id="{3587EFFE-1AE8-E24D-B1BB-B0BF979CA98D}"/>
+              </a:ext>
+            </a:extLst>
+          </p:cNvPr>
+          <p:cNvSpPr/>
+          <p:nvPr/>
+        </p:nvSpPr>
+        <p:spPr>
+          <a:xfrm>
+            <a:off x="6636039" y="3131010"/>
+            <a:ext cx="3535682" cy="1833597"/>
+          </a:xfrm>
+          <a:prstGeom prst="rect">
+            <a:avLst/>
+          </a:prstGeom>
+          <a:noFill/>
+          <a:ln w="9525" cap="flat" cmpd="sng" algn="ctr">
+            <a:solidFill>
+              <a:schemeClr val="dk1"/>
+            </a:solidFill>
+            <a:prstDash val="solid"/>
+            <a:round/>
+            <a:headEnd type="none" w="med" len="med"/>
+            <a:tailEnd type="none" w="med" len="med"/>
+          </a:ln>
+        </p:spPr>
+        <p:style>
+          <a:lnRef idx="0">
+            <a:scrgbClr r="0" g="0" b="0"/>
+          </a:lnRef>
+          <a:fillRef idx="0">
+            <a:scrgbClr r="0" g="0" b="0"/>
+          </a:fillRef>
+          <a:effectRef idx="0">
+            <a:scrgbClr r="0" g="0" b="0"/>
+          </a:effectRef>
+          <a:fontRef idx="minor">
+            <a:schemeClr val="dk1"/>
+          </a:fontRef>
+        </p:style>
+        <p:txBody>
+          <a:bodyPr rtlCol="0" anchor="b"/>
+          <a:lstStyle/>
+          <a:p>
+            <a:pPr algn="ctr"/>
+            <a:r>
+              <a:rPr lang="en-GB" dirty="0"/>
+              <a:t>Kubernetes Container Runtime</a:t>
+            </a:r>
+          </a:p>
+        </p:txBody>
+      </p:sp>
+      <p:sp>
+        <p:nvSpPr>
+          <p:cNvPr id="40" name="Rectangle 39">
+            <a:extLst>
+              <a:ext uri="{FF2B5EF4-FFF2-40B4-BE49-F238E27FC236}">
+                <a16:creationId xmlns:a16="http://schemas.microsoft.com/office/drawing/2014/main" id="{AC59748E-B39C-1641-BDC9-EE95F84ECF51}"/>
+              </a:ext>
+            </a:extLst>
+          </p:cNvPr>
+          <p:cNvSpPr/>
+          <p:nvPr/>
+        </p:nvSpPr>
+        <p:spPr>
+          <a:xfrm>
+            <a:off x="6397742" y="2952416"/>
+            <a:ext cx="4012277" cy="2499129"/>
+          </a:xfrm>
+          <a:prstGeom prst="rect">
+            <a:avLst/>
+          </a:prstGeom>
+          <a:noFill/>
+          <a:ln w="9525" cap="flat" cmpd="sng" algn="ctr">
+            <a:solidFill>
+              <a:schemeClr val="dk1"/>
+            </a:solidFill>
+            <a:prstDash val="solid"/>
+            <a:round/>
+            <a:headEnd type="none" w="med" len="med"/>
+            <a:tailEnd type="none" w="med" len="med"/>
+          </a:ln>
+        </p:spPr>
+        <p:style>
+          <a:lnRef idx="0">
+            <a:scrgbClr r="0" g="0" b="0"/>
+          </a:lnRef>
+          <a:fillRef idx="0">
+            <a:scrgbClr r="0" g="0" b="0"/>
+          </a:fillRef>
+          <a:effectRef idx="0">
+            <a:scrgbClr r="0" g="0" b="0"/>
+          </a:effectRef>
+          <a:fontRef idx="minor">
+            <a:schemeClr val="dk1"/>
+          </a:fontRef>
+        </p:style>
+        <p:txBody>
+          <a:bodyPr rtlCol="0" anchor="b"/>
+          <a:lstStyle/>
+          <a:p>
+            <a:pPr algn="ctr"/>
+            <a:r>
+              <a:rPr lang="en-GB" dirty="0"/>
+              <a:t>Kubernetes Master OS</a:t>
+            </a:r>
+          </a:p>
+        </p:txBody>
+      </p:sp>
+      <p:sp>
+        <p:nvSpPr>
+          <p:cNvPr id="41" name="Rectangle 40">
+            <a:extLst>
+              <a:ext uri="{FF2B5EF4-FFF2-40B4-BE49-F238E27FC236}">
+                <a16:creationId xmlns:a16="http://schemas.microsoft.com/office/drawing/2014/main" id="{86D34685-1305-4249-9DF2-ECBA5FBC099E}"/>
+              </a:ext>
+            </a:extLst>
+          </p:cNvPr>
+          <p:cNvSpPr/>
+          <p:nvPr/>
+        </p:nvSpPr>
+        <p:spPr>
+          <a:xfrm>
+            <a:off x="6737874" y="3309041"/>
+            <a:ext cx="2113045" cy="1078475"/>
+          </a:xfrm>
+          <a:prstGeom prst="rect">
+            <a:avLst/>
+          </a:prstGeom>
+          <a:noFill/>
+          <a:ln w="9525" cap="flat" cmpd="sng" algn="ctr">
+            <a:solidFill>
+              <a:schemeClr val="dk1"/>
+            </a:solidFill>
+            <a:prstDash val="solid"/>
+            <a:round/>
+            <a:headEnd type="none" w="med" len="med"/>
+            <a:tailEnd type="none" w="med" len="med"/>
+          </a:ln>
+        </p:spPr>
+        <p:style>
+          <a:lnRef idx="0">
+            <a:scrgbClr r="0" g="0" b="0"/>
+          </a:lnRef>
+          <a:fillRef idx="0">
+            <a:scrgbClr r="0" g="0" b="0"/>
+          </a:fillRef>
+          <a:effectRef idx="0">
+            <a:scrgbClr r="0" g="0" b="0"/>
+          </a:effectRef>
+          <a:fontRef idx="minor">
+            <a:schemeClr val="dk1"/>
+          </a:fontRef>
+        </p:style>
+        <p:txBody>
+          <a:bodyPr rtlCol="0" anchor="ctr"/>
+          <a:lstStyle/>
+          <a:p>
+            <a:pPr algn="ctr"/>
+            <a:r>
+              <a:rPr lang="en-GB" sz="1400" dirty="0"/>
+              <a:t>Kubernetes Master Node Services (</a:t>
+            </a:r>
+            <a:r>
+              <a:rPr lang="en-GB" sz="1400" dirty="0" err="1"/>
+              <a:t>kube-apiserver</a:t>
+            </a:r>
+            <a:r>
+              <a:rPr lang="en-GB" sz="1400" dirty="0"/>
+              <a:t>, controller-managers, DNS, CNI, etc.)</a:t>
+            </a:r>
+          </a:p>
+        </p:txBody>
+      </p:sp>
+      <p:sp>
+        <p:nvSpPr>
+          <p:cNvPr id="42" name="Rectangle 41">
+            <a:extLst>
+              <a:ext uri="{FF2B5EF4-FFF2-40B4-BE49-F238E27FC236}">
+                <a16:creationId xmlns:a16="http://schemas.microsoft.com/office/drawing/2014/main" id="{D9AE07BC-203E-2348-BC31-6DBFFA06BBAC}"/>
+              </a:ext>
+            </a:extLst>
+          </p:cNvPr>
+          <p:cNvSpPr/>
+          <p:nvPr/>
+        </p:nvSpPr>
+        <p:spPr>
+          <a:xfrm>
+            <a:off x="8850919" y="3309041"/>
+            <a:ext cx="1227056" cy="1078475"/>
+          </a:xfrm>
+          <a:prstGeom prst="rect">
+            <a:avLst/>
+          </a:prstGeom>
+          <a:noFill/>
+          <a:ln w="9525" cap="flat" cmpd="sng" algn="ctr">
+            <a:solidFill>
+              <a:schemeClr val="dk1"/>
+            </a:solidFill>
+            <a:prstDash val="solid"/>
+            <a:round/>
+            <a:headEnd type="none" w="med" len="med"/>
+            <a:tailEnd type="none" w="med" len="med"/>
+          </a:ln>
+        </p:spPr>
+        <p:style>
+          <a:lnRef idx="0">
+            <a:scrgbClr r="0" g="0" b="0"/>
+          </a:lnRef>
+          <a:fillRef idx="0">
+            <a:scrgbClr r="0" g="0" b="0"/>
+          </a:fillRef>
+          <a:effectRef idx="0">
+            <a:scrgbClr r="0" g="0" b="0"/>
+          </a:effectRef>
+          <a:fontRef idx="minor">
+            <a:schemeClr val="dk1"/>
+          </a:fontRef>
+        </p:style>
+        <p:txBody>
+          <a:bodyPr rtlCol="0" anchor="ctr"/>
+          <a:lstStyle/>
+          <a:p>
+            <a:pPr algn="ctr"/>
+            <a:r>
+              <a:rPr lang="en-GB" sz="1400" dirty="0"/>
+              <a:t>Kubernetes configuration store (</a:t>
+            </a:r>
+            <a:r>
+              <a:rPr lang="en-GB" sz="1400" dirty="0" err="1"/>
+              <a:t>etcd</a:t>
+            </a:r>
+            <a:r>
+              <a:rPr lang="en-GB" sz="1400" dirty="0"/>
+              <a:t>)</a:t>
+            </a:r>
+          </a:p>
+        </p:txBody>
+      </p:sp>
+      <p:sp>
+        <p:nvSpPr>
+          <p:cNvPr id="46" name="Rectangle 45">
+            <a:extLst>
+              <a:ext uri="{FF2B5EF4-FFF2-40B4-BE49-F238E27FC236}">
+                <a16:creationId xmlns:a16="http://schemas.microsoft.com/office/drawing/2014/main" id="{A3470AC4-8931-0648-A630-2C532630B13B}"/>
+              </a:ext>
+            </a:extLst>
+          </p:cNvPr>
+          <p:cNvSpPr/>
+          <p:nvPr/>
+        </p:nvSpPr>
+        <p:spPr>
+          <a:xfrm>
+            <a:off x="12945845" y="4075901"/>
+            <a:ext cx="3405447" cy="914400"/>
+          </a:xfrm>
+          <a:prstGeom prst="rect">
+            <a:avLst/>
+          </a:prstGeom>
+          <a:noFill/>
+          <a:ln w="9525" cap="flat" cmpd="sng" algn="ctr">
+            <a:solidFill>
+              <a:schemeClr val="bg2">
+                <a:lumMod val="75000"/>
+              </a:schemeClr>
+            </a:solidFill>
+            <a:prstDash val="solid"/>
+            <a:round/>
+            <a:headEnd type="none" w="med" len="med"/>
+            <a:tailEnd type="none" w="med" len="med"/>
+          </a:ln>
+        </p:spPr>
+        <p:style>
+          <a:lnRef idx="0">
+            <a:scrgbClr r="0" g="0" b="0"/>
+          </a:lnRef>
+          <a:fillRef idx="0">
+            <a:scrgbClr r="0" g="0" b="0"/>
+          </a:fillRef>
+          <a:effectRef idx="0">
+            <a:scrgbClr r="0" g="0" b="0"/>
+          </a:effectRef>
+          <a:fontRef idx="minor">
+            <a:schemeClr val="dk1"/>
+          </a:fontRef>
+        </p:style>
+        <p:txBody>
+          <a:bodyPr rtlCol="0" anchor="ctr"/>
+          <a:lstStyle/>
+          <a:p>
+            <a:pPr algn="ctr"/>
+            <a:r>
+              <a:rPr lang="en-GB" dirty="0">
+                <a:solidFill>
+                  <a:schemeClr val="bg2">
+                    <a:lumMod val="75000"/>
+                  </a:schemeClr>
+                </a:solidFill>
+              </a:rPr>
+              <a:t>Kubernetes cluster lifecycle management (e.g. create, update, upgrade, delete)</a:t>
+            </a:r>
+          </a:p>
+        </p:txBody>
+      </p:sp>
+      <p:sp>
+        <p:nvSpPr>
+          <p:cNvPr id="47" name="Rectangle 46">
+            <a:extLst>
+              <a:ext uri="{FF2B5EF4-FFF2-40B4-BE49-F238E27FC236}">
+                <a16:creationId xmlns:a16="http://schemas.microsoft.com/office/drawing/2014/main" id="{9B506133-9556-F943-ACA9-DBED386D82A0}"/>
+              </a:ext>
+            </a:extLst>
+          </p:cNvPr>
+          <p:cNvSpPr/>
+          <p:nvPr/>
+        </p:nvSpPr>
+        <p:spPr>
+          <a:xfrm rot="16200000">
+            <a:off x="4273614" y="-375448"/>
+            <a:ext cx="3696624" cy="9817099"/>
+          </a:xfrm>
+          <a:prstGeom prst="rect">
+            <a:avLst/>
+          </a:prstGeom>
+          <a:noFill/>
+          <a:ln w="9525" cap="flat" cmpd="sng" algn="ctr">
+            <a:solidFill>
+              <a:schemeClr val="tx1"/>
+            </a:solidFill>
+            <a:prstDash val="solid"/>
+            <a:round/>
+            <a:headEnd type="none" w="med" len="med"/>
+            <a:tailEnd type="none" w="med" len="med"/>
+          </a:ln>
+        </p:spPr>
+        <p:style>
+          <a:lnRef idx="0">
+            <a:scrgbClr r="0" g="0" b="0"/>
+          </a:lnRef>
+          <a:fillRef idx="0">
+            <a:scrgbClr r="0" g="0" b="0"/>
+          </a:fillRef>
+          <a:effectRef idx="0">
+            <a:scrgbClr r="0" g="0" b="0"/>
+          </a:effectRef>
+          <a:fontRef idx="minor">
+            <a:schemeClr val="dk1"/>
+          </a:fontRef>
+        </p:style>
+        <p:txBody>
+          <a:bodyPr rtlCol="0" anchor="t"/>
+          <a:lstStyle/>
+          <a:p>
+            <a:pPr algn="ctr"/>
+            <a:r>
+              <a:rPr lang="en-GB" dirty="0">
+                <a:solidFill>
+                  <a:schemeClr val="tx1"/>
+                </a:solidFill>
+              </a:rPr>
+              <a:t>Kubernetes cluster</a:t>
+            </a:r>
+          </a:p>
+        </p:txBody>
+      </p:sp>
+      <p:cxnSp>
+        <p:nvCxnSpPr>
+          <p:cNvPr id="50" name="Straight Arrow Connector 49">
+            <a:extLst>
+              <a:ext uri="{FF2B5EF4-FFF2-40B4-BE49-F238E27FC236}">
+                <a16:creationId xmlns:a16="http://schemas.microsoft.com/office/drawing/2014/main" id="{9F6C6EF4-BC90-6340-BAEB-3DF33D954174}"/>
+              </a:ext>
+            </a:extLst>
+          </p:cNvPr>
+          <p:cNvCxnSpPr>
+            <a:stCxn id="46" idx="2"/>
+            <a:endCxn id="33" idx="0"/>
+          </p:cNvCxnSpPr>
+          <p:nvPr/>
+        </p:nvCxnSpPr>
+        <p:spPr>
+          <a:xfrm>
+            <a:off x="14648569" y="4990301"/>
+            <a:ext cx="20" cy="1724779"/>
+          </a:xfrm>
+          <a:prstGeom prst="straightConnector1">
+            <a:avLst/>
+          </a:prstGeom>
+          <a:ln>
+            <a:solidFill>
+              <a:schemeClr val="bg2">
+                <a:lumMod val="75000"/>
+              </a:schemeClr>
+            </a:solidFill>
+            <a:prstDash val="solid"/>
+            <a:tailEnd type="triangle"/>
+          </a:ln>
+        </p:spPr>
+        <p:style>
+          <a:lnRef idx="1">
+            <a:schemeClr val="accent1"/>
+          </a:lnRef>
+          <a:fillRef idx="0">
+            <a:schemeClr val="accent1"/>
+          </a:fillRef>
+          <a:effectRef idx="0">
+            <a:schemeClr val="accent1"/>
+          </a:effectRef>
+          <a:fontRef idx="minor">
+            <a:schemeClr val="tx1"/>
+          </a:fontRef>
+        </p:style>
+      </p:cxnSp>
+      <p:sp>
+        <p:nvSpPr>
+          <p:cNvPr id="51" name="TextBox 50">
+            <a:extLst>
+              <a:ext uri="{FF2B5EF4-FFF2-40B4-BE49-F238E27FC236}">
+                <a16:creationId xmlns:a16="http://schemas.microsoft.com/office/drawing/2014/main" id="{4FD7CE8C-F401-274F-871D-6E1D6099A535}"/>
+              </a:ext>
+            </a:extLst>
+          </p:cNvPr>
+          <p:cNvSpPr txBox="1"/>
+          <p:nvPr/>
+        </p:nvSpPr>
+        <p:spPr>
+          <a:xfrm>
+            <a:off x="14648585" y="5289215"/>
+            <a:ext cx="1702707" cy="1181101"/>
+          </a:xfrm>
+          <a:prstGeom prst="rect">
+            <a:avLst/>
+          </a:prstGeom>
+          <a:noFill/>
+          <a:ln>
+            <a:noFill/>
+            <a:prstDash val="solid"/>
+          </a:ln>
+        </p:spPr>
+        <p:txBody>
+          <a:bodyPr wrap="square" rtlCol="0">
+            <a:normAutofit/>
+          </a:bodyPr>
+          <a:lstStyle/>
+          <a:p>
+            <a:r>
+              <a:rPr lang="en-GB" dirty="0">
+                <a:solidFill>
+                  <a:schemeClr val="bg2">
+                    <a:lumMod val="75000"/>
+                  </a:schemeClr>
+                </a:solidFill>
+              </a:rPr>
+              <a:t>K8s LCM talks to VIM for VM/BM LCM</a:t>
+            </a:r>
+          </a:p>
+        </p:txBody>
+      </p:sp>
+      <p:cxnSp>
+        <p:nvCxnSpPr>
+          <p:cNvPr id="52" name="Straight Arrow Connector 51">
+            <a:extLst>
+              <a:ext uri="{FF2B5EF4-FFF2-40B4-BE49-F238E27FC236}">
+                <a16:creationId xmlns:a16="http://schemas.microsoft.com/office/drawing/2014/main" id="{2F25D80B-B03F-B44F-9F08-6D49032AAF7C}"/>
+              </a:ext>
+            </a:extLst>
+          </p:cNvPr>
+          <p:cNvCxnSpPr>
+            <a:cxnSpLocks/>
+            <a:stCxn id="33" idx="1"/>
+            <a:endCxn id="32" idx="3"/>
+          </p:cNvCxnSpPr>
+          <p:nvPr/>
+        </p:nvCxnSpPr>
+        <p:spPr>
+          <a:xfrm flipH="1">
+            <a:off x="10640006" y="7172280"/>
+            <a:ext cx="2305859" cy="0"/>
+          </a:xfrm>
+          <a:prstGeom prst="straightConnector1">
+            <a:avLst/>
+          </a:prstGeom>
+          <a:ln>
+            <a:solidFill>
+              <a:schemeClr val="tx1"/>
+            </a:solidFill>
+            <a:tailEnd type="triangle"/>
+          </a:ln>
+        </p:spPr>
+        <p:style>
+          <a:lnRef idx="1">
+            <a:schemeClr val="accent1"/>
+          </a:lnRef>
+          <a:fillRef idx="0">
+            <a:schemeClr val="accent1"/>
+          </a:fillRef>
+          <a:effectRef idx="0">
+            <a:schemeClr val="accent1"/>
+          </a:effectRef>
+          <a:fontRef idx="minor">
+            <a:schemeClr val="tx1"/>
+          </a:fontRef>
+        </p:style>
+      </p:cxnSp>
+      <p:sp>
+        <p:nvSpPr>
+          <p:cNvPr id="53" name="TextBox 52">
+            <a:extLst>
+              <a:ext uri="{FF2B5EF4-FFF2-40B4-BE49-F238E27FC236}">
+                <a16:creationId xmlns:a16="http://schemas.microsoft.com/office/drawing/2014/main" id="{D68806BA-90BE-614E-9F87-9F6026D28433}"/>
+              </a:ext>
+            </a:extLst>
+          </p:cNvPr>
+          <p:cNvSpPr txBox="1"/>
+          <p:nvPr/>
+        </p:nvSpPr>
+        <p:spPr>
+          <a:xfrm>
+            <a:off x="11524000" y="4159481"/>
+            <a:ext cx="1702707" cy="457193"/>
+          </a:xfrm>
+          <a:prstGeom prst="rect">
+            <a:avLst/>
+          </a:prstGeom>
+          <a:noFill/>
+          <a:ln>
+            <a:noFill/>
+            <a:prstDash val="solid"/>
+          </a:ln>
+        </p:spPr>
+        <p:txBody>
+          <a:bodyPr wrap="square" rtlCol="0">
+            <a:normAutofit/>
+          </a:bodyPr>
+          <a:lstStyle/>
+          <a:p>
+            <a:r>
+              <a:rPr lang="en-GB" dirty="0">
+                <a:solidFill>
+                  <a:schemeClr val="bg2">
+                    <a:lumMod val="75000"/>
+                  </a:schemeClr>
+                </a:solidFill>
+              </a:rPr>
+              <a:t>Manages</a:t>
+            </a:r>
+          </a:p>
+        </p:txBody>
+      </p:sp>
+      <p:cxnSp>
+        <p:nvCxnSpPr>
+          <p:cNvPr id="54" name="Straight Arrow Connector 53">
+            <a:extLst>
+              <a:ext uri="{FF2B5EF4-FFF2-40B4-BE49-F238E27FC236}">
+                <a16:creationId xmlns:a16="http://schemas.microsoft.com/office/drawing/2014/main" id="{D53EC704-ADD5-0E44-BEFE-2AFDD0E56CD4}"/>
+              </a:ext>
+            </a:extLst>
+          </p:cNvPr>
+          <p:cNvCxnSpPr>
+            <a:cxnSpLocks/>
+            <a:stCxn id="46" idx="1"/>
+            <a:endCxn id="47" idx="2"/>
+          </p:cNvCxnSpPr>
+          <p:nvPr/>
+        </p:nvCxnSpPr>
+        <p:spPr>
+          <a:xfrm flipH="1">
+            <a:off x="11030476" y="4533101"/>
+            <a:ext cx="1915369" cy="0"/>
+          </a:xfrm>
+          <a:prstGeom prst="straightConnector1">
+            <a:avLst/>
+          </a:prstGeom>
+          <a:ln>
+            <a:solidFill>
+              <a:schemeClr val="bg2">
+                <a:lumMod val="75000"/>
+              </a:schemeClr>
+            </a:solidFill>
+            <a:prstDash val="solid"/>
+            <a:tailEnd type="triangle"/>
+          </a:ln>
+        </p:spPr>
+        <p:style>
+          <a:lnRef idx="1">
+            <a:schemeClr val="accent1"/>
+          </a:lnRef>
+          <a:fillRef idx="0">
+            <a:schemeClr val="accent1"/>
+          </a:fillRef>
+          <a:effectRef idx="0">
+            <a:schemeClr val="accent1"/>
+          </a:effectRef>
+          <a:fontRef idx="minor">
+            <a:schemeClr val="tx1"/>
+          </a:fontRef>
+        </p:style>
+      </p:cxnSp>
+      <p:sp>
+        <p:nvSpPr>
+          <p:cNvPr id="55" name="TextBox 54">
+            <a:extLst>
+              <a:ext uri="{FF2B5EF4-FFF2-40B4-BE49-F238E27FC236}">
+                <a16:creationId xmlns:a16="http://schemas.microsoft.com/office/drawing/2014/main" id="{2C34C372-866D-264A-9930-6BD2C1CE2AFB}"/>
+              </a:ext>
+            </a:extLst>
+          </p:cNvPr>
+          <p:cNvSpPr txBox="1"/>
+          <p:nvPr/>
+        </p:nvSpPr>
+        <p:spPr>
+          <a:xfrm>
+            <a:off x="11395543" y="6867480"/>
+            <a:ext cx="1702707" cy="457193"/>
+          </a:xfrm>
+          <a:prstGeom prst="rect">
+            <a:avLst/>
+          </a:prstGeom>
+          <a:noFill/>
+        </p:spPr>
+        <p:txBody>
+          <a:bodyPr wrap="square" rtlCol="0">
+            <a:normAutofit/>
+          </a:bodyPr>
+          <a:lstStyle/>
+          <a:p>
+            <a:r>
+              <a:rPr lang="en-GB" dirty="0"/>
+              <a:t>Manages</a:t>
+            </a:r>
+          </a:p>
+        </p:txBody>
+      </p:sp>
+      <p:cxnSp>
+        <p:nvCxnSpPr>
+          <p:cNvPr id="66" name="Straight Arrow Connector 65">
+            <a:extLst>
+              <a:ext uri="{FF2B5EF4-FFF2-40B4-BE49-F238E27FC236}">
+                <a16:creationId xmlns:a16="http://schemas.microsoft.com/office/drawing/2014/main" id="{2C336FC4-1527-6D47-ACD1-1143A9B5BE94}"/>
+              </a:ext>
+            </a:extLst>
+          </p:cNvPr>
+          <p:cNvCxnSpPr>
+            <a:cxnSpLocks/>
+          </p:cNvCxnSpPr>
+          <p:nvPr/>
+        </p:nvCxnSpPr>
+        <p:spPr>
+          <a:xfrm>
+            <a:off x="8760577" y="4376532"/>
+            <a:ext cx="4622664" cy="2338548"/>
+          </a:xfrm>
+          <a:prstGeom prst="straightConnector1">
+            <a:avLst/>
+          </a:prstGeom>
+          <a:ln>
+            <a:solidFill>
+              <a:schemeClr val="tx1"/>
+            </a:solidFill>
+            <a:prstDash val="solid"/>
+            <a:tailEnd type="triangle"/>
+          </a:ln>
+        </p:spPr>
+        <p:style>
+          <a:lnRef idx="1">
+            <a:schemeClr val="accent1"/>
+          </a:lnRef>
+          <a:fillRef idx="0">
+            <a:schemeClr val="accent1"/>
+          </a:fillRef>
+          <a:effectRef idx="0">
+            <a:schemeClr val="accent1"/>
+          </a:effectRef>
+          <a:fontRef idx="minor">
+            <a:schemeClr val="tx1"/>
+          </a:fontRef>
+        </p:style>
+      </p:cxnSp>
+      <p:sp>
+        <p:nvSpPr>
+          <p:cNvPr id="67" name="TextBox 66">
+            <a:extLst>
+              <a:ext uri="{FF2B5EF4-FFF2-40B4-BE49-F238E27FC236}">
+                <a16:creationId xmlns:a16="http://schemas.microsoft.com/office/drawing/2014/main" id="{C6F17B0B-A813-1A40-9AAE-ADA4BB7B75BE}"/>
+              </a:ext>
+            </a:extLst>
+          </p:cNvPr>
+          <p:cNvSpPr txBox="1"/>
+          <p:nvPr/>
+        </p:nvSpPr>
+        <p:spPr>
+          <a:xfrm>
+            <a:off x="11618073" y="5132079"/>
+            <a:ext cx="2076142" cy="889703"/>
+          </a:xfrm>
+          <a:prstGeom prst="rect">
+            <a:avLst/>
+          </a:prstGeom>
+          <a:noFill/>
+          <a:ln>
+            <a:noFill/>
+            <a:prstDash val="solid"/>
+          </a:ln>
+        </p:spPr>
+        <p:txBody>
+          <a:bodyPr wrap="square" rtlCol="0">
+            <a:normAutofit fontScale="85000" lnSpcReduction="20000"/>
+          </a:bodyPr>
+          <a:lstStyle/>
+          <a:p>
+            <a:r>
+              <a:rPr lang="en-GB" dirty="0"/>
+              <a:t>Manages via Kubernetes Cloud Providers or custom controller (e.g. CRDs, Operator)</a:t>
+            </a:r>
+          </a:p>
+        </p:txBody>
+      </p:sp>
+      <p:cxnSp>
+        <p:nvCxnSpPr>
+          <p:cNvPr id="68" name="Straight Arrow Connector 67">
+            <a:extLst>
+              <a:ext uri="{FF2B5EF4-FFF2-40B4-BE49-F238E27FC236}">
+                <a16:creationId xmlns:a16="http://schemas.microsoft.com/office/drawing/2014/main" id="{ADFD60E4-A20E-3540-B72C-E57881AF5AFD}"/>
+              </a:ext>
+            </a:extLst>
+          </p:cNvPr>
+          <p:cNvCxnSpPr>
+            <a:cxnSpLocks/>
+            <a:endCxn id="38" idx="2"/>
+          </p:cNvCxnSpPr>
+          <p:nvPr/>
+        </p:nvCxnSpPr>
+        <p:spPr>
+          <a:xfrm flipV="1">
+            <a:off x="8449602" y="6230171"/>
+            <a:ext cx="0" cy="484909"/>
+          </a:xfrm>
+          <a:prstGeom prst="straightConnector1">
+            <a:avLst/>
+          </a:prstGeom>
+          <a:ln>
+            <a:solidFill>
+              <a:schemeClr val="tx1"/>
+            </a:solidFill>
+            <a:prstDash val="solid"/>
+            <a:tailEnd type="triangle"/>
+          </a:ln>
+        </p:spPr>
+        <p:style>
+          <a:lnRef idx="1">
+            <a:schemeClr val="accent1"/>
+          </a:lnRef>
+          <a:fillRef idx="0">
+            <a:schemeClr val="accent1"/>
+          </a:fillRef>
+          <a:effectRef idx="0">
+            <a:schemeClr val="accent1"/>
+          </a:effectRef>
+          <a:fontRef idx="minor">
+            <a:schemeClr val="tx1"/>
+          </a:fontRef>
+        </p:style>
+      </p:cxnSp>
+      <p:cxnSp>
+        <p:nvCxnSpPr>
+          <p:cNvPr id="69" name="Straight Arrow Connector 68">
+            <a:extLst>
+              <a:ext uri="{FF2B5EF4-FFF2-40B4-BE49-F238E27FC236}">
+                <a16:creationId xmlns:a16="http://schemas.microsoft.com/office/drawing/2014/main" id="{80D65529-F862-F84D-B17C-4CFFC4E91C0D}"/>
+              </a:ext>
+            </a:extLst>
+          </p:cNvPr>
+          <p:cNvCxnSpPr>
+            <a:cxnSpLocks/>
+            <a:endCxn id="34" idx="2"/>
+          </p:cNvCxnSpPr>
+          <p:nvPr/>
+        </p:nvCxnSpPr>
+        <p:spPr>
+          <a:xfrm flipV="1">
+            <a:off x="3884761" y="6230172"/>
+            <a:ext cx="1" cy="505914"/>
+          </a:xfrm>
+          <a:prstGeom prst="straightConnector1">
+            <a:avLst/>
+          </a:prstGeom>
+          <a:ln>
+            <a:solidFill>
+              <a:schemeClr val="tx1"/>
+            </a:solidFill>
+            <a:prstDash val="solid"/>
+            <a:tailEnd type="triangle"/>
+          </a:ln>
+        </p:spPr>
+        <p:style>
+          <a:lnRef idx="1">
+            <a:schemeClr val="accent1"/>
+          </a:lnRef>
+          <a:fillRef idx="0">
+            <a:schemeClr val="accent1"/>
+          </a:fillRef>
+          <a:effectRef idx="0">
+            <a:schemeClr val="accent1"/>
+          </a:effectRef>
+          <a:fontRef idx="minor">
+            <a:schemeClr val="tx1"/>
+          </a:fontRef>
+        </p:style>
+      </p:cxnSp>
+      <p:sp>
+        <p:nvSpPr>
+          <p:cNvPr id="70" name="TextBox 69">
+            <a:extLst>
+              <a:ext uri="{FF2B5EF4-FFF2-40B4-BE49-F238E27FC236}">
+                <a16:creationId xmlns:a16="http://schemas.microsoft.com/office/drawing/2014/main" id="{9256ED4A-1216-F448-8E03-13BA6FAE6437}"/>
+              </a:ext>
+            </a:extLst>
+          </p:cNvPr>
+          <p:cNvSpPr txBox="1"/>
+          <p:nvPr/>
+        </p:nvSpPr>
+        <p:spPr>
+          <a:xfrm>
+            <a:off x="6636039" y="6429442"/>
+            <a:ext cx="2527062" cy="285638"/>
+          </a:xfrm>
+          <a:prstGeom prst="rect">
+            <a:avLst/>
+          </a:prstGeom>
+          <a:noFill/>
+        </p:spPr>
+        <p:txBody>
+          <a:bodyPr wrap="square" rtlCol="0">
+            <a:normAutofit fontScale="85000" lnSpcReduction="20000"/>
+          </a:bodyPr>
+          <a:lstStyle/>
+          <a:p>
+            <a:r>
+              <a:rPr lang="en-GB" dirty="0"/>
+              <a:t>Provides resources to</a:t>
+            </a:r>
+          </a:p>
+        </p:txBody>
+      </p:sp>
+      <p:sp>
+        <p:nvSpPr>
+          <p:cNvPr id="71" name="TextBox 70">
+            <a:extLst>
+              <a:ext uri="{FF2B5EF4-FFF2-40B4-BE49-F238E27FC236}">
+                <a16:creationId xmlns:a16="http://schemas.microsoft.com/office/drawing/2014/main" id="{F9C94DD8-B1DD-9B49-BB5C-B1DF6D40E218}"/>
+              </a:ext>
+            </a:extLst>
+          </p:cNvPr>
+          <p:cNvSpPr txBox="1"/>
+          <p:nvPr/>
+        </p:nvSpPr>
+        <p:spPr>
+          <a:xfrm>
+            <a:off x="2070285" y="6450448"/>
+            <a:ext cx="2527062" cy="285638"/>
+          </a:xfrm>
+          <a:prstGeom prst="rect">
+            <a:avLst/>
+          </a:prstGeom>
+          <a:noFill/>
+        </p:spPr>
+        <p:txBody>
+          <a:bodyPr wrap="square" rtlCol="0">
+            <a:normAutofit fontScale="85000" lnSpcReduction="20000"/>
+          </a:bodyPr>
+          <a:lstStyle/>
+          <a:p>
+            <a:r>
+              <a:rPr lang="en-GB" dirty="0"/>
+              <a:t>Provides resources to</a:t>
+            </a:r>
+          </a:p>
+        </p:txBody>
+      </p:sp>
+      <p:sp>
+        <p:nvSpPr>
+          <p:cNvPr id="72" name="Rectangle 71">
+            <a:extLst>
+              <a:ext uri="{FF2B5EF4-FFF2-40B4-BE49-F238E27FC236}">
+                <a16:creationId xmlns:a16="http://schemas.microsoft.com/office/drawing/2014/main" id="{EE44987A-9061-104B-88DB-B12FCB7CFA86}"/>
+              </a:ext>
+            </a:extLst>
+          </p:cNvPr>
+          <p:cNvSpPr/>
+          <p:nvPr/>
+        </p:nvSpPr>
+        <p:spPr>
+          <a:xfrm>
+            <a:off x="12945843" y="2823093"/>
+            <a:ext cx="3405447" cy="1152274"/>
+          </a:xfrm>
+          <a:prstGeom prst="rect">
+            <a:avLst/>
+          </a:prstGeom>
+          <a:noFill/>
+          <a:ln w="9525" cap="flat" cmpd="sng" algn="ctr">
+            <a:solidFill>
+              <a:schemeClr val="dk1"/>
+            </a:solidFill>
+            <a:prstDash val="solid"/>
+            <a:round/>
+            <a:headEnd type="none" w="med" len="med"/>
+            <a:tailEnd type="none" w="med" len="med"/>
+          </a:ln>
+        </p:spPr>
+        <p:style>
+          <a:lnRef idx="0">
+            <a:scrgbClr r="0" g="0" b="0"/>
+          </a:lnRef>
+          <a:fillRef idx="0">
+            <a:scrgbClr r="0" g="0" b="0"/>
+          </a:fillRef>
+          <a:effectRef idx="0">
+            <a:scrgbClr r="0" g="0" b="0"/>
+          </a:effectRef>
+          <a:fontRef idx="minor">
+            <a:schemeClr val="dk1"/>
+          </a:fontRef>
+        </p:style>
+        <p:txBody>
+          <a:bodyPr rtlCol="0" anchor="ctr"/>
+          <a:lstStyle/>
+          <a:p>
+            <a:pPr algn="ctr"/>
+            <a:r>
+              <a:rPr lang="en-GB" dirty="0"/>
+              <a:t>Kubernetes-based Application Artefact Storage</a:t>
+            </a:r>
+          </a:p>
+          <a:p>
+            <a:pPr algn="ctr"/>
+            <a:endParaRPr lang="en-GB" dirty="0"/>
+          </a:p>
+          <a:p>
+            <a:pPr algn="ctr"/>
+            <a:endParaRPr lang="en-GB" dirty="0"/>
+          </a:p>
+        </p:txBody>
+      </p:sp>
+      <p:sp>
+        <p:nvSpPr>
+          <p:cNvPr id="73" name="Rectangle 72">
+            <a:extLst>
+              <a:ext uri="{FF2B5EF4-FFF2-40B4-BE49-F238E27FC236}">
+                <a16:creationId xmlns:a16="http://schemas.microsoft.com/office/drawing/2014/main" id="{1ECCE7F4-7511-6C47-AF3D-B92683941E66}"/>
+              </a:ext>
+            </a:extLst>
+          </p:cNvPr>
+          <p:cNvSpPr/>
+          <p:nvPr/>
+        </p:nvSpPr>
+        <p:spPr>
+          <a:xfrm>
+            <a:off x="13301322" y="3418613"/>
+            <a:ext cx="1140011" cy="436597"/>
+          </a:xfrm>
+          <a:prstGeom prst="rect">
+            <a:avLst/>
+          </a:prstGeom>
+          <a:noFill/>
+          <a:ln w="9525" cap="flat" cmpd="sng" algn="ctr">
+            <a:solidFill>
+              <a:schemeClr val="dk1"/>
+            </a:solidFill>
+            <a:prstDash val="solid"/>
+            <a:round/>
+            <a:headEnd type="none" w="med" len="med"/>
+            <a:tailEnd type="none" w="med" len="med"/>
+          </a:ln>
+        </p:spPr>
+        <p:style>
+          <a:lnRef idx="0">
+            <a:scrgbClr r="0" g="0" b="0"/>
+          </a:lnRef>
+          <a:fillRef idx="0">
+            <a:scrgbClr r="0" g="0" b="0"/>
+          </a:fillRef>
+          <a:effectRef idx="0">
+            <a:scrgbClr r="0" g="0" b="0"/>
+          </a:effectRef>
+          <a:fontRef idx="minor">
+            <a:schemeClr val="dk1"/>
+          </a:fontRef>
+        </p:style>
+        <p:txBody>
+          <a:bodyPr rtlCol="0" anchor="ctr"/>
+          <a:lstStyle/>
+          <a:p>
+            <a:pPr algn="ctr"/>
+            <a:r>
+              <a:rPr lang="en-GB" sz="1400" dirty="0"/>
+              <a:t>Container Registry</a:t>
+            </a:r>
+          </a:p>
+        </p:txBody>
+      </p:sp>
+      <p:sp>
+        <p:nvSpPr>
+          <p:cNvPr id="74" name="Rectangle 73">
+            <a:extLst>
+              <a:ext uri="{FF2B5EF4-FFF2-40B4-BE49-F238E27FC236}">
+                <a16:creationId xmlns:a16="http://schemas.microsoft.com/office/drawing/2014/main" id="{59346FD6-B98A-6248-B05E-4A8635E1AE85}"/>
+              </a:ext>
+            </a:extLst>
+          </p:cNvPr>
+          <p:cNvSpPr/>
+          <p:nvPr/>
+        </p:nvSpPr>
+        <p:spPr>
+          <a:xfrm>
+            <a:off x="14871019" y="3411681"/>
+            <a:ext cx="1140011" cy="436597"/>
+          </a:xfrm>
+          <a:prstGeom prst="rect">
+            <a:avLst/>
+          </a:prstGeom>
+          <a:noFill/>
+          <a:ln w="9525" cap="flat" cmpd="sng" algn="ctr">
+            <a:solidFill>
+              <a:schemeClr val="dk1"/>
+            </a:solidFill>
+            <a:prstDash val="solid"/>
+            <a:round/>
+            <a:headEnd type="none" w="med" len="med"/>
+            <a:tailEnd type="none" w="med" len="med"/>
+          </a:ln>
+        </p:spPr>
+        <p:style>
+          <a:lnRef idx="0">
+            <a:scrgbClr r="0" g="0" b="0"/>
+          </a:lnRef>
+          <a:fillRef idx="0">
+            <a:scrgbClr r="0" g="0" b="0"/>
+          </a:fillRef>
+          <a:effectRef idx="0">
+            <a:scrgbClr r="0" g="0" b="0"/>
+          </a:effectRef>
+          <a:fontRef idx="minor">
+            <a:schemeClr val="dk1"/>
+          </a:fontRef>
+        </p:style>
+        <p:txBody>
+          <a:bodyPr rtlCol="0" anchor="ctr"/>
+          <a:lstStyle/>
+          <a:p>
+            <a:pPr algn="ctr"/>
+            <a:r>
+              <a:rPr lang="en-GB" sz="1400" dirty="0"/>
+              <a:t>Helm Chart Repo (e.g.)</a:t>
+            </a:r>
+          </a:p>
+        </p:txBody>
+      </p:sp>
+      <p:cxnSp>
+        <p:nvCxnSpPr>
+          <p:cNvPr id="75" name="Straight Arrow Connector 74">
+            <a:extLst>
+              <a:ext uri="{FF2B5EF4-FFF2-40B4-BE49-F238E27FC236}">
+                <a16:creationId xmlns:a16="http://schemas.microsoft.com/office/drawing/2014/main" id="{73E830E4-D439-CF43-B1AE-11DCFDE5CE79}"/>
+              </a:ext>
+            </a:extLst>
+          </p:cNvPr>
+          <p:cNvCxnSpPr>
+            <a:cxnSpLocks/>
+            <a:endCxn id="32" idx="0"/>
+          </p:cNvCxnSpPr>
+          <p:nvPr/>
+        </p:nvCxnSpPr>
+        <p:spPr>
+          <a:xfrm flipH="1">
+            <a:off x="6167182" y="4964607"/>
+            <a:ext cx="570692" cy="1750473"/>
+          </a:xfrm>
+          <a:prstGeom prst="straightConnector1">
+            <a:avLst/>
+          </a:prstGeom>
+          <a:ln>
+            <a:solidFill>
+              <a:schemeClr val="tx1"/>
+            </a:solidFill>
+            <a:prstDash val="solid"/>
+            <a:tailEnd type="triangle"/>
+          </a:ln>
+        </p:spPr>
+        <p:style>
+          <a:lnRef idx="1">
+            <a:schemeClr val="accent1"/>
+          </a:lnRef>
+          <a:fillRef idx="0">
+            <a:schemeClr val="accent1"/>
+          </a:fillRef>
+          <a:effectRef idx="0">
+            <a:schemeClr val="accent1"/>
+          </a:effectRef>
+          <a:fontRef idx="minor">
+            <a:schemeClr val="tx1"/>
+          </a:fontRef>
+        </p:style>
+      </p:cxnSp>
+      <p:sp>
+        <p:nvSpPr>
+          <p:cNvPr id="76" name="TextBox 75">
+            <a:extLst>
+              <a:ext uri="{FF2B5EF4-FFF2-40B4-BE49-F238E27FC236}">
+                <a16:creationId xmlns:a16="http://schemas.microsoft.com/office/drawing/2014/main" id="{7EC3FD02-8262-7C4E-A014-0C49C97B63E0}"/>
+              </a:ext>
+            </a:extLst>
+          </p:cNvPr>
+          <p:cNvSpPr txBox="1"/>
+          <p:nvPr/>
+        </p:nvSpPr>
+        <p:spPr>
+          <a:xfrm>
+            <a:off x="4427927" y="6388915"/>
+            <a:ext cx="2149055" cy="347171"/>
+          </a:xfrm>
+          <a:prstGeom prst="rect">
+            <a:avLst/>
+          </a:prstGeom>
+          <a:noFill/>
+        </p:spPr>
+        <p:txBody>
+          <a:bodyPr wrap="square" rtlCol="0">
+            <a:normAutofit fontScale="55000" lnSpcReduction="20000"/>
+          </a:bodyPr>
+          <a:lstStyle/>
+          <a:p>
+            <a:r>
+              <a:rPr lang="en-GB" dirty="0"/>
+              <a:t>Manages resources via Kubernetes controller (e.g. </a:t>
+            </a:r>
+            <a:r>
+              <a:rPr lang="en-GB" dirty="0" err="1"/>
+              <a:t>kubevirt</a:t>
+            </a:r>
+            <a:r>
+              <a:rPr lang="en-GB" dirty="0"/>
+              <a:t>)</a:t>
+            </a:r>
+          </a:p>
+        </p:txBody>
+      </p:sp>
     </p:spTree>
     <p:extLst>
       <p:ext uri="{BB962C8B-B14F-4D97-AF65-F5344CB8AC3E}">
-        <p14:creationId xmlns:p14="http://schemas.microsoft.com/office/powerpoint/2010/main" val="1323390709"/>
+        <p14:creationId xmlns:p14="http://schemas.microsoft.com/office/powerpoint/2010/main" val="1169532950"/>
       </p:ext>
     </p:extLst>
   </p:cSld>

</xml_diff>

<commit_message>
RA2 Ch1 - updated roadmap
as per feedback from call on 03/01/20
</commit_message>
<xml_diff>
--- a/doc/ref_arch/kubernetes/figures/k8s-ref-arch-figures.pptx
+++ b/doc/ref_arch/kubernetes/figures/k8s-ref-arch-figures.pptx
@@ -1198,7 +1198,7 @@
         <a:p>
           <a:r>
             <a:rPr lang="en-GB" dirty="0"/>
-            <a:t>All Infrastructure Profiles included</a:t>
+            <a:t>Mapping of specification to RM Infrastructure Profiles included</a:t>
           </a:r>
         </a:p>
       </dgm:t>
@@ -1904,7 +1904,7 @@
           </a:pPr>
           <a:r>
             <a:rPr lang="en-GB" sz="4400" kern="1200" dirty="0"/>
-            <a:t>All Infrastructure Profiles included</a:t>
+            <a:t>Mapping of specification to RM Infrastructure Profiles included</a:t>
           </a:r>
         </a:p>
       </dsp:txBody>
@@ -3299,7 +3299,7 @@
           <a:p>
             <a:fld id="{F9D3E6FF-AC24-BE43-AFD3-27417514DD0F}" type="datetimeFigureOut">
               <a:rPr lang="en-GB" smtClean="0"/>
-              <a:t>24/12/2019</a:t>
+              <a:t>08/01/2020</a:t>
             </a:fld>
             <a:endParaRPr lang="en-GB"/>
           </a:p>
@@ -3469,7 +3469,7 @@
           <a:p>
             <a:fld id="{F9D3E6FF-AC24-BE43-AFD3-27417514DD0F}" type="datetimeFigureOut">
               <a:rPr lang="en-GB" smtClean="0"/>
-              <a:t>24/12/2019</a:t>
+              <a:t>08/01/2020</a:t>
             </a:fld>
             <a:endParaRPr lang="en-GB"/>
           </a:p>
@@ -3649,7 +3649,7 @@
           <a:p>
             <a:fld id="{F9D3E6FF-AC24-BE43-AFD3-27417514DD0F}" type="datetimeFigureOut">
               <a:rPr lang="en-GB" smtClean="0"/>
-              <a:t>24/12/2019</a:t>
+              <a:t>08/01/2020</a:t>
             </a:fld>
             <a:endParaRPr lang="en-GB"/>
           </a:p>
@@ -3819,7 +3819,7 @@
           <a:p>
             <a:fld id="{F9D3E6FF-AC24-BE43-AFD3-27417514DD0F}" type="datetimeFigureOut">
               <a:rPr lang="en-GB" smtClean="0"/>
-              <a:t>24/12/2019</a:t>
+              <a:t>08/01/2020</a:t>
             </a:fld>
             <a:endParaRPr lang="en-GB"/>
           </a:p>
@@ -4065,7 +4065,7 @@
           <a:p>
             <a:fld id="{F9D3E6FF-AC24-BE43-AFD3-27417514DD0F}" type="datetimeFigureOut">
               <a:rPr lang="en-GB" smtClean="0"/>
-              <a:t>24/12/2019</a:t>
+              <a:t>08/01/2020</a:t>
             </a:fld>
             <a:endParaRPr lang="en-GB"/>
           </a:p>
@@ -4297,7 +4297,7 @@
           <a:p>
             <a:fld id="{F9D3E6FF-AC24-BE43-AFD3-27417514DD0F}" type="datetimeFigureOut">
               <a:rPr lang="en-GB" smtClean="0"/>
-              <a:t>24/12/2019</a:t>
+              <a:t>08/01/2020</a:t>
             </a:fld>
             <a:endParaRPr lang="en-GB"/>
           </a:p>
@@ -4664,7 +4664,7 @@
           <a:p>
             <a:fld id="{F9D3E6FF-AC24-BE43-AFD3-27417514DD0F}" type="datetimeFigureOut">
               <a:rPr lang="en-GB" smtClean="0"/>
-              <a:t>24/12/2019</a:t>
+              <a:t>08/01/2020</a:t>
             </a:fld>
             <a:endParaRPr lang="en-GB"/>
           </a:p>
@@ -4782,7 +4782,7 @@
           <a:p>
             <a:fld id="{F9D3E6FF-AC24-BE43-AFD3-27417514DD0F}" type="datetimeFigureOut">
               <a:rPr lang="en-GB" smtClean="0"/>
-              <a:t>24/12/2019</a:t>
+              <a:t>08/01/2020</a:t>
             </a:fld>
             <a:endParaRPr lang="en-GB"/>
           </a:p>
@@ -4877,7 +4877,7 @@
           <a:p>
             <a:fld id="{F9D3E6FF-AC24-BE43-AFD3-27417514DD0F}" type="datetimeFigureOut">
               <a:rPr lang="en-GB" smtClean="0"/>
-              <a:t>24/12/2019</a:t>
+              <a:t>08/01/2020</a:t>
             </a:fld>
             <a:endParaRPr lang="en-GB"/>
           </a:p>
@@ -5154,7 +5154,7 @@
           <a:p>
             <a:fld id="{F9D3E6FF-AC24-BE43-AFD3-27417514DD0F}" type="datetimeFigureOut">
               <a:rPr lang="en-GB" smtClean="0"/>
-              <a:t>24/12/2019</a:t>
+              <a:t>08/01/2020</a:t>
             </a:fld>
             <a:endParaRPr lang="en-GB"/>
           </a:p>
@@ -5411,7 +5411,7 @@
           <a:p>
             <a:fld id="{F9D3E6FF-AC24-BE43-AFD3-27417514DD0F}" type="datetimeFigureOut">
               <a:rPr lang="en-GB" smtClean="0"/>
-              <a:t>24/12/2019</a:t>
+              <a:t>08/01/2020</a:t>
             </a:fld>
             <a:endParaRPr lang="en-GB"/>
           </a:p>
@@ -5624,7 +5624,7 @@
           <a:p>
             <a:fld id="{F9D3E6FF-AC24-BE43-AFD3-27417514DD0F}" type="datetimeFigureOut">
               <a:rPr lang="en-GB" smtClean="0"/>
-              <a:t>24/12/2019</a:t>
+              <a:t>08/01/2020</a:t>
             </a:fld>
             <a:endParaRPr lang="en-GB"/>
           </a:p>
@@ -24100,7 +24100,7 @@
           <p:nvPr>
             <p:extLst>
               <p:ext uri="{D42A27DB-BD31-4B8C-83A1-F6EECF244321}">
-                <p14:modId xmlns:p14="http://schemas.microsoft.com/office/powerpoint/2010/main" val="272654309"/>
+                <p14:modId xmlns:p14="http://schemas.microsoft.com/office/powerpoint/2010/main" val="3410472805"/>
               </p:ext>
             </p:extLst>
           </p:nvPr>

</xml_diff>

<commit_message>
RA2 Ch4 - merge conflict
</commit_message>
<xml_diff>
--- a/doc/ref_arch/kubernetes/figures/k8s-ref-arch-figures.pptx
+++ b/doc/ref_arch/kubernetes/figures/k8s-ref-arch-figures.pptx
@@ -9,6 +9,7 @@
     <p:sldId id="1079" r:id="rId3"/>
     <p:sldId id="1080" r:id="rId4"/>
     <p:sldId id="1082" r:id="rId5"/>
+    <p:sldId id="1081" r:id="rId6"/>
   </p:sldIdLst>
   <p:sldSz cx="18291175" cy="10288588"/>
   <p:notesSz cx="6858000" cy="9144000"/>
@@ -113,6 +114,3059 @@
     </p:ext>
   </p:extLst>
 </p:presentation>
+</file>
+
+<file path=ppt/diagrams/colors1.xml><?xml version="1.0" encoding="utf-8"?>
+<dgm:colorsDef xmlns:dgm="http://schemas.openxmlformats.org/drawingml/2006/diagram" xmlns:a="http://schemas.openxmlformats.org/drawingml/2006/main" uniqueId="urn:microsoft.com/office/officeart/2005/8/colors/accent1_2">
+  <dgm:title val=""/>
+  <dgm:desc val=""/>
+  <dgm:catLst>
+    <dgm:cat type="accent1" pri="11200"/>
+  </dgm:catLst>
+  <dgm:styleLbl name="node0">
+    <dgm:fillClrLst meth="repeat">
+      <a:schemeClr val="accent1"/>
+    </dgm:fillClrLst>
+    <dgm:linClrLst meth="repeat">
+      <a:schemeClr val="lt1"/>
+    </dgm:linClrLst>
+    <dgm:effectClrLst/>
+    <dgm:txLinClrLst/>
+    <dgm:txFillClrLst/>
+    <dgm:txEffectClrLst/>
+  </dgm:styleLbl>
+  <dgm:styleLbl name="alignNode1">
+    <dgm:fillClrLst meth="repeat">
+      <a:schemeClr val="accent1"/>
+    </dgm:fillClrLst>
+    <dgm:linClrLst meth="repeat">
+      <a:schemeClr val="accent1"/>
+    </dgm:linClrLst>
+    <dgm:effectClrLst/>
+    <dgm:txLinClrLst/>
+    <dgm:txFillClrLst/>
+    <dgm:txEffectClrLst/>
+  </dgm:styleLbl>
+  <dgm:styleLbl name="node1">
+    <dgm:fillClrLst meth="repeat">
+      <a:schemeClr val="accent1"/>
+    </dgm:fillClrLst>
+    <dgm:linClrLst meth="repeat">
+      <a:schemeClr val="lt1"/>
+    </dgm:linClrLst>
+    <dgm:effectClrLst/>
+    <dgm:txLinClrLst/>
+    <dgm:txFillClrLst/>
+    <dgm:txEffectClrLst/>
+  </dgm:styleLbl>
+  <dgm:styleLbl name="lnNode1">
+    <dgm:fillClrLst meth="repeat">
+      <a:schemeClr val="accent1"/>
+    </dgm:fillClrLst>
+    <dgm:linClrLst meth="repeat">
+      <a:schemeClr val="lt1"/>
+    </dgm:linClrLst>
+    <dgm:effectClrLst/>
+    <dgm:txLinClrLst/>
+    <dgm:txFillClrLst/>
+    <dgm:txEffectClrLst/>
+  </dgm:styleLbl>
+  <dgm:styleLbl name="vennNode1">
+    <dgm:fillClrLst meth="repeat">
+      <a:schemeClr val="accent1">
+        <a:alpha val="50000"/>
+      </a:schemeClr>
+    </dgm:fillClrLst>
+    <dgm:linClrLst meth="repeat">
+      <a:schemeClr val="lt1"/>
+    </dgm:linClrLst>
+    <dgm:effectClrLst/>
+    <dgm:txLinClrLst/>
+    <dgm:txFillClrLst/>
+    <dgm:txEffectClrLst/>
+  </dgm:styleLbl>
+  <dgm:styleLbl name="node2">
+    <dgm:fillClrLst meth="repeat">
+      <a:schemeClr val="accent1"/>
+    </dgm:fillClrLst>
+    <dgm:linClrLst meth="repeat">
+      <a:schemeClr val="lt1"/>
+    </dgm:linClrLst>
+    <dgm:effectClrLst/>
+    <dgm:txLinClrLst/>
+    <dgm:txFillClrLst/>
+    <dgm:txEffectClrLst/>
+  </dgm:styleLbl>
+  <dgm:styleLbl name="node3">
+    <dgm:fillClrLst meth="repeat">
+      <a:schemeClr val="accent1"/>
+    </dgm:fillClrLst>
+    <dgm:linClrLst meth="repeat">
+      <a:schemeClr val="lt1"/>
+    </dgm:linClrLst>
+    <dgm:effectClrLst/>
+    <dgm:txLinClrLst/>
+    <dgm:txFillClrLst/>
+    <dgm:txEffectClrLst/>
+  </dgm:styleLbl>
+  <dgm:styleLbl name="node4">
+    <dgm:fillClrLst meth="repeat">
+      <a:schemeClr val="accent1"/>
+    </dgm:fillClrLst>
+    <dgm:linClrLst meth="repeat">
+      <a:schemeClr val="lt1"/>
+    </dgm:linClrLst>
+    <dgm:effectClrLst/>
+    <dgm:txLinClrLst/>
+    <dgm:txFillClrLst/>
+    <dgm:txEffectClrLst/>
+  </dgm:styleLbl>
+  <dgm:styleLbl name="fgImgPlace1">
+    <dgm:fillClrLst meth="repeat">
+      <a:schemeClr val="accent1">
+        <a:tint val="50000"/>
+      </a:schemeClr>
+    </dgm:fillClrLst>
+    <dgm:linClrLst meth="repeat">
+      <a:schemeClr val="lt1"/>
+    </dgm:linClrLst>
+    <dgm:effectClrLst/>
+    <dgm:txLinClrLst/>
+    <dgm:txFillClrLst meth="repeat">
+      <a:schemeClr val="lt1"/>
+    </dgm:txFillClrLst>
+    <dgm:txEffectClrLst/>
+  </dgm:styleLbl>
+  <dgm:styleLbl name="alignImgPlace1">
+    <dgm:fillClrLst meth="repeat">
+      <a:schemeClr val="accent1">
+        <a:tint val="50000"/>
+      </a:schemeClr>
+    </dgm:fillClrLst>
+    <dgm:linClrLst meth="repeat">
+      <a:schemeClr val="lt1"/>
+    </dgm:linClrLst>
+    <dgm:effectClrLst/>
+    <dgm:txLinClrLst/>
+    <dgm:txFillClrLst meth="repeat">
+      <a:schemeClr val="lt1"/>
+    </dgm:txFillClrLst>
+    <dgm:txEffectClrLst/>
+  </dgm:styleLbl>
+  <dgm:styleLbl name="bgImgPlace1">
+    <dgm:fillClrLst meth="repeat">
+      <a:schemeClr val="accent1">
+        <a:tint val="50000"/>
+      </a:schemeClr>
+    </dgm:fillClrLst>
+    <dgm:linClrLst meth="repeat">
+      <a:schemeClr val="lt1"/>
+    </dgm:linClrLst>
+    <dgm:effectClrLst/>
+    <dgm:txLinClrLst/>
+    <dgm:txFillClrLst meth="repeat">
+      <a:schemeClr val="lt1"/>
+    </dgm:txFillClrLst>
+    <dgm:txEffectClrLst/>
+  </dgm:styleLbl>
+  <dgm:styleLbl name="sibTrans2D1">
+    <dgm:fillClrLst meth="repeat">
+      <a:schemeClr val="accent1">
+        <a:tint val="60000"/>
+      </a:schemeClr>
+    </dgm:fillClrLst>
+    <dgm:linClrLst meth="repeat">
+      <a:schemeClr val="accent1">
+        <a:tint val="60000"/>
+      </a:schemeClr>
+    </dgm:linClrLst>
+    <dgm:effectClrLst/>
+    <dgm:txLinClrLst/>
+    <dgm:txFillClrLst/>
+    <dgm:txEffectClrLst/>
+  </dgm:styleLbl>
+  <dgm:styleLbl name="fgSibTrans2D1">
+    <dgm:fillClrLst meth="repeat">
+      <a:schemeClr val="accent1">
+        <a:tint val="60000"/>
+      </a:schemeClr>
+    </dgm:fillClrLst>
+    <dgm:linClrLst meth="repeat">
+      <a:schemeClr val="accent1">
+        <a:tint val="60000"/>
+      </a:schemeClr>
+    </dgm:linClrLst>
+    <dgm:effectClrLst/>
+    <dgm:txLinClrLst/>
+    <dgm:txFillClrLst/>
+    <dgm:txEffectClrLst/>
+  </dgm:styleLbl>
+  <dgm:styleLbl name="bgSibTrans2D1">
+    <dgm:fillClrLst meth="repeat">
+      <a:schemeClr val="accent1">
+        <a:tint val="60000"/>
+      </a:schemeClr>
+    </dgm:fillClrLst>
+    <dgm:linClrLst meth="repeat">
+      <a:schemeClr val="accent1">
+        <a:tint val="60000"/>
+      </a:schemeClr>
+    </dgm:linClrLst>
+    <dgm:effectClrLst/>
+    <dgm:txLinClrLst/>
+    <dgm:txFillClrLst/>
+    <dgm:txEffectClrLst/>
+  </dgm:styleLbl>
+  <dgm:styleLbl name="sibTrans1D1">
+    <dgm:fillClrLst meth="repeat">
+      <a:schemeClr val="accent1"/>
+    </dgm:fillClrLst>
+    <dgm:linClrLst meth="repeat">
+      <a:schemeClr val="accent1"/>
+    </dgm:linClrLst>
+    <dgm:effectClrLst/>
+    <dgm:txLinClrLst/>
+    <dgm:txFillClrLst meth="repeat">
+      <a:schemeClr val="tx1"/>
+    </dgm:txFillClrLst>
+    <dgm:txEffectClrLst/>
+  </dgm:styleLbl>
+  <dgm:styleLbl name="callout">
+    <dgm:fillClrLst meth="repeat">
+      <a:schemeClr val="accent1"/>
+    </dgm:fillClrLst>
+    <dgm:linClrLst meth="repeat">
+      <a:schemeClr val="accent1">
+        <a:tint val="50000"/>
+      </a:schemeClr>
+    </dgm:linClrLst>
+    <dgm:effectClrLst/>
+    <dgm:txLinClrLst/>
+    <dgm:txFillClrLst meth="repeat">
+      <a:schemeClr val="tx1"/>
+    </dgm:txFillClrLst>
+    <dgm:txEffectClrLst/>
+  </dgm:styleLbl>
+  <dgm:styleLbl name="asst0">
+    <dgm:fillClrLst meth="repeat">
+      <a:schemeClr val="accent1"/>
+    </dgm:fillClrLst>
+    <dgm:linClrLst meth="repeat">
+      <a:schemeClr val="lt1"/>
+    </dgm:linClrLst>
+    <dgm:effectClrLst/>
+    <dgm:txLinClrLst/>
+    <dgm:txFillClrLst/>
+    <dgm:txEffectClrLst/>
+  </dgm:styleLbl>
+  <dgm:styleLbl name="asst1">
+    <dgm:fillClrLst meth="repeat">
+      <a:schemeClr val="accent1"/>
+    </dgm:fillClrLst>
+    <dgm:linClrLst meth="repeat">
+      <a:schemeClr val="lt1"/>
+    </dgm:linClrLst>
+    <dgm:effectClrLst/>
+    <dgm:txLinClrLst/>
+    <dgm:txFillClrLst/>
+    <dgm:txEffectClrLst/>
+  </dgm:styleLbl>
+  <dgm:styleLbl name="asst2">
+    <dgm:fillClrLst meth="repeat">
+      <a:schemeClr val="accent1"/>
+    </dgm:fillClrLst>
+    <dgm:linClrLst meth="repeat">
+      <a:schemeClr val="lt1"/>
+    </dgm:linClrLst>
+    <dgm:effectClrLst/>
+    <dgm:txLinClrLst/>
+    <dgm:txFillClrLst/>
+    <dgm:txEffectClrLst/>
+  </dgm:styleLbl>
+  <dgm:styleLbl name="asst3">
+    <dgm:fillClrLst meth="repeat">
+      <a:schemeClr val="accent1"/>
+    </dgm:fillClrLst>
+    <dgm:linClrLst meth="repeat">
+      <a:schemeClr val="lt1"/>
+    </dgm:linClrLst>
+    <dgm:effectClrLst/>
+    <dgm:txLinClrLst/>
+    <dgm:txFillClrLst/>
+    <dgm:txEffectClrLst/>
+  </dgm:styleLbl>
+  <dgm:styleLbl name="asst4">
+    <dgm:fillClrLst meth="repeat">
+      <a:schemeClr val="accent1"/>
+    </dgm:fillClrLst>
+    <dgm:linClrLst meth="repeat">
+      <a:schemeClr val="lt1"/>
+    </dgm:linClrLst>
+    <dgm:effectClrLst/>
+    <dgm:txLinClrLst/>
+    <dgm:txFillClrLst/>
+    <dgm:txEffectClrLst/>
+  </dgm:styleLbl>
+  <dgm:styleLbl name="parChTrans2D1">
+    <dgm:fillClrLst meth="repeat">
+      <a:schemeClr val="accent1">
+        <a:tint val="60000"/>
+      </a:schemeClr>
+    </dgm:fillClrLst>
+    <dgm:linClrLst meth="repeat">
+      <a:schemeClr val="accent1">
+        <a:tint val="60000"/>
+      </a:schemeClr>
+    </dgm:linClrLst>
+    <dgm:effectClrLst/>
+    <dgm:txLinClrLst/>
+    <dgm:txFillClrLst meth="repeat">
+      <a:schemeClr val="lt1"/>
+    </dgm:txFillClrLst>
+    <dgm:txEffectClrLst/>
+  </dgm:styleLbl>
+  <dgm:styleLbl name="parChTrans2D2">
+    <dgm:fillClrLst meth="repeat">
+      <a:schemeClr val="accent1"/>
+    </dgm:fillClrLst>
+    <dgm:linClrLst meth="repeat">
+      <a:schemeClr val="accent1"/>
+    </dgm:linClrLst>
+    <dgm:effectClrLst/>
+    <dgm:txLinClrLst/>
+    <dgm:txFillClrLst meth="repeat">
+      <a:schemeClr val="lt1"/>
+    </dgm:txFillClrLst>
+    <dgm:txEffectClrLst/>
+  </dgm:styleLbl>
+  <dgm:styleLbl name="parChTrans2D3">
+    <dgm:fillClrLst meth="repeat">
+      <a:schemeClr val="accent1"/>
+    </dgm:fillClrLst>
+    <dgm:linClrLst meth="repeat">
+      <a:schemeClr val="accent1"/>
+    </dgm:linClrLst>
+    <dgm:effectClrLst/>
+    <dgm:txLinClrLst/>
+    <dgm:txFillClrLst meth="repeat">
+      <a:schemeClr val="lt1"/>
+    </dgm:txFillClrLst>
+    <dgm:txEffectClrLst/>
+  </dgm:styleLbl>
+  <dgm:styleLbl name="parChTrans2D4">
+    <dgm:fillClrLst meth="repeat">
+      <a:schemeClr val="accent1"/>
+    </dgm:fillClrLst>
+    <dgm:linClrLst meth="repeat">
+      <a:schemeClr val="accent1"/>
+    </dgm:linClrLst>
+    <dgm:effectClrLst/>
+    <dgm:txLinClrLst/>
+    <dgm:txFillClrLst meth="repeat">
+      <a:schemeClr val="lt1"/>
+    </dgm:txFillClrLst>
+    <dgm:txEffectClrLst/>
+  </dgm:styleLbl>
+  <dgm:styleLbl name="parChTrans1D1">
+    <dgm:fillClrLst meth="repeat">
+      <a:schemeClr val="accent1"/>
+    </dgm:fillClrLst>
+    <dgm:linClrLst meth="repeat">
+      <a:schemeClr val="accent1">
+        <a:shade val="60000"/>
+      </a:schemeClr>
+    </dgm:linClrLst>
+    <dgm:effectClrLst/>
+    <dgm:txLinClrLst/>
+    <dgm:txFillClrLst meth="repeat">
+      <a:schemeClr val="tx1"/>
+    </dgm:txFillClrLst>
+    <dgm:txEffectClrLst/>
+  </dgm:styleLbl>
+  <dgm:styleLbl name="parChTrans1D2">
+    <dgm:fillClrLst meth="repeat">
+      <a:schemeClr val="accent1"/>
+    </dgm:fillClrLst>
+    <dgm:linClrLst meth="repeat">
+      <a:schemeClr val="accent1">
+        <a:shade val="60000"/>
+      </a:schemeClr>
+    </dgm:linClrLst>
+    <dgm:effectClrLst/>
+    <dgm:txLinClrLst/>
+    <dgm:txFillClrLst meth="repeat">
+      <a:schemeClr val="tx1"/>
+    </dgm:txFillClrLst>
+    <dgm:txEffectClrLst/>
+  </dgm:styleLbl>
+  <dgm:styleLbl name="parChTrans1D3">
+    <dgm:fillClrLst meth="repeat">
+      <a:schemeClr val="accent1"/>
+    </dgm:fillClrLst>
+    <dgm:linClrLst meth="repeat">
+      <a:schemeClr val="accent1">
+        <a:shade val="80000"/>
+      </a:schemeClr>
+    </dgm:linClrLst>
+    <dgm:effectClrLst/>
+    <dgm:txLinClrLst/>
+    <dgm:txFillClrLst meth="repeat">
+      <a:schemeClr val="tx1"/>
+    </dgm:txFillClrLst>
+    <dgm:txEffectClrLst/>
+  </dgm:styleLbl>
+  <dgm:styleLbl name="parChTrans1D4">
+    <dgm:fillClrLst meth="repeat">
+      <a:schemeClr val="accent1"/>
+    </dgm:fillClrLst>
+    <dgm:linClrLst meth="repeat">
+      <a:schemeClr val="accent1">
+        <a:shade val="80000"/>
+      </a:schemeClr>
+    </dgm:linClrLst>
+    <dgm:effectClrLst/>
+    <dgm:txLinClrLst/>
+    <dgm:txFillClrLst meth="repeat">
+      <a:schemeClr val="tx1"/>
+    </dgm:txFillClrLst>
+    <dgm:txEffectClrLst/>
+  </dgm:styleLbl>
+  <dgm:styleLbl name="fgAcc1">
+    <dgm:fillClrLst meth="repeat">
+      <a:schemeClr val="lt1">
+        <a:alpha val="90000"/>
+      </a:schemeClr>
+    </dgm:fillClrLst>
+    <dgm:linClrLst meth="repeat">
+      <a:schemeClr val="accent1"/>
+    </dgm:linClrLst>
+    <dgm:effectClrLst/>
+    <dgm:txLinClrLst/>
+    <dgm:txFillClrLst meth="repeat">
+      <a:schemeClr val="dk1"/>
+    </dgm:txFillClrLst>
+    <dgm:txEffectClrLst/>
+  </dgm:styleLbl>
+  <dgm:styleLbl name="conFgAcc1">
+    <dgm:fillClrLst meth="repeat">
+      <a:schemeClr val="lt1">
+        <a:alpha val="90000"/>
+      </a:schemeClr>
+    </dgm:fillClrLst>
+    <dgm:linClrLst meth="repeat">
+      <a:schemeClr val="accent1"/>
+    </dgm:linClrLst>
+    <dgm:effectClrLst/>
+    <dgm:txLinClrLst/>
+    <dgm:txFillClrLst meth="repeat">
+      <a:schemeClr val="dk1"/>
+    </dgm:txFillClrLst>
+    <dgm:txEffectClrLst/>
+  </dgm:styleLbl>
+  <dgm:styleLbl name="alignAcc1">
+    <dgm:fillClrLst meth="repeat">
+      <a:schemeClr val="lt1">
+        <a:alpha val="90000"/>
+      </a:schemeClr>
+    </dgm:fillClrLst>
+    <dgm:linClrLst meth="repeat">
+      <a:schemeClr val="accent1"/>
+    </dgm:linClrLst>
+    <dgm:effectClrLst/>
+    <dgm:txLinClrLst/>
+    <dgm:txFillClrLst meth="repeat">
+      <a:schemeClr val="dk1"/>
+    </dgm:txFillClrLst>
+    <dgm:txEffectClrLst/>
+  </dgm:styleLbl>
+  <dgm:styleLbl name="trAlignAcc1">
+    <dgm:fillClrLst meth="repeat">
+      <a:schemeClr val="lt1">
+        <a:alpha val="40000"/>
+      </a:schemeClr>
+    </dgm:fillClrLst>
+    <dgm:linClrLst meth="repeat">
+      <a:schemeClr val="accent1"/>
+    </dgm:linClrLst>
+    <dgm:effectClrLst/>
+    <dgm:txLinClrLst/>
+    <dgm:txFillClrLst meth="repeat">
+      <a:schemeClr val="dk1"/>
+    </dgm:txFillClrLst>
+    <dgm:txEffectClrLst/>
+  </dgm:styleLbl>
+  <dgm:styleLbl name="bgAcc1">
+    <dgm:fillClrLst meth="repeat">
+      <a:schemeClr val="lt1">
+        <a:alpha val="90000"/>
+      </a:schemeClr>
+    </dgm:fillClrLst>
+    <dgm:linClrLst meth="repeat">
+      <a:schemeClr val="accent1"/>
+    </dgm:linClrLst>
+    <dgm:effectClrLst/>
+    <dgm:txLinClrLst/>
+    <dgm:txFillClrLst meth="repeat">
+      <a:schemeClr val="dk1"/>
+    </dgm:txFillClrLst>
+    <dgm:txEffectClrLst/>
+  </dgm:styleLbl>
+  <dgm:styleLbl name="solidFgAcc1">
+    <dgm:fillClrLst meth="repeat">
+      <a:schemeClr val="lt1"/>
+    </dgm:fillClrLst>
+    <dgm:linClrLst meth="repeat">
+      <a:schemeClr val="accent1"/>
+    </dgm:linClrLst>
+    <dgm:effectClrLst/>
+    <dgm:txLinClrLst/>
+    <dgm:txFillClrLst meth="repeat">
+      <a:schemeClr val="dk1"/>
+    </dgm:txFillClrLst>
+    <dgm:txEffectClrLst/>
+  </dgm:styleLbl>
+  <dgm:styleLbl name="solidAlignAcc1">
+    <dgm:fillClrLst meth="repeat">
+      <a:schemeClr val="lt1"/>
+    </dgm:fillClrLst>
+    <dgm:linClrLst meth="repeat">
+      <a:schemeClr val="accent1"/>
+    </dgm:linClrLst>
+    <dgm:effectClrLst/>
+    <dgm:txLinClrLst/>
+    <dgm:txFillClrLst meth="repeat">
+      <a:schemeClr val="dk1"/>
+    </dgm:txFillClrLst>
+    <dgm:txEffectClrLst/>
+  </dgm:styleLbl>
+  <dgm:styleLbl name="solidBgAcc1">
+    <dgm:fillClrLst meth="repeat">
+      <a:schemeClr val="lt1"/>
+    </dgm:fillClrLst>
+    <dgm:linClrLst meth="repeat">
+      <a:schemeClr val="accent1"/>
+    </dgm:linClrLst>
+    <dgm:effectClrLst/>
+    <dgm:txLinClrLst/>
+    <dgm:txFillClrLst meth="repeat">
+      <a:schemeClr val="dk1"/>
+    </dgm:txFillClrLst>
+    <dgm:txEffectClrLst/>
+  </dgm:styleLbl>
+  <dgm:styleLbl name="fgAccFollowNode1">
+    <dgm:fillClrLst meth="repeat">
+      <a:schemeClr val="accent1">
+        <a:alpha val="90000"/>
+        <a:tint val="40000"/>
+      </a:schemeClr>
+    </dgm:fillClrLst>
+    <dgm:linClrLst meth="repeat">
+      <a:schemeClr val="accent1">
+        <a:alpha val="90000"/>
+        <a:tint val="40000"/>
+      </a:schemeClr>
+    </dgm:linClrLst>
+    <dgm:effectClrLst/>
+    <dgm:txLinClrLst/>
+    <dgm:txFillClrLst meth="repeat">
+      <a:schemeClr val="dk1"/>
+    </dgm:txFillClrLst>
+    <dgm:txEffectClrLst/>
+  </dgm:styleLbl>
+  <dgm:styleLbl name="alignAccFollowNode1">
+    <dgm:fillClrLst meth="repeat">
+      <a:schemeClr val="accent1">
+        <a:alpha val="90000"/>
+        <a:tint val="40000"/>
+      </a:schemeClr>
+    </dgm:fillClrLst>
+    <dgm:linClrLst meth="repeat">
+      <a:schemeClr val="accent1">
+        <a:alpha val="90000"/>
+        <a:tint val="40000"/>
+      </a:schemeClr>
+    </dgm:linClrLst>
+    <dgm:effectClrLst/>
+    <dgm:txLinClrLst/>
+    <dgm:txFillClrLst meth="repeat">
+      <a:schemeClr val="dk1"/>
+    </dgm:txFillClrLst>
+    <dgm:txEffectClrLst/>
+  </dgm:styleLbl>
+  <dgm:styleLbl name="bgAccFollowNode1">
+    <dgm:fillClrLst meth="repeat">
+      <a:schemeClr val="accent1">
+        <a:alpha val="90000"/>
+        <a:tint val="40000"/>
+      </a:schemeClr>
+    </dgm:fillClrLst>
+    <dgm:linClrLst meth="repeat">
+      <a:schemeClr val="accent1">
+        <a:alpha val="90000"/>
+        <a:tint val="40000"/>
+      </a:schemeClr>
+    </dgm:linClrLst>
+    <dgm:effectClrLst/>
+    <dgm:txLinClrLst/>
+    <dgm:txFillClrLst meth="repeat">
+      <a:schemeClr val="dk1"/>
+    </dgm:txFillClrLst>
+    <dgm:txEffectClrLst/>
+  </dgm:styleLbl>
+  <dgm:styleLbl name="fgAcc0">
+    <dgm:fillClrLst meth="repeat">
+      <a:schemeClr val="lt1">
+        <a:alpha val="90000"/>
+      </a:schemeClr>
+    </dgm:fillClrLst>
+    <dgm:linClrLst meth="repeat">
+      <a:schemeClr val="accent1"/>
+    </dgm:linClrLst>
+    <dgm:effectClrLst/>
+    <dgm:txLinClrLst/>
+    <dgm:txFillClrLst meth="repeat">
+      <a:schemeClr val="dk1"/>
+    </dgm:txFillClrLst>
+    <dgm:txEffectClrLst/>
+  </dgm:styleLbl>
+  <dgm:styleLbl name="fgAcc2">
+    <dgm:fillClrLst meth="repeat">
+      <a:schemeClr val="lt1">
+        <a:alpha val="90000"/>
+      </a:schemeClr>
+    </dgm:fillClrLst>
+    <dgm:linClrLst meth="repeat">
+      <a:schemeClr val="accent1"/>
+    </dgm:linClrLst>
+    <dgm:effectClrLst/>
+    <dgm:txLinClrLst/>
+    <dgm:txFillClrLst meth="repeat">
+      <a:schemeClr val="dk1"/>
+    </dgm:txFillClrLst>
+    <dgm:txEffectClrLst/>
+  </dgm:styleLbl>
+  <dgm:styleLbl name="fgAcc3">
+    <dgm:fillClrLst meth="repeat">
+      <a:schemeClr val="lt1">
+        <a:alpha val="90000"/>
+      </a:schemeClr>
+    </dgm:fillClrLst>
+    <dgm:linClrLst meth="repeat">
+      <a:schemeClr val="accent1"/>
+    </dgm:linClrLst>
+    <dgm:effectClrLst/>
+    <dgm:txLinClrLst/>
+    <dgm:txFillClrLst meth="repeat">
+      <a:schemeClr val="dk1"/>
+    </dgm:txFillClrLst>
+    <dgm:txEffectClrLst/>
+  </dgm:styleLbl>
+  <dgm:styleLbl name="fgAcc4">
+    <dgm:fillClrLst meth="repeat">
+      <a:schemeClr val="lt1">
+        <a:alpha val="90000"/>
+      </a:schemeClr>
+    </dgm:fillClrLst>
+    <dgm:linClrLst meth="repeat">
+      <a:schemeClr val="accent1"/>
+    </dgm:linClrLst>
+    <dgm:effectClrLst/>
+    <dgm:txLinClrLst/>
+    <dgm:txFillClrLst meth="repeat">
+      <a:schemeClr val="dk1"/>
+    </dgm:txFillClrLst>
+    <dgm:txEffectClrLst/>
+  </dgm:styleLbl>
+  <dgm:styleLbl name="bgShp">
+    <dgm:fillClrLst meth="repeat">
+      <a:schemeClr val="accent1">
+        <a:tint val="40000"/>
+      </a:schemeClr>
+    </dgm:fillClrLst>
+    <dgm:linClrLst meth="repeat">
+      <a:schemeClr val="accent1"/>
+    </dgm:linClrLst>
+    <dgm:effectClrLst/>
+    <dgm:txLinClrLst/>
+    <dgm:txFillClrLst meth="repeat">
+      <a:schemeClr val="dk1"/>
+    </dgm:txFillClrLst>
+    <dgm:txEffectClrLst/>
+  </dgm:styleLbl>
+  <dgm:styleLbl name="dkBgShp">
+    <dgm:fillClrLst meth="repeat">
+      <a:schemeClr val="accent1">
+        <a:shade val="80000"/>
+      </a:schemeClr>
+    </dgm:fillClrLst>
+    <dgm:linClrLst meth="repeat">
+      <a:schemeClr val="accent1"/>
+    </dgm:linClrLst>
+    <dgm:effectClrLst/>
+    <dgm:txLinClrLst/>
+    <dgm:txFillClrLst meth="repeat">
+      <a:schemeClr val="lt1"/>
+    </dgm:txFillClrLst>
+    <dgm:txEffectClrLst/>
+  </dgm:styleLbl>
+  <dgm:styleLbl name="trBgShp">
+    <dgm:fillClrLst meth="repeat">
+      <a:schemeClr val="accent1">
+        <a:tint val="50000"/>
+        <a:alpha val="40000"/>
+      </a:schemeClr>
+    </dgm:fillClrLst>
+    <dgm:linClrLst meth="repeat">
+      <a:schemeClr val="accent1"/>
+    </dgm:linClrLst>
+    <dgm:effectClrLst/>
+    <dgm:txLinClrLst/>
+    <dgm:txFillClrLst meth="repeat">
+      <a:schemeClr val="lt1"/>
+    </dgm:txFillClrLst>
+    <dgm:txEffectClrLst/>
+  </dgm:styleLbl>
+  <dgm:styleLbl name="fgShp">
+    <dgm:fillClrLst meth="repeat">
+      <a:schemeClr val="accent1">
+        <a:tint val="60000"/>
+      </a:schemeClr>
+    </dgm:fillClrLst>
+    <dgm:linClrLst meth="repeat">
+      <a:schemeClr val="lt1"/>
+    </dgm:linClrLst>
+    <dgm:effectClrLst/>
+    <dgm:txLinClrLst/>
+    <dgm:txFillClrLst meth="repeat">
+      <a:schemeClr val="dk1"/>
+    </dgm:txFillClrLst>
+    <dgm:txEffectClrLst/>
+  </dgm:styleLbl>
+  <dgm:styleLbl name="revTx">
+    <dgm:fillClrLst meth="repeat">
+      <a:schemeClr val="lt1">
+        <a:alpha val="0"/>
+      </a:schemeClr>
+    </dgm:fillClrLst>
+    <dgm:linClrLst meth="repeat">
+      <a:schemeClr val="dk1">
+        <a:alpha val="0"/>
+      </a:schemeClr>
+    </dgm:linClrLst>
+    <dgm:effectClrLst/>
+    <dgm:txLinClrLst/>
+    <dgm:txFillClrLst meth="repeat">
+      <a:schemeClr val="tx1"/>
+    </dgm:txFillClrLst>
+    <dgm:txEffectClrLst/>
+  </dgm:styleLbl>
+</dgm:colorsDef>
+</file>
+
+<file path=ppt/diagrams/data1.xml><?xml version="1.0" encoding="utf-8"?>
+<dgm:dataModel xmlns:dgm="http://schemas.openxmlformats.org/drawingml/2006/diagram" xmlns:a="http://schemas.openxmlformats.org/drawingml/2006/main">
+  <dgm:ptLst>
+    <dgm:pt modelId="{A35D7A88-9133-694F-B399-45807959694F}" type="doc">
+      <dgm:prSet loTypeId="urn:microsoft.com/office/officeart/2005/8/layout/hList1" loCatId="" qsTypeId="urn:microsoft.com/office/officeart/2005/8/quickstyle/simple1" qsCatId="simple" csTypeId="urn:microsoft.com/office/officeart/2005/8/colors/accent1_2" csCatId="accent1" phldr="1"/>
+      <dgm:spPr/>
+      <dgm:t>
+        <a:bodyPr/>
+        <a:lstStyle/>
+        <a:p>
+          <a:endParaRPr lang="en-GB"/>
+        </a:p>
+      </dgm:t>
+    </dgm:pt>
+    <dgm:pt modelId="{F6071E1C-EDAC-9A40-920E-6396D1F3F8B6}">
+      <dgm:prSet phldrT="[Text]"/>
+      <dgm:spPr/>
+      <dgm:t>
+        <a:bodyPr/>
+        <a:lstStyle/>
+        <a:p>
+          <a:r>
+            <a:rPr lang="en-GB" dirty="0" err="1"/>
+            <a:t>Snezka</a:t>
+          </a:r>
+          <a:r>
+            <a:rPr lang="en-GB" dirty="0"/>
+            <a:t> Release</a:t>
+          </a:r>
+          <a:br>
+            <a:rPr lang="en-GB" dirty="0"/>
+          </a:br>
+          <a:r>
+            <a:rPr lang="en-GB" dirty="0"/>
+            <a:t>January 2020</a:t>
+          </a:r>
+        </a:p>
+      </dgm:t>
+    </dgm:pt>
+    <dgm:pt modelId="{B11FCE09-F120-8B49-AA5E-D514E812025E}" type="parTrans" cxnId="{C05F9B6C-1B06-1D4C-929B-E1475DEFCA56}">
+      <dgm:prSet/>
+      <dgm:spPr/>
+      <dgm:t>
+        <a:bodyPr/>
+        <a:lstStyle/>
+        <a:p>
+          <a:endParaRPr lang="en-GB"/>
+        </a:p>
+      </dgm:t>
+    </dgm:pt>
+    <dgm:pt modelId="{14358919-DA4D-1D41-A664-4A9CD28B0FE9}" type="sibTrans" cxnId="{C05F9B6C-1B06-1D4C-929B-E1475DEFCA56}">
+      <dgm:prSet/>
+      <dgm:spPr/>
+      <dgm:t>
+        <a:bodyPr/>
+        <a:lstStyle/>
+        <a:p>
+          <a:endParaRPr lang="en-GB"/>
+        </a:p>
+      </dgm:t>
+    </dgm:pt>
+    <dgm:pt modelId="{77355CEE-F4FB-B145-BA7B-0969D50CE212}">
+      <dgm:prSet phldrT="[Text]"/>
+      <dgm:spPr/>
+      <dgm:t>
+        <a:bodyPr/>
+        <a:lstStyle/>
+        <a:p>
+          <a:r>
+            <a:rPr lang="en-GB" dirty="0"/>
+            <a:t>Table of Contents complete for all chapters</a:t>
+          </a:r>
+        </a:p>
+      </dgm:t>
+    </dgm:pt>
+    <dgm:pt modelId="{F2BDCC11-56D3-4442-A429-5D06472DF069}" type="parTrans" cxnId="{8592FE85-E4E9-8B48-A407-6DADD09EA5B1}">
+      <dgm:prSet/>
+      <dgm:spPr/>
+      <dgm:t>
+        <a:bodyPr/>
+        <a:lstStyle/>
+        <a:p>
+          <a:endParaRPr lang="en-GB"/>
+        </a:p>
+      </dgm:t>
+    </dgm:pt>
+    <dgm:pt modelId="{E6C3A3F3-286E-1A48-A36D-BD1179C07AFF}" type="sibTrans" cxnId="{8592FE85-E4E9-8B48-A407-6DADD09EA5B1}">
+      <dgm:prSet/>
+      <dgm:spPr/>
+      <dgm:t>
+        <a:bodyPr/>
+        <a:lstStyle/>
+        <a:p>
+          <a:endParaRPr lang="en-GB"/>
+        </a:p>
+      </dgm:t>
+    </dgm:pt>
+    <dgm:pt modelId="{E29E2A27-8533-E24F-8C31-5B9521B1439F}">
+      <dgm:prSet phldrT="[Text]"/>
+      <dgm:spPr/>
+      <dgm:t>
+        <a:bodyPr/>
+        <a:lstStyle/>
+        <a:p>
+          <a:r>
+            <a:rPr lang="en-GB" dirty="0"/>
+            <a:t>TBC Release </a:t>
+          </a:r>
+          <a:br>
+            <a:rPr lang="en-GB" dirty="0"/>
+          </a:br>
+          <a:r>
+            <a:rPr lang="en-GB" dirty="0"/>
+            <a:t>April 2020</a:t>
+          </a:r>
+        </a:p>
+      </dgm:t>
+    </dgm:pt>
+    <dgm:pt modelId="{9F65CE4E-3F27-574B-8BF9-5777868BAB69}" type="parTrans" cxnId="{9094B106-AE32-1F4B-AAC1-A6787A1B5D54}">
+      <dgm:prSet/>
+      <dgm:spPr/>
+      <dgm:t>
+        <a:bodyPr/>
+        <a:lstStyle/>
+        <a:p>
+          <a:endParaRPr lang="en-GB"/>
+        </a:p>
+      </dgm:t>
+    </dgm:pt>
+    <dgm:pt modelId="{8EEB82E9-666C-3146-88B9-7686E6360F82}" type="sibTrans" cxnId="{9094B106-AE32-1F4B-AAC1-A6787A1B5D54}">
+      <dgm:prSet/>
+      <dgm:spPr/>
+      <dgm:t>
+        <a:bodyPr/>
+        <a:lstStyle/>
+        <a:p>
+          <a:endParaRPr lang="en-GB"/>
+        </a:p>
+      </dgm:t>
+    </dgm:pt>
+    <dgm:pt modelId="{A42F1D9D-E815-A840-B21A-C8A308A1B242}">
+      <dgm:prSet phldrT="[Text]"/>
+      <dgm:spPr/>
+      <dgm:t>
+        <a:bodyPr/>
+        <a:lstStyle/>
+        <a:p>
+          <a:r>
+            <a:rPr lang="en-GB" dirty="0"/>
+            <a:t>Chapter 2 (Requirements) at “Complete”</a:t>
+          </a:r>
+        </a:p>
+      </dgm:t>
+    </dgm:pt>
+    <dgm:pt modelId="{10F67730-0A55-0E47-B0C8-495B065B6AAE}" type="parTrans" cxnId="{0989B610-916F-E94B-B537-014828527B9D}">
+      <dgm:prSet/>
+      <dgm:spPr/>
+      <dgm:t>
+        <a:bodyPr/>
+        <a:lstStyle/>
+        <a:p>
+          <a:endParaRPr lang="en-GB"/>
+        </a:p>
+      </dgm:t>
+    </dgm:pt>
+    <dgm:pt modelId="{59DC6480-6842-1E42-AD02-3E23098B1587}" type="sibTrans" cxnId="{0989B610-916F-E94B-B537-014828527B9D}">
+      <dgm:prSet/>
+      <dgm:spPr/>
+      <dgm:t>
+        <a:bodyPr/>
+        <a:lstStyle/>
+        <a:p>
+          <a:endParaRPr lang="en-GB"/>
+        </a:p>
+      </dgm:t>
+    </dgm:pt>
+    <dgm:pt modelId="{38B9CEC9-CE5B-5C4B-BB14-05AD30CEFB16}">
+      <dgm:prSet phldrT="[Text]"/>
+      <dgm:spPr/>
+      <dgm:t>
+        <a:bodyPr/>
+        <a:lstStyle/>
+        <a:p>
+          <a:r>
+            <a:rPr lang="en-GB" dirty="0"/>
+            <a:t>TBC Release</a:t>
+          </a:r>
+          <a:br>
+            <a:rPr lang="en-GB" dirty="0"/>
+          </a:br>
+          <a:r>
+            <a:rPr lang="en-GB" dirty="0"/>
+            <a:t>July 2020</a:t>
+          </a:r>
+        </a:p>
+      </dgm:t>
+    </dgm:pt>
+    <dgm:pt modelId="{960ABDB2-224B-2E47-9C3A-81C29589C852}" type="parTrans" cxnId="{B3330C26-D38A-304F-9698-5A710021FFA5}">
+      <dgm:prSet/>
+      <dgm:spPr/>
+      <dgm:t>
+        <a:bodyPr/>
+        <a:lstStyle/>
+        <a:p>
+          <a:endParaRPr lang="en-GB"/>
+        </a:p>
+      </dgm:t>
+    </dgm:pt>
+    <dgm:pt modelId="{92693703-2B0C-9D43-AB0A-839797ADE0B9}" type="sibTrans" cxnId="{B3330C26-D38A-304F-9698-5A710021FFA5}">
+      <dgm:prSet/>
+      <dgm:spPr/>
+      <dgm:t>
+        <a:bodyPr/>
+        <a:lstStyle/>
+        <a:p>
+          <a:endParaRPr lang="en-GB"/>
+        </a:p>
+      </dgm:t>
+    </dgm:pt>
+    <dgm:pt modelId="{8DDEE7E0-DDB7-A24B-89B2-ADACF1815350}">
+      <dgm:prSet phldrT="[Text]"/>
+      <dgm:spPr/>
+      <dgm:t>
+        <a:bodyPr/>
+        <a:lstStyle/>
+        <a:p>
+          <a:r>
+            <a:rPr lang="en-GB" dirty="0"/>
+            <a:t>Include VM orchestration for CNFs</a:t>
+          </a:r>
+        </a:p>
+      </dgm:t>
+    </dgm:pt>
+    <dgm:pt modelId="{4B5C4B37-5F9D-864F-A390-04545835A47D}" type="parTrans" cxnId="{7380BC42-2D37-E747-B2C4-31F0A7DF3963}">
+      <dgm:prSet/>
+      <dgm:spPr/>
+      <dgm:t>
+        <a:bodyPr/>
+        <a:lstStyle/>
+        <a:p>
+          <a:endParaRPr lang="en-GB"/>
+        </a:p>
+      </dgm:t>
+    </dgm:pt>
+    <dgm:pt modelId="{4EF6A7EA-1061-834F-976A-042DFFF32111}" type="sibTrans" cxnId="{7380BC42-2D37-E747-B2C4-31F0A7DF3963}">
+      <dgm:prSet/>
+      <dgm:spPr/>
+      <dgm:t>
+        <a:bodyPr/>
+        <a:lstStyle/>
+        <a:p>
+          <a:endParaRPr lang="en-GB"/>
+        </a:p>
+      </dgm:t>
+    </dgm:pt>
+    <dgm:pt modelId="{8E9C75FF-DB25-164E-A506-DC6D3BD6B9F9}">
+      <dgm:prSet phldrT="[Text]"/>
+      <dgm:spPr/>
+      <dgm:t>
+        <a:bodyPr/>
+        <a:lstStyle/>
+        <a:p>
+          <a:r>
+            <a:rPr lang="en-GB" dirty="0"/>
+            <a:t>Chapters 1,2,3,6 at “Lots of SME feedback” or better</a:t>
+          </a:r>
+        </a:p>
+      </dgm:t>
+    </dgm:pt>
+    <dgm:pt modelId="{D5534814-DD98-9B4A-969A-C516DAF4A0C6}" type="parTrans" cxnId="{9822DB2E-1A45-EA43-873A-798EFDFAAFEA}">
+      <dgm:prSet/>
+      <dgm:spPr/>
+      <dgm:t>
+        <a:bodyPr/>
+        <a:lstStyle/>
+        <a:p>
+          <a:endParaRPr lang="en-GB"/>
+        </a:p>
+      </dgm:t>
+    </dgm:pt>
+    <dgm:pt modelId="{13CA365F-E908-194F-9A99-1F8B0D6C17A9}" type="sibTrans" cxnId="{9822DB2E-1A45-EA43-873A-798EFDFAAFEA}">
+      <dgm:prSet/>
+      <dgm:spPr/>
+      <dgm:t>
+        <a:bodyPr/>
+        <a:lstStyle/>
+        <a:p>
+          <a:endParaRPr lang="en-GB"/>
+        </a:p>
+      </dgm:t>
+    </dgm:pt>
+    <dgm:pt modelId="{502ABEF5-7782-A741-AC6F-58A53F775AD3}">
+      <dgm:prSet phldrT="[Text]"/>
+      <dgm:spPr/>
+      <dgm:t>
+        <a:bodyPr/>
+        <a:lstStyle/>
+        <a:p>
+          <a:r>
+            <a:rPr lang="en-GB" dirty="0"/>
+            <a:t>All other chapters at "Lots of SME feedback" or better</a:t>
+          </a:r>
+        </a:p>
+      </dgm:t>
+    </dgm:pt>
+    <dgm:pt modelId="{DA8B308B-E247-944E-A621-8150EA718556}" type="parTrans" cxnId="{73ED9D5A-F09B-9C4C-A07D-46CD25618CEC}">
+      <dgm:prSet/>
+      <dgm:spPr/>
+      <dgm:t>
+        <a:bodyPr/>
+        <a:lstStyle/>
+        <a:p>
+          <a:endParaRPr lang="en-GB"/>
+        </a:p>
+      </dgm:t>
+    </dgm:pt>
+    <dgm:pt modelId="{0FEE11B4-2D90-4C42-98E1-D9EEEC68621C}" type="sibTrans" cxnId="{73ED9D5A-F09B-9C4C-A07D-46CD25618CEC}">
+      <dgm:prSet/>
+      <dgm:spPr/>
+      <dgm:t>
+        <a:bodyPr/>
+        <a:lstStyle/>
+        <a:p>
+          <a:endParaRPr lang="en-GB"/>
+        </a:p>
+      </dgm:t>
+    </dgm:pt>
+    <dgm:pt modelId="{32345713-D1E2-DD45-A7D5-1E0B73484EB3}">
+      <dgm:prSet phldrT="[Text]"/>
+      <dgm:spPr/>
+      <dgm:t>
+        <a:bodyPr/>
+        <a:lstStyle/>
+        <a:p>
+          <a:r>
+            <a:rPr lang="en-GB" dirty="0"/>
+            <a:t>Mapping of specification to RM Infrastructure Profiles included</a:t>
+          </a:r>
+        </a:p>
+      </dgm:t>
+    </dgm:pt>
+    <dgm:pt modelId="{909F91E8-758A-C547-B85A-B4180D0C532C}" type="parTrans" cxnId="{DA260700-17CE-B94B-AA6B-C95F311CD4E4}">
+      <dgm:prSet/>
+      <dgm:spPr/>
+      <dgm:t>
+        <a:bodyPr/>
+        <a:lstStyle/>
+        <a:p>
+          <a:endParaRPr lang="en-GB"/>
+        </a:p>
+      </dgm:t>
+    </dgm:pt>
+    <dgm:pt modelId="{AAF2275B-5EBD-9641-A7E0-915F5BD29C6F}" type="sibTrans" cxnId="{DA260700-17CE-B94B-AA6B-C95F311CD4E4}">
+      <dgm:prSet/>
+      <dgm:spPr/>
+      <dgm:t>
+        <a:bodyPr/>
+        <a:lstStyle/>
+        <a:p>
+          <a:endParaRPr lang="en-GB"/>
+        </a:p>
+      </dgm:t>
+    </dgm:pt>
+    <dgm:pt modelId="{23FA0D5C-0197-2944-A5C8-19189213DB5B}" type="pres">
+      <dgm:prSet presAssocID="{A35D7A88-9133-694F-B399-45807959694F}" presName="Name0" presStyleCnt="0">
+        <dgm:presLayoutVars>
+          <dgm:dir/>
+          <dgm:animLvl val="lvl"/>
+          <dgm:resizeHandles val="exact"/>
+        </dgm:presLayoutVars>
+      </dgm:prSet>
+      <dgm:spPr/>
+    </dgm:pt>
+    <dgm:pt modelId="{1A22594E-C8FB-D94B-9096-0583C20536F3}" type="pres">
+      <dgm:prSet presAssocID="{F6071E1C-EDAC-9A40-920E-6396D1F3F8B6}" presName="composite" presStyleCnt="0"/>
+      <dgm:spPr/>
+    </dgm:pt>
+    <dgm:pt modelId="{8E556C75-6679-644B-807C-21BB2C474F56}" type="pres">
+      <dgm:prSet presAssocID="{F6071E1C-EDAC-9A40-920E-6396D1F3F8B6}" presName="parTx" presStyleLbl="alignNode1" presStyleIdx="0" presStyleCnt="3">
+        <dgm:presLayoutVars>
+          <dgm:chMax val="0"/>
+          <dgm:chPref val="0"/>
+          <dgm:bulletEnabled val="1"/>
+        </dgm:presLayoutVars>
+      </dgm:prSet>
+      <dgm:spPr/>
+    </dgm:pt>
+    <dgm:pt modelId="{A924A376-1AFF-B249-A073-BE4BC22C232A}" type="pres">
+      <dgm:prSet presAssocID="{F6071E1C-EDAC-9A40-920E-6396D1F3F8B6}" presName="desTx" presStyleLbl="alignAccFollowNode1" presStyleIdx="0" presStyleCnt="3">
+        <dgm:presLayoutVars>
+          <dgm:bulletEnabled val="1"/>
+        </dgm:presLayoutVars>
+      </dgm:prSet>
+      <dgm:spPr/>
+    </dgm:pt>
+    <dgm:pt modelId="{AB1B2BDC-4FAB-AB48-B2CB-9A5C458985E4}" type="pres">
+      <dgm:prSet presAssocID="{14358919-DA4D-1D41-A664-4A9CD28B0FE9}" presName="space" presStyleCnt="0"/>
+      <dgm:spPr/>
+    </dgm:pt>
+    <dgm:pt modelId="{875E6A7F-0A9A-0B42-988C-D4EFC4D15B45}" type="pres">
+      <dgm:prSet presAssocID="{E29E2A27-8533-E24F-8C31-5B9521B1439F}" presName="composite" presStyleCnt="0"/>
+      <dgm:spPr/>
+    </dgm:pt>
+    <dgm:pt modelId="{73CC7069-E204-0A47-9A88-7F587A301723}" type="pres">
+      <dgm:prSet presAssocID="{E29E2A27-8533-E24F-8C31-5B9521B1439F}" presName="parTx" presStyleLbl="alignNode1" presStyleIdx="1" presStyleCnt="3">
+        <dgm:presLayoutVars>
+          <dgm:chMax val="0"/>
+          <dgm:chPref val="0"/>
+          <dgm:bulletEnabled val="1"/>
+        </dgm:presLayoutVars>
+      </dgm:prSet>
+      <dgm:spPr/>
+    </dgm:pt>
+    <dgm:pt modelId="{1707C938-BFB5-BC42-8771-DAEA58EA8DA8}" type="pres">
+      <dgm:prSet presAssocID="{E29E2A27-8533-E24F-8C31-5B9521B1439F}" presName="desTx" presStyleLbl="alignAccFollowNode1" presStyleIdx="1" presStyleCnt="3">
+        <dgm:presLayoutVars>
+          <dgm:bulletEnabled val="1"/>
+        </dgm:presLayoutVars>
+      </dgm:prSet>
+      <dgm:spPr/>
+    </dgm:pt>
+    <dgm:pt modelId="{91CD1BBC-0D9F-0A4A-8220-7D20667F9911}" type="pres">
+      <dgm:prSet presAssocID="{8EEB82E9-666C-3146-88B9-7686E6360F82}" presName="space" presStyleCnt="0"/>
+      <dgm:spPr/>
+    </dgm:pt>
+    <dgm:pt modelId="{EF55E5B8-77A4-3E45-B9EB-1177CAFFA2CF}" type="pres">
+      <dgm:prSet presAssocID="{38B9CEC9-CE5B-5C4B-BB14-05AD30CEFB16}" presName="composite" presStyleCnt="0"/>
+      <dgm:spPr/>
+    </dgm:pt>
+    <dgm:pt modelId="{60720EE3-9CC1-1242-B5CD-82C76E3DFCF1}" type="pres">
+      <dgm:prSet presAssocID="{38B9CEC9-CE5B-5C4B-BB14-05AD30CEFB16}" presName="parTx" presStyleLbl="alignNode1" presStyleIdx="2" presStyleCnt="3">
+        <dgm:presLayoutVars>
+          <dgm:chMax val="0"/>
+          <dgm:chPref val="0"/>
+          <dgm:bulletEnabled val="1"/>
+        </dgm:presLayoutVars>
+      </dgm:prSet>
+      <dgm:spPr/>
+    </dgm:pt>
+    <dgm:pt modelId="{FB02936D-9138-E541-868F-238A92445032}" type="pres">
+      <dgm:prSet presAssocID="{38B9CEC9-CE5B-5C4B-BB14-05AD30CEFB16}" presName="desTx" presStyleLbl="alignAccFollowNode1" presStyleIdx="2" presStyleCnt="3">
+        <dgm:presLayoutVars>
+          <dgm:bulletEnabled val="1"/>
+        </dgm:presLayoutVars>
+      </dgm:prSet>
+      <dgm:spPr/>
+    </dgm:pt>
+  </dgm:ptLst>
+  <dgm:cxnLst>
+    <dgm:cxn modelId="{DA260700-17CE-B94B-AA6B-C95F311CD4E4}" srcId="{38B9CEC9-CE5B-5C4B-BB14-05AD30CEFB16}" destId="{32345713-D1E2-DD45-A7D5-1E0B73484EB3}" srcOrd="1" destOrd="0" parTransId="{909F91E8-758A-C547-B85A-B4180D0C532C}" sibTransId="{AAF2275B-5EBD-9641-A7E0-915F5BD29C6F}"/>
+    <dgm:cxn modelId="{9094B106-AE32-1F4B-AAC1-A6787A1B5D54}" srcId="{A35D7A88-9133-694F-B399-45807959694F}" destId="{E29E2A27-8533-E24F-8C31-5B9521B1439F}" srcOrd="1" destOrd="0" parTransId="{9F65CE4E-3F27-574B-8BF9-5777868BAB69}" sibTransId="{8EEB82E9-666C-3146-88B9-7686E6360F82}"/>
+    <dgm:cxn modelId="{0989B610-916F-E94B-B537-014828527B9D}" srcId="{E29E2A27-8533-E24F-8C31-5B9521B1439F}" destId="{A42F1D9D-E815-A840-B21A-C8A308A1B242}" srcOrd="0" destOrd="0" parTransId="{10F67730-0A55-0E47-B0C8-495B065B6AAE}" sibTransId="{59DC6480-6842-1E42-AD02-3E23098B1587}"/>
+    <dgm:cxn modelId="{AF100C21-C138-BB4F-A0B0-B583DA2BCD9A}" type="presOf" srcId="{502ABEF5-7782-A741-AC6F-58A53F775AD3}" destId="{1707C938-BFB5-BC42-8771-DAEA58EA8DA8}" srcOrd="0" destOrd="1" presId="urn:microsoft.com/office/officeart/2005/8/layout/hList1"/>
+    <dgm:cxn modelId="{B3330C26-D38A-304F-9698-5A710021FFA5}" srcId="{A35D7A88-9133-694F-B399-45807959694F}" destId="{38B9CEC9-CE5B-5C4B-BB14-05AD30CEFB16}" srcOrd="2" destOrd="0" parTransId="{960ABDB2-224B-2E47-9C3A-81C29589C852}" sibTransId="{92693703-2B0C-9D43-AB0A-839797ADE0B9}"/>
+    <dgm:cxn modelId="{FD8EA629-7407-DE4E-9D11-2F61E5BDA84F}" type="presOf" srcId="{38B9CEC9-CE5B-5C4B-BB14-05AD30CEFB16}" destId="{60720EE3-9CC1-1242-B5CD-82C76E3DFCF1}" srcOrd="0" destOrd="0" presId="urn:microsoft.com/office/officeart/2005/8/layout/hList1"/>
+    <dgm:cxn modelId="{9822DB2E-1A45-EA43-873A-798EFDFAAFEA}" srcId="{F6071E1C-EDAC-9A40-920E-6396D1F3F8B6}" destId="{8E9C75FF-DB25-164E-A506-DC6D3BD6B9F9}" srcOrd="1" destOrd="0" parTransId="{D5534814-DD98-9B4A-969A-C516DAF4A0C6}" sibTransId="{13CA365F-E908-194F-9A99-1F8B0D6C17A9}"/>
+    <dgm:cxn modelId="{7D568038-554A-1942-9671-9E17579025B6}" type="presOf" srcId="{8DDEE7E0-DDB7-A24B-89B2-ADACF1815350}" destId="{FB02936D-9138-E541-868F-238A92445032}" srcOrd="0" destOrd="0" presId="urn:microsoft.com/office/officeart/2005/8/layout/hList1"/>
+    <dgm:cxn modelId="{9C9CA33B-94FA-944E-8B82-BCE120CA75FC}" type="presOf" srcId="{A42F1D9D-E815-A840-B21A-C8A308A1B242}" destId="{1707C938-BFB5-BC42-8771-DAEA58EA8DA8}" srcOrd="0" destOrd="0" presId="urn:microsoft.com/office/officeart/2005/8/layout/hList1"/>
+    <dgm:cxn modelId="{7380BC42-2D37-E747-B2C4-31F0A7DF3963}" srcId="{38B9CEC9-CE5B-5C4B-BB14-05AD30CEFB16}" destId="{8DDEE7E0-DDB7-A24B-89B2-ADACF1815350}" srcOrd="0" destOrd="0" parTransId="{4B5C4B37-5F9D-864F-A390-04545835A47D}" sibTransId="{4EF6A7EA-1061-834F-976A-042DFFF32111}"/>
+    <dgm:cxn modelId="{73ED9D5A-F09B-9C4C-A07D-46CD25618CEC}" srcId="{E29E2A27-8533-E24F-8C31-5B9521B1439F}" destId="{502ABEF5-7782-A741-AC6F-58A53F775AD3}" srcOrd="1" destOrd="0" parTransId="{DA8B308B-E247-944E-A621-8150EA718556}" sibTransId="{0FEE11B4-2D90-4C42-98E1-D9EEEC68621C}"/>
+    <dgm:cxn modelId="{C05F9B6C-1B06-1D4C-929B-E1475DEFCA56}" srcId="{A35D7A88-9133-694F-B399-45807959694F}" destId="{F6071E1C-EDAC-9A40-920E-6396D1F3F8B6}" srcOrd="0" destOrd="0" parTransId="{B11FCE09-F120-8B49-AA5E-D514E812025E}" sibTransId="{14358919-DA4D-1D41-A664-4A9CD28B0FE9}"/>
+    <dgm:cxn modelId="{990DE37D-6CEE-8349-BF60-7F61A7416952}" type="presOf" srcId="{32345713-D1E2-DD45-A7D5-1E0B73484EB3}" destId="{FB02936D-9138-E541-868F-238A92445032}" srcOrd="0" destOrd="1" presId="urn:microsoft.com/office/officeart/2005/8/layout/hList1"/>
+    <dgm:cxn modelId="{8592FE85-E4E9-8B48-A407-6DADD09EA5B1}" srcId="{F6071E1C-EDAC-9A40-920E-6396D1F3F8B6}" destId="{77355CEE-F4FB-B145-BA7B-0969D50CE212}" srcOrd="0" destOrd="0" parTransId="{F2BDCC11-56D3-4442-A429-5D06472DF069}" sibTransId="{E6C3A3F3-286E-1A48-A36D-BD1179C07AFF}"/>
+    <dgm:cxn modelId="{8C36C4AB-1953-C244-91AE-167DEB852B08}" type="presOf" srcId="{8E9C75FF-DB25-164E-A506-DC6D3BD6B9F9}" destId="{A924A376-1AFF-B249-A073-BE4BC22C232A}" srcOrd="0" destOrd="1" presId="urn:microsoft.com/office/officeart/2005/8/layout/hList1"/>
+    <dgm:cxn modelId="{25D9F6AB-861C-FB4A-88B4-6A7084DC8BD9}" type="presOf" srcId="{77355CEE-F4FB-B145-BA7B-0969D50CE212}" destId="{A924A376-1AFF-B249-A073-BE4BC22C232A}" srcOrd="0" destOrd="0" presId="urn:microsoft.com/office/officeart/2005/8/layout/hList1"/>
+    <dgm:cxn modelId="{37900FAC-31E5-D040-B661-19590CFA8636}" type="presOf" srcId="{A35D7A88-9133-694F-B399-45807959694F}" destId="{23FA0D5C-0197-2944-A5C8-19189213DB5B}" srcOrd="0" destOrd="0" presId="urn:microsoft.com/office/officeart/2005/8/layout/hList1"/>
+    <dgm:cxn modelId="{8B3BE7C1-8C12-644A-ADCE-FC0DC4A865DA}" type="presOf" srcId="{E29E2A27-8533-E24F-8C31-5B9521B1439F}" destId="{73CC7069-E204-0A47-9A88-7F587A301723}" srcOrd="0" destOrd="0" presId="urn:microsoft.com/office/officeart/2005/8/layout/hList1"/>
+    <dgm:cxn modelId="{E488FCC3-DA08-2A42-A8FF-B2EC61CF377E}" type="presOf" srcId="{F6071E1C-EDAC-9A40-920E-6396D1F3F8B6}" destId="{8E556C75-6679-644B-807C-21BB2C474F56}" srcOrd="0" destOrd="0" presId="urn:microsoft.com/office/officeart/2005/8/layout/hList1"/>
+    <dgm:cxn modelId="{0E430635-6EB8-0549-9DAE-EB2F11183DED}" type="presParOf" srcId="{23FA0D5C-0197-2944-A5C8-19189213DB5B}" destId="{1A22594E-C8FB-D94B-9096-0583C20536F3}" srcOrd="0" destOrd="0" presId="urn:microsoft.com/office/officeart/2005/8/layout/hList1"/>
+    <dgm:cxn modelId="{58A6B990-4382-5A40-93CC-6162412AAC65}" type="presParOf" srcId="{1A22594E-C8FB-D94B-9096-0583C20536F3}" destId="{8E556C75-6679-644B-807C-21BB2C474F56}" srcOrd="0" destOrd="0" presId="urn:microsoft.com/office/officeart/2005/8/layout/hList1"/>
+    <dgm:cxn modelId="{D2089C64-1DCD-D449-9AF6-517645BDD7D2}" type="presParOf" srcId="{1A22594E-C8FB-D94B-9096-0583C20536F3}" destId="{A924A376-1AFF-B249-A073-BE4BC22C232A}" srcOrd="1" destOrd="0" presId="urn:microsoft.com/office/officeart/2005/8/layout/hList1"/>
+    <dgm:cxn modelId="{0B867FAC-C0A1-0147-B03A-DABA6E436540}" type="presParOf" srcId="{23FA0D5C-0197-2944-A5C8-19189213DB5B}" destId="{AB1B2BDC-4FAB-AB48-B2CB-9A5C458985E4}" srcOrd="1" destOrd="0" presId="urn:microsoft.com/office/officeart/2005/8/layout/hList1"/>
+    <dgm:cxn modelId="{EF66201B-D35A-CB40-B823-C0D0F5B65893}" type="presParOf" srcId="{23FA0D5C-0197-2944-A5C8-19189213DB5B}" destId="{875E6A7F-0A9A-0B42-988C-D4EFC4D15B45}" srcOrd="2" destOrd="0" presId="urn:microsoft.com/office/officeart/2005/8/layout/hList1"/>
+    <dgm:cxn modelId="{521A9494-455E-6644-8D6C-ED62F342FA27}" type="presParOf" srcId="{875E6A7F-0A9A-0B42-988C-D4EFC4D15B45}" destId="{73CC7069-E204-0A47-9A88-7F587A301723}" srcOrd="0" destOrd="0" presId="urn:microsoft.com/office/officeart/2005/8/layout/hList1"/>
+    <dgm:cxn modelId="{4A94898F-B1AB-CA4E-82BA-5CA61A6E0650}" type="presParOf" srcId="{875E6A7F-0A9A-0B42-988C-D4EFC4D15B45}" destId="{1707C938-BFB5-BC42-8771-DAEA58EA8DA8}" srcOrd="1" destOrd="0" presId="urn:microsoft.com/office/officeart/2005/8/layout/hList1"/>
+    <dgm:cxn modelId="{84E5D496-E1A8-9441-AFFB-B095721E22B1}" type="presParOf" srcId="{23FA0D5C-0197-2944-A5C8-19189213DB5B}" destId="{91CD1BBC-0D9F-0A4A-8220-7D20667F9911}" srcOrd="3" destOrd="0" presId="urn:microsoft.com/office/officeart/2005/8/layout/hList1"/>
+    <dgm:cxn modelId="{1D5A5C35-493C-DD4C-8673-35E4EFC34D2C}" type="presParOf" srcId="{23FA0D5C-0197-2944-A5C8-19189213DB5B}" destId="{EF55E5B8-77A4-3E45-B9EB-1177CAFFA2CF}" srcOrd="4" destOrd="0" presId="urn:microsoft.com/office/officeart/2005/8/layout/hList1"/>
+    <dgm:cxn modelId="{6A6806CF-43D5-D94B-9544-A0CF0126565E}" type="presParOf" srcId="{EF55E5B8-77A4-3E45-B9EB-1177CAFFA2CF}" destId="{60720EE3-9CC1-1242-B5CD-82C76E3DFCF1}" srcOrd="0" destOrd="0" presId="urn:microsoft.com/office/officeart/2005/8/layout/hList1"/>
+    <dgm:cxn modelId="{B87AE40E-7836-9B4D-B6EA-188C2562B5ED}" type="presParOf" srcId="{EF55E5B8-77A4-3E45-B9EB-1177CAFFA2CF}" destId="{FB02936D-9138-E541-868F-238A92445032}" srcOrd="1" destOrd="0" presId="urn:microsoft.com/office/officeart/2005/8/layout/hList1"/>
+  </dgm:cxnLst>
+  <dgm:bg/>
+  <dgm:whole/>
+  <dgm:extLst>
+    <a:ext uri="http://schemas.microsoft.com/office/drawing/2008/diagram">
+      <dsp:dataModelExt xmlns:dsp="http://schemas.microsoft.com/office/drawing/2008/diagram" relId="rId6" minVer="http://schemas.openxmlformats.org/drawingml/2006/diagram"/>
+    </a:ext>
+  </dgm:extLst>
+</dgm:dataModel>
+</file>
+
+<file path=ppt/diagrams/drawing1.xml><?xml version="1.0" encoding="utf-8"?>
+<dsp:drawing xmlns:dgm="http://schemas.openxmlformats.org/drawingml/2006/diagram" xmlns:dsp="http://schemas.microsoft.com/office/drawing/2008/diagram" xmlns:a="http://schemas.openxmlformats.org/drawingml/2006/main">
+  <dsp:spTree>
+    <dsp:nvGrpSpPr>
+      <dsp:cNvPr id="0" name=""/>
+      <dsp:cNvGrpSpPr/>
+    </dsp:nvGrpSpPr>
+    <dsp:grpSpPr/>
+    <dsp:sp modelId="{8E556C75-6679-644B-807C-21BB2C474F56}">
+      <dsp:nvSpPr>
+        <dsp:cNvPr id="0" name=""/>
+        <dsp:cNvSpPr/>
+      </dsp:nvSpPr>
+      <dsp:spPr>
+        <a:xfrm>
+          <a:off x="5434" y="64105"/>
+          <a:ext cx="5298406" cy="1568760"/>
+        </a:xfrm>
+        <a:prstGeom prst="rect">
+          <a:avLst/>
+        </a:prstGeom>
+        <a:solidFill>
+          <a:schemeClr val="accent1">
+            <a:hueOff val="0"/>
+            <a:satOff val="0"/>
+            <a:lumOff val="0"/>
+            <a:alphaOff val="0"/>
+          </a:schemeClr>
+        </a:solidFill>
+        <a:ln w="12700" cap="flat" cmpd="sng" algn="ctr">
+          <a:solidFill>
+            <a:schemeClr val="accent1">
+              <a:hueOff val="0"/>
+              <a:satOff val="0"/>
+              <a:lumOff val="0"/>
+              <a:alphaOff val="0"/>
+            </a:schemeClr>
+          </a:solidFill>
+          <a:prstDash val="solid"/>
+          <a:miter lim="800000"/>
+        </a:ln>
+        <a:effectLst/>
+      </dsp:spPr>
+      <dsp:style>
+        <a:lnRef idx="2">
+          <a:scrgbClr r="0" g="0" b="0"/>
+        </a:lnRef>
+        <a:fillRef idx="1">
+          <a:scrgbClr r="0" g="0" b="0"/>
+        </a:fillRef>
+        <a:effectRef idx="0">
+          <a:scrgbClr r="0" g="0" b="0"/>
+        </a:effectRef>
+        <a:fontRef idx="minor">
+          <a:schemeClr val="lt1"/>
+        </a:fontRef>
+      </dsp:style>
+      <dsp:txBody>
+        <a:bodyPr spcFirstLastPara="0" vert="horz" wrap="square" lIns="305816" tIns="174752" rIns="305816" bIns="174752" numCol="1" spcCol="1270" anchor="ctr" anchorCtr="0">
+          <a:noAutofit/>
+        </a:bodyPr>
+        <a:lstStyle/>
+        <a:p>
+          <a:pPr marL="0" lvl="0" indent="0" algn="ctr" defTabSz="1911350">
+            <a:lnSpc>
+              <a:spcPct val="90000"/>
+            </a:lnSpc>
+            <a:spcBef>
+              <a:spcPct val="0"/>
+            </a:spcBef>
+            <a:spcAft>
+              <a:spcPct val="35000"/>
+            </a:spcAft>
+            <a:buNone/>
+          </a:pPr>
+          <a:r>
+            <a:rPr lang="en-GB" sz="4300" kern="1200" dirty="0" err="1"/>
+            <a:t>Snezka</a:t>
+          </a:r>
+          <a:r>
+            <a:rPr lang="en-GB" sz="4300" kern="1200" dirty="0"/>
+            <a:t> Release</a:t>
+          </a:r>
+          <a:br>
+            <a:rPr lang="en-GB" sz="4300" kern="1200" dirty="0"/>
+          </a:br>
+          <a:r>
+            <a:rPr lang="en-GB" sz="4300" kern="1200" dirty="0"/>
+            <a:t>January 2020</a:t>
+          </a:r>
+        </a:p>
+      </dsp:txBody>
+      <dsp:txXfrm>
+        <a:off x="5434" y="64105"/>
+        <a:ext cx="5298406" cy="1568760"/>
+      </dsp:txXfrm>
+    </dsp:sp>
+    <dsp:sp modelId="{A924A376-1AFF-B249-A073-BE4BC22C232A}">
+      <dsp:nvSpPr>
+        <dsp:cNvPr id="0" name=""/>
+        <dsp:cNvSpPr/>
+      </dsp:nvSpPr>
+      <dsp:spPr>
+        <a:xfrm>
+          <a:off x="5434" y="1632866"/>
+          <a:ext cx="5298406" cy="4913206"/>
+        </a:xfrm>
+        <a:prstGeom prst="rect">
+          <a:avLst/>
+        </a:prstGeom>
+        <a:solidFill>
+          <a:schemeClr val="accent1">
+            <a:alpha val="90000"/>
+            <a:tint val="40000"/>
+            <a:hueOff val="0"/>
+            <a:satOff val="0"/>
+            <a:lumOff val="0"/>
+            <a:alphaOff val="0"/>
+          </a:schemeClr>
+        </a:solidFill>
+        <a:ln w="12700" cap="flat" cmpd="sng" algn="ctr">
+          <a:solidFill>
+            <a:schemeClr val="accent1">
+              <a:alpha val="90000"/>
+              <a:tint val="40000"/>
+              <a:hueOff val="0"/>
+              <a:satOff val="0"/>
+              <a:lumOff val="0"/>
+              <a:alphaOff val="0"/>
+            </a:schemeClr>
+          </a:solidFill>
+          <a:prstDash val="solid"/>
+          <a:miter lim="800000"/>
+        </a:ln>
+        <a:effectLst/>
+      </dsp:spPr>
+      <dsp:style>
+        <a:lnRef idx="2">
+          <a:scrgbClr r="0" g="0" b="0"/>
+        </a:lnRef>
+        <a:fillRef idx="1">
+          <a:scrgbClr r="0" g="0" b="0"/>
+        </a:fillRef>
+        <a:effectRef idx="0">
+          <a:scrgbClr r="0" g="0" b="0"/>
+        </a:effectRef>
+        <a:fontRef idx="minor"/>
+      </dsp:style>
+      <dsp:txBody>
+        <a:bodyPr spcFirstLastPara="0" vert="horz" wrap="square" lIns="229362" tIns="229362" rIns="305816" bIns="344043" numCol="1" spcCol="1270" anchor="t" anchorCtr="0">
+          <a:noAutofit/>
+        </a:bodyPr>
+        <a:lstStyle/>
+        <a:p>
+          <a:pPr marL="285750" lvl="1" indent="-285750" algn="l" defTabSz="1911350">
+            <a:lnSpc>
+              <a:spcPct val="90000"/>
+            </a:lnSpc>
+            <a:spcBef>
+              <a:spcPct val="0"/>
+            </a:spcBef>
+            <a:spcAft>
+              <a:spcPct val="15000"/>
+            </a:spcAft>
+            <a:buChar char="•"/>
+          </a:pPr>
+          <a:r>
+            <a:rPr lang="en-GB" sz="4300" kern="1200" dirty="0"/>
+            <a:t>Table of Contents complete for all chapters</a:t>
+          </a:r>
+        </a:p>
+        <a:p>
+          <a:pPr marL="285750" lvl="1" indent="-285750" algn="l" defTabSz="1911350">
+            <a:lnSpc>
+              <a:spcPct val="90000"/>
+            </a:lnSpc>
+            <a:spcBef>
+              <a:spcPct val="0"/>
+            </a:spcBef>
+            <a:spcAft>
+              <a:spcPct val="15000"/>
+            </a:spcAft>
+            <a:buChar char="•"/>
+          </a:pPr>
+          <a:r>
+            <a:rPr lang="en-GB" sz="4300" kern="1200" dirty="0"/>
+            <a:t>Chapters 1,2,3,6 at “Lots of SME feedback” or better</a:t>
+          </a:r>
+        </a:p>
+      </dsp:txBody>
+      <dsp:txXfrm>
+        <a:off x="5434" y="1632866"/>
+        <a:ext cx="5298406" cy="4913206"/>
+      </dsp:txXfrm>
+    </dsp:sp>
+    <dsp:sp modelId="{73CC7069-E204-0A47-9A88-7F587A301723}">
+      <dsp:nvSpPr>
+        <dsp:cNvPr id="0" name=""/>
+        <dsp:cNvSpPr/>
+      </dsp:nvSpPr>
+      <dsp:spPr>
+        <a:xfrm>
+          <a:off x="6045617" y="64105"/>
+          <a:ext cx="5298406" cy="1568760"/>
+        </a:xfrm>
+        <a:prstGeom prst="rect">
+          <a:avLst/>
+        </a:prstGeom>
+        <a:solidFill>
+          <a:schemeClr val="accent1">
+            <a:hueOff val="0"/>
+            <a:satOff val="0"/>
+            <a:lumOff val="0"/>
+            <a:alphaOff val="0"/>
+          </a:schemeClr>
+        </a:solidFill>
+        <a:ln w="12700" cap="flat" cmpd="sng" algn="ctr">
+          <a:solidFill>
+            <a:schemeClr val="accent1">
+              <a:hueOff val="0"/>
+              <a:satOff val="0"/>
+              <a:lumOff val="0"/>
+              <a:alphaOff val="0"/>
+            </a:schemeClr>
+          </a:solidFill>
+          <a:prstDash val="solid"/>
+          <a:miter lim="800000"/>
+        </a:ln>
+        <a:effectLst/>
+      </dsp:spPr>
+      <dsp:style>
+        <a:lnRef idx="2">
+          <a:scrgbClr r="0" g="0" b="0"/>
+        </a:lnRef>
+        <a:fillRef idx="1">
+          <a:scrgbClr r="0" g="0" b="0"/>
+        </a:fillRef>
+        <a:effectRef idx="0">
+          <a:scrgbClr r="0" g="0" b="0"/>
+        </a:effectRef>
+        <a:fontRef idx="minor">
+          <a:schemeClr val="lt1"/>
+        </a:fontRef>
+      </dsp:style>
+      <dsp:txBody>
+        <a:bodyPr spcFirstLastPara="0" vert="horz" wrap="square" lIns="305816" tIns="174752" rIns="305816" bIns="174752" numCol="1" spcCol="1270" anchor="ctr" anchorCtr="0">
+          <a:noAutofit/>
+        </a:bodyPr>
+        <a:lstStyle/>
+        <a:p>
+          <a:pPr marL="0" lvl="0" indent="0" algn="ctr" defTabSz="1911350">
+            <a:lnSpc>
+              <a:spcPct val="90000"/>
+            </a:lnSpc>
+            <a:spcBef>
+              <a:spcPct val="0"/>
+            </a:spcBef>
+            <a:spcAft>
+              <a:spcPct val="35000"/>
+            </a:spcAft>
+            <a:buNone/>
+          </a:pPr>
+          <a:r>
+            <a:rPr lang="en-GB" sz="4300" kern="1200" dirty="0"/>
+            <a:t>TBC Release </a:t>
+          </a:r>
+          <a:br>
+            <a:rPr lang="en-GB" sz="4300" kern="1200" dirty="0"/>
+          </a:br>
+          <a:r>
+            <a:rPr lang="en-GB" sz="4300" kern="1200" dirty="0"/>
+            <a:t>April 2020</a:t>
+          </a:r>
+        </a:p>
+      </dsp:txBody>
+      <dsp:txXfrm>
+        <a:off x="6045617" y="64105"/>
+        <a:ext cx="5298406" cy="1568760"/>
+      </dsp:txXfrm>
+    </dsp:sp>
+    <dsp:sp modelId="{1707C938-BFB5-BC42-8771-DAEA58EA8DA8}">
+      <dsp:nvSpPr>
+        <dsp:cNvPr id="0" name=""/>
+        <dsp:cNvSpPr/>
+      </dsp:nvSpPr>
+      <dsp:spPr>
+        <a:xfrm>
+          <a:off x="6045617" y="1632866"/>
+          <a:ext cx="5298406" cy="4913206"/>
+        </a:xfrm>
+        <a:prstGeom prst="rect">
+          <a:avLst/>
+        </a:prstGeom>
+        <a:solidFill>
+          <a:schemeClr val="accent1">
+            <a:alpha val="90000"/>
+            <a:tint val="40000"/>
+            <a:hueOff val="0"/>
+            <a:satOff val="0"/>
+            <a:lumOff val="0"/>
+            <a:alphaOff val="0"/>
+          </a:schemeClr>
+        </a:solidFill>
+        <a:ln w="12700" cap="flat" cmpd="sng" algn="ctr">
+          <a:solidFill>
+            <a:schemeClr val="accent1">
+              <a:alpha val="90000"/>
+              <a:tint val="40000"/>
+              <a:hueOff val="0"/>
+              <a:satOff val="0"/>
+              <a:lumOff val="0"/>
+              <a:alphaOff val="0"/>
+            </a:schemeClr>
+          </a:solidFill>
+          <a:prstDash val="solid"/>
+          <a:miter lim="800000"/>
+        </a:ln>
+        <a:effectLst/>
+      </dsp:spPr>
+      <dsp:style>
+        <a:lnRef idx="2">
+          <a:scrgbClr r="0" g="0" b="0"/>
+        </a:lnRef>
+        <a:fillRef idx="1">
+          <a:scrgbClr r="0" g="0" b="0"/>
+        </a:fillRef>
+        <a:effectRef idx="0">
+          <a:scrgbClr r="0" g="0" b="0"/>
+        </a:effectRef>
+        <a:fontRef idx="minor"/>
+      </dsp:style>
+      <dsp:txBody>
+        <a:bodyPr spcFirstLastPara="0" vert="horz" wrap="square" lIns="229362" tIns="229362" rIns="305816" bIns="344043" numCol="1" spcCol="1270" anchor="t" anchorCtr="0">
+          <a:noAutofit/>
+        </a:bodyPr>
+        <a:lstStyle/>
+        <a:p>
+          <a:pPr marL="285750" lvl="1" indent="-285750" algn="l" defTabSz="1911350">
+            <a:lnSpc>
+              <a:spcPct val="90000"/>
+            </a:lnSpc>
+            <a:spcBef>
+              <a:spcPct val="0"/>
+            </a:spcBef>
+            <a:spcAft>
+              <a:spcPct val="15000"/>
+            </a:spcAft>
+            <a:buChar char="•"/>
+          </a:pPr>
+          <a:r>
+            <a:rPr lang="en-GB" sz="4300" kern="1200" dirty="0"/>
+            <a:t>Chapter 2 (Requirements) at “Complete”</a:t>
+          </a:r>
+        </a:p>
+        <a:p>
+          <a:pPr marL="285750" lvl="1" indent="-285750" algn="l" defTabSz="1911350">
+            <a:lnSpc>
+              <a:spcPct val="90000"/>
+            </a:lnSpc>
+            <a:spcBef>
+              <a:spcPct val="0"/>
+            </a:spcBef>
+            <a:spcAft>
+              <a:spcPct val="15000"/>
+            </a:spcAft>
+            <a:buChar char="•"/>
+          </a:pPr>
+          <a:r>
+            <a:rPr lang="en-GB" sz="4300" kern="1200" dirty="0"/>
+            <a:t>All other chapters at "Lots of SME feedback" or better</a:t>
+          </a:r>
+        </a:p>
+      </dsp:txBody>
+      <dsp:txXfrm>
+        <a:off x="6045617" y="1632866"/>
+        <a:ext cx="5298406" cy="4913206"/>
+      </dsp:txXfrm>
+    </dsp:sp>
+    <dsp:sp modelId="{60720EE3-9CC1-1242-B5CD-82C76E3DFCF1}">
+      <dsp:nvSpPr>
+        <dsp:cNvPr id="0" name=""/>
+        <dsp:cNvSpPr/>
+      </dsp:nvSpPr>
+      <dsp:spPr>
+        <a:xfrm>
+          <a:off x="12085801" y="64105"/>
+          <a:ext cx="5298406" cy="1568760"/>
+        </a:xfrm>
+        <a:prstGeom prst="rect">
+          <a:avLst/>
+        </a:prstGeom>
+        <a:solidFill>
+          <a:schemeClr val="accent1">
+            <a:hueOff val="0"/>
+            <a:satOff val="0"/>
+            <a:lumOff val="0"/>
+            <a:alphaOff val="0"/>
+          </a:schemeClr>
+        </a:solidFill>
+        <a:ln w="12700" cap="flat" cmpd="sng" algn="ctr">
+          <a:solidFill>
+            <a:schemeClr val="accent1">
+              <a:hueOff val="0"/>
+              <a:satOff val="0"/>
+              <a:lumOff val="0"/>
+              <a:alphaOff val="0"/>
+            </a:schemeClr>
+          </a:solidFill>
+          <a:prstDash val="solid"/>
+          <a:miter lim="800000"/>
+        </a:ln>
+        <a:effectLst/>
+      </dsp:spPr>
+      <dsp:style>
+        <a:lnRef idx="2">
+          <a:scrgbClr r="0" g="0" b="0"/>
+        </a:lnRef>
+        <a:fillRef idx="1">
+          <a:scrgbClr r="0" g="0" b="0"/>
+        </a:fillRef>
+        <a:effectRef idx="0">
+          <a:scrgbClr r="0" g="0" b="0"/>
+        </a:effectRef>
+        <a:fontRef idx="minor">
+          <a:schemeClr val="lt1"/>
+        </a:fontRef>
+      </dsp:style>
+      <dsp:txBody>
+        <a:bodyPr spcFirstLastPara="0" vert="horz" wrap="square" lIns="305816" tIns="174752" rIns="305816" bIns="174752" numCol="1" spcCol="1270" anchor="ctr" anchorCtr="0">
+          <a:noAutofit/>
+        </a:bodyPr>
+        <a:lstStyle/>
+        <a:p>
+          <a:pPr marL="0" lvl="0" indent="0" algn="ctr" defTabSz="1911350">
+            <a:lnSpc>
+              <a:spcPct val="90000"/>
+            </a:lnSpc>
+            <a:spcBef>
+              <a:spcPct val="0"/>
+            </a:spcBef>
+            <a:spcAft>
+              <a:spcPct val="35000"/>
+            </a:spcAft>
+            <a:buNone/>
+          </a:pPr>
+          <a:r>
+            <a:rPr lang="en-GB" sz="4300" kern="1200" dirty="0"/>
+            <a:t>TBC Release</a:t>
+          </a:r>
+          <a:br>
+            <a:rPr lang="en-GB" sz="4300" kern="1200" dirty="0"/>
+          </a:br>
+          <a:r>
+            <a:rPr lang="en-GB" sz="4300" kern="1200" dirty="0"/>
+            <a:t>July 2020</a:t>
+          </a:r>
+        </a:p>
+      </dsp:txBody>
+      <dsp:txXfrm>
+        <a:off x="12085801" y="64105"/>
+        <a:ext cx="5298406" cy="1568760"/>
+      </dsp:txXfrm>
+    </dsp:sp>
+    <dsp:sp modelId="{FB02936D-9138-E541-868F-238A92445032}">
+      <dsp:nvSpPr>
+        <dsp:cNvPr id="0" name=""/>
+        <dsp:cNvSpPr/>
+      </dsp:nvSpPr>
+      <dsp:spPr>
+        <a:xfrm>
+          <a:off x="12085801" y="1632866"/>
+          <a:ext cx="5298406" cy="4913206"/>
+        </a:xfrm>
+        <a:prstGeom prst="rect">
+          <a:avLst/>
+        </a:prstGeom>
+        <a:solidFill>
+          <a:schemeClr val="accent1">
+            <a:alpha val="90000"/>
+            <a:tint val="40000"/>
+            <a:hueOff val="0"/>
+            <a:satOff val="0"/>
+            <a:lumOff val="0"/>
+            <a:alphaOff val="0"/>
+          </a:schemeClr>
+        </a:solidFill>
+        <a:ln w="12700" cap="flat" cmpd="sng" algn="ctr">
+          <a:solidFill>
+            <a:schemeClr val="accent1">
+              <a:alpha val="90000"/>
+              <a:tint val="40000"/>
+              <a:hueOff val="0"/>
+              <a:satOff val="0"/>
+              <a:lumOff val="0"/>
+              <a:alphaOff val="0"/>
+            </a:schemeClr>
+          </a:solidFill>
+          <a:prstDash val="solid"/>
+          <a:miter lim="800000"/>
+        </a:ln>
+        <a:effectLst/>
+      </dsp:spPr>
+      <dsp:style>
+        <a:lnRef idx="2">
+          <a:scrgbClr r="0" g="0" b="0"/>
+        </a:lnRef>
+        <a:fillRef idx="1">
+          <a:scrgbClr r="0" g="0" b="0"/>
+        </a:fillRef>
+        <a:effectRef idx="0">
+          <a:scrgbClr r="0" g="0" b="0"/>
+        </a:effectRef>
+        <a:fontRef idx="minor"/>
+      </dsp:style>
+      <dsp:txBody>
+        <a:bodyPr spcFirstLastPara="0" vert="horz" wrap="square" lIns="229362" tIns="229362" rIns="305816" bIns="344043" numCol="1" spcCol="1270" anchor="t" anchorCtr="0">
+          <a:noAutofit/>
+        </a:bodyPr>
+        <a:lstStyle/>
+        <a:p>
+          <a:pPr marL="285750" lvl="1" indent="-285750" algn="l" defTabSz="1911350">
+            <a:lnSpc>
+              <a:spcPct val="90000"/>
+            </a:lnSpc>
+            <a:spcBef>
+              <a:spcPct val="0"/>
+            </a:spcBef>
+            <a:spcAft>
+              <a:spcPct val="15000"/>
+            </a:spcAft>
+            <a:buChar char="•"/>
+          </a:pPr>
+          <a:r>
+            <a:rPr lang="en-GB" sz="4300" kern="1200" dirty="0"/>
+            <a:t>Include VM orchestration for CNFs</a:t>
+          </a:r>
+        </a:p>
+        <a:p>
+          <a:pPr marL="285750" lvl="1" indent="-285750" algn="l" defTabSz="1911350">
+            <a:lnSpc>
+              <a:spcPct val="90000"/>
+            </a:lnSpc>
+            <a:spcBef>
+              <a:spcPct val="0"/>
+            </a:spcBef>
+            <a:spcAft>
+              <a:spcPct val="15000"/>
+            </a:spcAft>
+            <a:buChar char="•"/>
+          </a:pPr>
+          <a:r>
+            <a:rPr lang="en-GB" sz="4300" kern="1200" dirty="0"/>
+            <a:t>Mapping of specification to RM Infrastructure Profiles included</a:t>
+          </a:r>
+        </a:p>
+      </dsp:txBody>
+      <dsp:txXfrm>
+        <a:off x="12085801" y="1632866"/>
+        <a:ext cx="5298406" cy="4913206"/>
+      </dsp:txXfrm>
+    </dsp:sp>
+  </dsp:spTree>
+</dsp:drawing>
+</file>
+
+<file path=ppt/diagrams/layout1.xml><?xml version="1.0" encoding="utf-8"?>
+<dgm:layoutDef xmlns:dgm="http://schemas.openxmlformats.org/drawingml/2006/diagram" xmlns:a="http://schemas.openxmlformats.org/drawingml/2006/main" uniqueId="urn:microsoft.com/office/officeart/2005/8/layout/hList1">
+  <dgm:title val=""/>
+  <dgm:desc val=""/>
+  <dgm:catLst>
+    <dgm:cat type="list" pri="5000"/>
+    <dgm:cat type="convert" pri="5000"/>
+  </dgm:catLst>
+  <dgm:sampData>
+    <dgm:dataModel>
+      <dgm:ptLst>
+        <dgm:pt modelId="0" type="doc"/>
+        <dgm:pt modelId="1">
+          <dgm:prSet phldr="1"/>
+        </dgm:pt>
+        <dgm:pt modelId="11">
+          <dgm:prSet phldr="1"/>
+        </dgm:pt>
+        <dgm:pt modelId="12">
+          <dgm:prSet phldr="1"/>
+        </dgm:pt>
+        <dgm:pt modelId="2">
+          <dgm:prSet phldr="1"/>
+        </dgm:pt>
+        <dgm:pt modelId="21">
+          <dgm:prSet phldr="1"/>
+        </dgm:pt>
+        <dgm:pt modelId="22">
+          <dgm:prSet phldr="1"/>
+        </dgm:pt>
+        <dgm:pt modelId="3">
+          <dgm:prSet phldr="1"/>
+        </dgm:pt>
+        <dgm:pt modelId="31">
+          <dgm:prSet phldr="1"/>
+        </dgm:pt>
+        <dgm:pt modelId="32">
+          <dgm:prSet phldr="1"/>
+        </dgm:pt>
+      </dgm:ptLst>
+      <dgm:cxnLst>
+        <dgm:cxn modelId="4" srcId="0" destId="1" srcOrd="0" destOrd="0"/>
+        <dgm:cxn modelId="5" srcId="0" destId="2" srcOrd="1" destOrd="0"/>
+        <dgm:cxn modelId="6" srcId="0" destId="3" srcOrd="2" destOrd="0"/>
+        <dgm:cxn modelId="13" srcId="1" destId="11" srcOrd="0" destOrd="0"/>
+        <dgm:cxn modelId="14" srcId="1" destId="12" srcOrd="1" destOrd="0"/>
+        <dgm:cxn modelId="23" srcId="2" destId="21" srcOrd="0" destOrd="0"/>
+        <dgm:cxn modelId="24" srcId="2" destId="22" srcOrd="1" destOrd="0"/>
+        <dgm:cxn modelId="33" srcId="3" destId="31" srcOrd="0" destOrd="0"/>
+        <dgm:cxn modelId="34" srcId="3" destId="32" srcOrd="1" destOrd="0"/>
+      </dgm:cxnLst>
+      <dgm:bg/>
+      <dgm:whole/>
+    </dgm:dataModel>
+  </dgm:sampData>
+  <dgm:styleData>
+    <dgm:dataModel>
+      <dgm:ptLst>
+        <dgm:pt modelId="0" type="doc"/>
+        <dgm:pt modelId="1">
+          <dgm:prSet phldr="1"/>
+        </dgm:pt>
+        <dgm:pt modelId="2">
+          <dgm:prSet phldr="1"/>
+        </dgm:pt>
+      </dgm:ptLst>
+      <dgm:cxnLst>
+        <dgm:cxn modelId="3" srcId="0" destId="1" srcOrd="0" destOrd="0"/>
+        <dgm:cxn modelId="4" srcId="0" destId="2" srcOrd="1" destOrd="0"/>
+      </dgm:cxnLst>
+      <dgm:bg/>
+      <dgm:whole/>
+    </dgm:dataModel>
+  </dgm:styleData>
+  <dgm:clrData>
+    <dgm:dataModel>
+      <dgm:ptLst>
+        <dgm:pt modelId="0" type="doc"/>
+        <dgm:pt modelId="1">
+          <dgm:prSet phldr="1"/>
+        </dgm:pt>
+        <dgm:pt modelId="2">
+          <dgm:prSet phldr="1"/>
+        </dgm:pt>
+        <dgm:pt modelId="3">
+          <dgm:prSet phldr="1"/>
+        </dgm:pt>
+        <dgm:pt modelId="4">
+          <dgm:prSet phldr="1"/>
+        </dgm:pt>
+      </dgm:ptLst>
+      <dgm:cxnLst>
+        <dgm:cxn modelId="5" srcId="0" destId="1" srcOrd="0" destOrd="0"/>
+        <dgm:cxn modelId="6" srcId="0" destId="2" srcOrd="1" destOrd="0"/>
+        <dgm:cxn modelId="7" srcId="0" destId="3" srcOrd="2" destOrd="0"/>
+        <dgm:cxn modelId="8" srcId="0" destId="4" srcOrd="3" destOrd="0"/>
+      </dgm:cxnLst>
+      <dgm:bg/>
+      <dgm:whole/>
+    </dgm:dataModel>
+  </dgm:clrData>
+  <dgm:layoutNode name="Name0">
+    <dgm:varLst>
+      <dgm:dir/>
+      <dgm:animLvl val="lvl"/>
+      <dgm:resizeHandles val="exact"/>
+    </dgm:varLst>
+    <dgm:choose name="Name1">
+      <dgm:if name="Name2" func="var" arg="dir" op="equ" val="norm">
+        <dgm:alg type="lin"/>
+      </dgm:if>
+      <dgm:else name="Name3">
+        <dgm:alg type="lin">
+          <dgm:param type="linDir" val="fromR"/>
+        </dgm:alg>
+      </dgm:else>
+    </dgm:choose>
+    <dgm:shape xmlns:r="http://schemas.openxmlformats.org/officeDocument/2006/relationships" r:blip="">
+      <dgm:adjLst/>
+    </dgm:shape>
+    <dgm:presOf/>
+    <dgm:constrLst>
+      <dgm:constr type="h" for="ch" forName="composite" refType="h"/>
+      <dgm:constr type="w" for="ch" forName="composite" refType="w"/>
+      <dgm:constr type="w" for="des" forName="parTx"/>
+      <dgm:constr type="h" for="des" forName="parTx" op="equ"/>
+      <dgm:constr type="w" for="des" forName="desTx"/>
+      <dgm:constr type="h" for="des" forName="desTx" op="equ"/>
+      <dgm:constr type="primFontSz" for="des" forName="parTx" val="65"/>
+      <dgm:constr type="secFontSz" for="des" forName="desTx" refType="primFontSz" refFor="des" refForName="parTx" op="equ"/>
+      <dgm:constr type="h" for="des" forName="parTx" refType="primFontSz" refFor="des" refForName="parTx" fact="0.8"/>
+      <dgm:constr type="h" for="des" forName="desTx" refType="primFontSz" refFor="des" refForName="parTx" fact="1.22"/>
+      <dgm:constr type="w" for="ch" forName="space" refType="w" refFor="ch" refForName="composite" op="equ" fact="0.14"/>
+    </dgm:constrLst>
+    <dgm:ruleLst>
+      <dgm:rule type="w" for="ch" forName="composite" val="0" fact="NaN" max="NaN"/>
+      <dgm:rule type="primFontSz" for="des" forName="parTx" val="5" fact="NaN" max="NaN"/>
+    </dgm:ruleLst>
+    <dgm:forEach name="Name4" axis="ch" ptType="node">
+      <dgm:layoutNode name="composite">
+        <dgm:alg type="composite"/>
+        <dgm:shape xmlns:r="http://schemas.openxmlformats.org/officeDocument/2006/relationships" r:blip="">
+          <dgm:adjLst/>
+        </dgm:shape>
+        <dgm:presOf/>
+        <dgm:constrLst>
+          <dgm:constr type="l" for="ch" forName="parTx"/>
+          <dgm:constr type="w" for="ch" forName="parTx" refType="w"/>
+          <dgm:constr type="t" for="ch" forName="parTx"/>
+          <dgm:constr type="l" for="ch" forName="desTx"/>
+          <dgm:constr type="w" for="ch" forName="desTx" refType="w" refFor="ch" refForName="parTx"/>
+          <dgm:constr type="t" for="ch" forName="desTx" refType="h" refFor="ch" refForName="parTx"/>
+        </dgm:constrLst>
+        <dgm:ruleLst>
+          <dgm:rule type="h" val="INF" fact="NaN" max="NaN"/>
+        </dgm:ruleLst>
+        <dgm:layoutNode name="parTx" styleLbl="alignNode1">
+          <dgm:varLst>
+            <dgm:chMax val="0"/>
+            <dgm:chPref val="0"/>
+            <dgm:bulletEnabled val="1"/>
+          </dgm:varLst>
+          <dgm:alg type="tx"/>
+          <dgm:shape xmlns:r="http://schemas.openxmlformats.org/officeDocument/2006/relationships" type="rect" r:blip="">
+            <dgm:adjLst/>
+          </dgm:shape>
+          <dgm:presOf axis="self" ptType="node"/>
+          <dgm:constrLst>
+            <dgm:constr type="h" refType="w" op="lte" fact="0.4"/>
+            <dgm:constr type="h"/>
+            <dgm:constr type="tMarg" refType="primFontSz" fact="0.32"/>
+            <dgm:constr type="bMarg" refType="primFontSz" fact="0.32"/>
+          </dgm:constrLst>
+          <dgm:ruleLst>
+            <dgm:rule type="h" val="INF" fact="NaN" max="NaN"/>
+          </dgm:ruleLst>
+        </dgm:layoutNode>
+        <dgm:layoutNode name="desTx" styleLbl="alignAccFollowNode1">
+          <dgm:varLst>
+            <dgm:bulletEnabled val="1"/>
+          </dgm:varLst>
+          <dgm:alg type="tx">
+            <dgm:param type="stBulletLvl" val="1"/>
+          </dgm:alg>
+          <dgm:shape xmlns:r="http://schemas.openxmlformats.org/officeDocument/2006/relationships" type="rect" r:blip="">
+            <dgm:adjLst/>
+          </dgm:shape>
+          <dgm:presOf axis="des" ptType="node"/>
+          <dgm:constrLst>
+            <dgm:constr type="secFontSz" val="65"/>
+            <dgm:constr type="primFontSz" refType="secFontSz"/>
+            <dgm:constr type="h"/>
+            <dgm:constr type="lMarg" refType="primFontSz" fact="0.42"/>
+            <dgm:constr type="tMarg" refType="primFontSz" fact="0.42"/>
+            <dgm:constr type="bMarg" refType="primFontSz" fact="0.63"/>
+          </dgm:constrLst>
+          <dgm:ruleLst>
+            <dgm:rule type="h" val="INF" fact="NaN" max="NaN"/>
+          </dgm:ruleLst>
+        </dgm:layoutNode>
+      </dgm:layoutNode>
+      <dgm:forEach name="Name5" axis="followSib" ptType="sibTrans" cnt="1">
+        <dgm:layoutNode name="space">
+          <dgm:alg type="sp"/>
+          <dgm:shape xmlns:r="http://schemas.openxmlformats.org/officeDocument/2006/relationships" r:blip="">
+            <dgm:adjLst/>
+          </dgm:shape>
+          <dgm:presOf/>
+          <dgm:constrLst/>
+          <dgm:ruleLst/>
+        </dgm:layoutNode>
+      </dgm:forEach>
+    </dgm:forEach>
+  </dgm:layoutNode>
+</dgm:layoutDef>
+</file>
+
+<file path=ppt/diagrams/quickStyle1.xml><?xml version="1.0" encoding="utf-8"?>
+<dgm:styleDef xmlns:dgm="http://schemas.openxmlformats.org/drawingml/2006/diagram" xmlns:a="http://schemas.openxmlformats.org/drawingml/2006/main" uniqueId="urn:microsoft.com/office/officeart/2005/8/quickstyle/simple1">
+  <dgm:title val=""/>
+  <dgm:desc val=""/>
+  <dgm:catLst>
+    <dgm:cat type="simple" pri="10100"/>
+  </dgm:catLst>
+  <dgm:scene3d>
+    <a:camera prst="orthographicFront"/>
+    <a:lightRig rig="threePt" dir="t"/>
+  </dgm:scene3d>
+  <dgm:styleLbl name="node0">
+    <dgm:scene3d>
+      <a:camera prst="orthographicFront"/>
+      <a:lightRig rig="threePt" dir="t"/>
+    </dgm:scene3d>
+    <dgm:sp3d/>
+    <dgm:txPr/>
+    <dgm:style>
+      <a:lnRef idx="2">
+        <a:scrgbClr r="0" g="0" b="0"/>
+      </a:lnRef>
+      <a:fillRef idx="1">
+        <a:scrgbClr r="0" g="0" b="0"/>
+      </a:fillRef>
+      <a:effectRef idx="0">
+        <a:scrgbClr r="0" g="0" b="0"/>
+      </a:effectRef>
+      <a:fontRef idx="minor">
+        <a:schemeClr val="lt1"/>
+      </a:fontRef>
+    </dgm:style>
+  </dgm:styleLbl>
+  <dgm:styleLbl name="lnNode1">
+    <dgm:scene3d>
+      <a:camera prst="orthographicFront"/>
+      <a:lightRig rig="threePt" dir="t"/>
+    </dgm:scene3d>
+    <dgm:sp3d/>
+    <dgm:txPr/>
+    <dgm:style>
+      <a:lnRef idx="2">
+        <a:scrgbClr r="0" g="0" b="0"/>
+      </a:lnRef>
+      <a:fillRef idx="1">
+        <a:scrgbClr r="0" g="0" b="0"/>
+      </a:fillRef>
+      <a:effectRef idx="0">
+        <a:scrgbClr r="0" g="0" b="0"/>
+      </a:effectRef>
+      <a:fontRef idx="minor">
+        <a:schemeClr val="lt1"/>
+      </a:fontRef>
+    </dgm:style>
+  </dgm:styleLbl>
+  <dgm:styleLbl name="vennNode1">
+    <dgm:scene3d>
+      <a:camera prst="orthographicFront"/>
+      <a:lightRig rig="threePt" dir="t"/>
+    </dgm:scene3d>
+    <dgm:sp3d/>
+    <dgm:txPr/>
+    <dgm:style>
+      <a:lnRef idx="2">
+        <a:scrgbClr r="0" g="0" b="0"/>
+      </a:lnRef>
+      <a:fillRef idx="1">
+        <a:scrgbClr r="0" g="0" b="0"/>
+      </a:fillRef>
+      <a:effectRef idx="0">
+        <a:scrgbClr r="0" g="0" b="0"/>
+      </a:effectRef>
+      <a:fontRef idx="minor">
+        <a:schemeClr val="tx1"/>
+      </a:fontRef>
+    </dgm:style>
+  </dgm:styleLbl>
+  <dgm:styleLbl name="alignNode1">
+    <dgm:scene3d>
+      <a:camera prst="orthographicFront"/>
+      <a:lightRig rig="threePt" dir="t"/>
+    </dgm:scene3d>
+    <dgm:sp3d/>
+    <dgm:txPr/>
+    <dgm:style>
+      <a:lnRef idx="2">
+        <a:scrgbClr r="0" g="0" b="0"/>
+      </a:lnRef>
+      <a:fillRef idx="1">
+        <a:scrgbClr r="0" g="0" b="0"/>
+      </a:fillRef>
+      <a:effectRef idx="0">
+        <a:scrgbClr r="0" g="0" b="0"/>
+      </a:effectRef>
+      <a:fontRef idx="minor">
+        <a:schemeClr val="lt1"/>
+      </a:fontRef>
+    </dgm:style>
+  </dgm:styleLbl>
+  <dgm:styleLbl name="node1">
+    <dgm:scene3d>
+      <a:camera prst="orthographicFront"/>
+      <a:lightRig rig="threePt" dir="t"/>
+    </dgm:scene3d>
+    <dgm:sp3d/>
+    <dgm:txPr/>
+    <dgm:style>
+      <a:lnRef idx="2">
+        <a:scrgbClr r="0" g="0" b="0"/>
+      </a:lnRef>
+      <a:fillRef idx="1">
+        <a:scrgbClr r="0" g="0" b="0"/>
+      </a:fillRef>
+      <a:effectRef idx="0">
+        <a:scrgbClr r="0" g="0" b="0"/>
+      </a:effectRef>
+      <a:fontRef idx="minor">
+        <a:schemeClr val="lt1"/>
+      </a:fontRef>
+    </dgm:style>
+  </dgm:styleLbl>
+  <dgm:styleLbl name="node2">
+    <dgm:scene3d>
+      <a:camera prst="orthographicFront"/>
+      <a:lightRig rig="threePt" dir="t"/>
+    </dgm:scene3d>
+    <dgm:sp3d/>
+    <dgm:txPr/>
+    <dgm:style>
+      <a:lnRef idx="2">
+        <a:scrgbClr r="0" g="0" b="0"/>
+      </a:lnRef>
+      <a:fillRef idx="1">
+        <a:scrgbClr r="0" g="0" b="0"/>
+      </a:fillRef>
+      <a:effectRef idx="0">
+        <a:scrgbClr r="0" g="0" b="0"/>
+      </a:effectRef>
+      <a:fontRef idx="minor">
+        <a:schemeClr val="lt1"/>
+      </a:fontRef>
+    </dgm:style>
+  </dgm:styleLbl>
+  <dgm:styleLbl name="node3">
+    <dgm:scene3d>
+      <a:camera prst="orthographicFront"/>
+      <a:lightRig rig="threePt" dir="t"/>
+    </dgm:scene3d>
+    <dgm:sp3d/>
+    <dgm:txPr/>
+    <dgm:style>
+      <a:lnRef idx="2">
+        <a:scrgbClr r="0" g="0" b="0"/>
+      </a:lnRef>
+      <a:fillRef idx="1">
+        <a:scrgbClr r="0" g="0" b="0"/>
+      </a:fillRef>
+      <a:effectRef idx="0">
+        <a:scrgbClr r="0" g="0" b="0"/>
+      </a:effectRef>
+      <a:fontRef idx="minor">
+        <a:schemeClr val="lt1"/>
+      </a:fontRef>
+    </dgm:style>
+  </dgm:styleLbl>
+  <dgm:styleLbl name="node4">
+    <dgm:scene3d>
+      <a:camera prst="orthographicFront"/>
+      <a:lightRig rig="threePt" dir="t"/>
+    </dgm:scene3d>
+    <dgm:sp3d/>
+    <dgm:txPr/>
+    <dgm:style>
+      <a:lnRef idx="2">
+        <a:scrgbClr r="0" g="0" b="0"/>
+      </a:lnRef>
+      <a:fillRef idx="1">
+        <a:scrgbClr r="0" g="0" b="0"/>
+      </a:fillRef>
+      <a:effectRef idx="0">
+        <a:scrgbClr r="0" g="0" b="0"/>
+      </a:effectRef>
+      <a:fontRef idx="minor">
+        <a:schemeClr val="lt1"/>
+      </a:fontRef>
+    </dgm:style>
+  </dgm:styleLbl>
+  <dgm:styleLbl name="fgImgPlace1">
+    <dgm:scene3d>
+      <a:camera prst="orthographicFront"/>
+      <a:lightRig rig="threePt" dir="t"/>
+    </dgm:scene3d>
+    <dgm:sp3d/>
+    <dgm:txPr/>
+    <dgm:style>
+      <a:lnRef idx="2">
+        <a:scrgbClr r="0" g="0" b="0"/>
+      </a:lnRef>
+      <a:fillRef idx="1">
+        <a:scrgbClr r="0" g="0" b="0"/>
+      </a:fillRef>
+      <a:effectRef idx="0">
+        <a:scrgbClr r="0" g="0" b="0"/>
+      </a:effectRef>
+      <a:fontRef idx="minor"/>
+    </dgm:style>
+  </dgm:styleLbl>
+  <dgm:styleLbl name="alignImgPlace1">
+    <dgm:scene3d>
+      <a:camera prst="orthographicFront"/>
+      <a:lightRig rig="threePt" dir="t"/>
+    </dgm:scene3d>
+    <dgm:sp3d/>
+    <dgm:txPr/>
+    <dgm:style>
+      <a:lnRef idx="2">
+        <a:scrgbClr r="0" g="0" b="0"/>
+      </a:lnRef>
+      <a:fillRef idx="1">
+        <a:scrgbClr r="0" g="0" b="0"/>
+      </a:fillRef>
+      <a:effectRef idx="0">
+        <a:scrgbClr r="0" g="0" b="0"/>
+      </a:effectRef>
+      <a:fontRef idx="minor"/>
+    </dgm:style>
+  </dgm:styleLbl>
+  <dgm:styleLbl name="bgImgPlace1">
+    <dgm:scene3d>
+      <a:camera prst="orthographicFront"/>
+      <a:lightRig rig="threePt" dir="t"/>
+    </dgm:scene3d>
+    <dgm:sp3d/>
+    <dgm:txPr/>
+    <dgm:style>
+      <a:lnRef idx="2">
+        <a:scrgbClr r="0" g="0" b="0"/>
+      </a:lnRef>
+      <a:fillRef idx="1">
+        <a:scrgbClr r="0" g="0" b="0"/>
+      </a:fillRef>
+      <a:effectRef idx="0">
+        <a:scrgbClr r="0" g="0" b="0"/>
+      </a:effectRef>
+      <a:fontRef idx="minor"/>
+    </dgm:style>
+  </dgm:styleLbl>
+  <dgm:styleLbl name="sibTrans2D1">
+    <dgm:scene3d>
+      <a:camera prst="orthographicFront"/>
+      <a:lightRig rig="threePt" dir="t"/>
+    </dgm:scene3d>
+    <dgm:sp3d/>
+    <dgm:txPr/>
+    <dgm:style>
+      <a:lnRef idx="0">
+        <a:scrgbClr r="0" g="0" b="0"/>
+      </a:lnRef>
+      <a:fillRef idx="1">
+        <a:scrgbClr r="0" g="0" b="0"/>
+      </a:fillRef>
+      <a:effectRef idx="0">
+        <a:scrgbClr r="0" g="0" b="0"/>
+      </a:effectRef>
+      <a:fontRef idx="minor">
+        <a:schemeClr val="lt1"/>
+      </a:fontRef>
+    </dgm:style>
+  </dgm:styleLbl>
+  <dgm:styleLbl name="fgSibTrans2D1">
+    <dgm:scene3d>
+      <a:camera prst="orthographicFront"/>
+      <a:lightRig rig="threePt" dir="t"/>
+    </dgm:scene3d>
+    <dgm:sp3d/>
+    <dgm:txPr/>
+    <dgm:style>
+      <a:lnRef idx="0">
+        <a:scrgbClr r="0" g="0" b="0"/>
+      </a:lnRef>
+      <a:fillRef idx="1">
+        <a:scrgbClr r="0" g="0" b="0"/>
+      </a:fillRef>
+      <a:effectRef idx="0">
+        <a:scrgbClr r="0" g="0" b="0"/>
+      </a:effectRef>
+      <a:fontRef idx="minor">
+        <a:schemeClr val="lt1"/>
+      </a:fontRef>
+    </dgm:style>
+  </dgm:styleLbl>
+  <dgm:styleLbl name="bgSibTrans2D1">
+    <dgm:scene3d>
+      <a:camera prst="orthographicFront"/>
+      <a:lightRig rig="threePt" dir="t"/>
+    </dgm:scene3d>
+    <dgm:sp3d/>
+    <dgm:txPr/>
+    <dgm:style>
+      <a:lnRef idx="0">
+        <a:scrgbClr r="0" g="0" b="0"/>
+      </a:lnRef>
+      <a:fillRef idx="1">
+        <a:scrgbClr r="0" g="0" b="0"/>
+      </a:fillRef>
+      <a:effectRef idx="0">
+        <a:scrgbClr r="0" g="0" b="0"/>
+      </a:effectRef>
+      <a:fontRef idx="minor">
+        <a:schemeClr val="lt1"/>
+      </a:fontRef>
+    </dgm:style>
+  </dgm:styleLbl>
+  <dgm:styleLbl name="sibTrans1D1">
+    <dgm:scene3d>
+      <a:camera prst="orthographicFront"/>
+      <a:lightRig rig="threePt" dir="t"/>
+    </dgm:scene3d>
+    <dgm:sp3d/>
+    <dgm:txPr/>
+    <dgm:style>
+      <a:lnRef idx="1">
+        <a:scrgbClr r="0" g="0" b="0"/>
+      </a:lnRef>
+      <a:fillRef idx="0">
+        <a:scrgbClr r="0" g="0" b="0"/>
+      </a:fillRef>
+      <a:effectRef idx="0">
+        <a:scrgbClr r="0" g="0" b="0"/>
+      </a:effectRef>
+      <a:fontRef idx="minor"/>
+    </dgm:style>
+  </dgm:styleLbl>
+  <dgm:styleLbl name="callout">
+    <dgm:scene3d>
+      <a:camera prst="orthographicFront"/>
+      <a:lightRig rig="threePt" dir="t"/>
+    </dgm:scene3d>
+    <dgm:sp3d/>
+    <dgm:txPr/>
+    <dgm:style>
+      <a:lnRef idx="2">
+        <a:scrgbClr r="0" g="0" b="0"/>
+      </a:lnRef>
+      <a:fillRef idx="1">
+        <a:scrgbClr r="0" g="0" b="0"/>
+      </a:fillRef>
+      <a:effectRef idx="0">
+        <a:scrgbClr r="0" g="0" b="0"/>
+      </a:effectRef>
+      <a:fontRef idx="minor"/>
+    </dgm:style>
+  </dgm:styleLbl>
+  <dgm:styleLbl name="asst0">
+    <dgm:scene3d>
+      <a:camera prst="orthographicFront"/>
+      <a:lightRig rig="threePt" dir="t"/>
+    </dgm:scene3d>
+    <dgm:sp3d/>
+    <dgm:txPr/>
+    <dgm:style>
+      <a:lnRef idx="2">
+        <a:scrgbClr r="0" g="0" b="0"/>
+      </a:lnRef>
+      <a:fillRef idx="1">
+        <a:scrgbClr r="0" g="0" b="0"/>
+      </a:fillRef>
+      <a:effectRef idx="0">
+        <a:scrgbClr r="0" g="0" b="0"/>
+      </a:effectRef>
+      <a:fontRef idx="minor">
+        <a:schemeClr val="lt1"/>
+      </a:fontRef>
+    </dgm:style>
+  </dgm:styleLbl>
+  <dgm:styleLbl name="asst1">
+    <dgm:scene3d>
+      <a:camera prst="orthographicFront"/>
+      <a:lightRig rig="threePt" dir="t"/>
+    </dgm:scene3d>
+    <dgm:sp3d/>
+    <dgm:txPr/>
+    <dgm:style>
+      <a:lnRef idx="2">
+        <a:scrgbClr r="0" g="0" b="0"/>
+      </a:lnRef>
+      <a:fillRef idx="1">
+        <a:scrgbClr r="0" g="0" b="0"/>
+      </a:fillRef>
+      <a:effectRef idx="0">
+        <a:scrgbClr r="0" g="0" b="0"/>
+      </a:effectRef>
+      <a:fontRef idx="minor">
+        <a:schemeClr val="lt1"/>
+      </a:fontRef>
+    </dgm:style>
+  </dgm:styleLbl>
+  <dgm:styleLbl name="asst2">
+    <dgm:scene3d>
+      <a:camera prst="orthographicFront"/>
+      <a:lightRig rig="threePt" dir="t"/>
+    </dgm:scene3d>
+    <dgm:sp3d/>
+    <dgm:txPr/>
+    <dgm:style>
+      <a:lnRef idx="2">
+        <a:scrgbClr r="0" g="0" b="0"/>
+      </a:lnRef>
+      <a:fillRef idx="1">
+        <a:scrgbClr r="0" g="0" b="0"/>
+      </a:fillRef>
+      <a:effectRef idx="0">
+        <a:scrgbClr r="0" g="0" b="0"/>
+      </a:effectRef>
+      <a:fontRef idx="minor">
+        <a:schemeClr val="lt1"/>
+      </a:fontRef>
+    </dgm:style>
+  </dgm:styleLbl>
+  <dgm:styleLbl name="asst3">
+    <dgm:scene3d>
+      <a:camera prst="orthographicFront"/>
+      <a:lightRig rig="threePt" dir="t"/>
+    </dgm:scene3d>
+    <dgm:sp3d/>
+    <dgm:txPr/>
+    <dgm:style>
+      <a:lnRef idx="2">
+        <a:scrgbClr r="0" g="0" b="0"/>
+      </a:lnRef>
+      <a:fillRef idx="1">
+        <a:scrgbClr r="0" g="0" b="0"/>
+      </a:fillRef>
+      <a:effectRef idx="0">
+        <a:scrgbClr r="0" g="0" b="0"/>
+      </a:effectRef>
+      <a:fontRef idx="minor">
+        <a:schemeClr val="lt1"/>
+      </a:fontRef>
+    </dgm:style>
+  </dgm:styleLbl>
+  <dgm:styleLbl name="asst4">
+    <dgm:scene3d>
+      <a:camera prst="orthographicFront"/>
+      <a:lightRig rig="threePt" dir="t"/>
+    </dgm:scene3d>
+    <dgm:sp3d/>
+    <dgm:txPr/>
+    <dgm:style>
+      <a:lnRef idx="2">
+        <a:scrgbClr r="0" g="0" b="0"/>
+      </a:lnRef>
+      <a:fillRef idx="1">
+        <a:scrgbClr r="0" g="0" b="0"/>
+      </a:fillRef>
+      <a:effectRef idx="0">
+        <a:scrgbClr r="0" g="0" b="0"/>
+      </a:effectRef>
+      <a:fontRef idx="minor">
+        <a:schemeClr val="lt1"/>
+      </a:fontRef>
+    </dgm:style>
+  </dgm:styleLbl>
+  <dgm:styleLbl name="parChTrans2D1">
+    <dgm:scene3d>
+      <a:camera prst="orthographicFront"/>
+      <a:lightRig rig="threePt" dir="t"/>
+    </dgm:scene3d>
+    <dgm:sp3d/>
+    <dgm:txPr/>
+    <dgm:style>
+      <a:lnRef idx="2">
+        <a:scrgbClr r="0" g="0" b="0"/>
+      </a:lnRef>
+      <a:fillRef idx="1">
+        <a:scrgbClr r="0" g="0" b="0"/>
+      </a:fillRef>
+      <a:effectRef idx="0">
+        <a:scrgbClr r="0" g="0" b="0"/>
+      </a:effectRef>
+      <a:fontRef idx="minor">
+        <a:schemeClr val="lt1"/>
+      </a:fontRef>
+    </dgm:style>
+  </dgm:styleLbl>
+  <dgm:styleLbl name="parChTrans2D2">
+    <dgm:scene3d>
+      <a:camera prst="orthographicFront"/>
+      <a:lightRig rig="threePt" dir="t"/>
+    </dgm:scene3d>
+    <dgm:sp3d/>
+    <dgm:txPr/>
+    <dgm:style>
+      <a:lnRef idx="2">
+        <a:scrgbClr r="0" g="0" b="0"/>
+      </a:lnRef>
+      <a:fillRef idx="1">
+        <a:scrgbClr r="0" g="0" b="0"/>
+      </a:fillRef>
+      <a:effectRef idx="0">
+        <a:scrgbClr r="0" g="0" b="0"/>
+      </a:effectRef>
+      <a:fontRef idx="minor">
+        <a:schemeClr val="lt1"/>
+      </a:fontRef>
+    </dgm:style>
+  </dgm:styleLbl>
+  <dgm:styleLbl name="parChTrans2D3">
+    <dgm:scene3d>
+      <a:camera prst="orthographicFront"/>
+      <a:lightRig rig="threePt" dir="t"/>
+    </dgm:scene3d>
+    <dgm:sp3d/>
+    <dgm:txPr/>
+    <dgm:style>
+      <a:lnRef idx="2">
+        <a:scrgbClr r="0" g="0" b="0"/>
+      </a:lnRef>
+      <a:fillRef idx="1">
+        <a:scrgbClr r="0" g="0" b="0"/>
+      </a:fillRef>
+      <a:effectRef idx="0">
+        <a:scrgbClr r="0" g="0" b="0"/>
+      </a:effectRef>
+      <a:fontRef idx="minor">
+        <a:schemeClr val="lt1"/>
+      </a:fontRef>
+    </dgm:style>
+  </dgm:styleLbl>
+  <dgm:styleLbl name="parChTrans2D4">
+    <dgm:scene3d>
+      <a:camera prst="orthographicFront"/>
+      <a:lightRig rig="threePt" dir="t"/>
+    </dgm:scene3d>
+    <dgm:sp3d/>
+    <dgm:txPr/>
+    <dgm:style>
+      <a:lnRef idx="2">
+        <a:scrgbClr r="0" g="0" b="0"/>
+      </a:lnRef>
+      <a:fillRef idx="1">
+        <a:scrgbClr r="0" g="0" b="0"/>
+      </a:fillRef>
+      <a:effectRef idx="0">
+        <a:scrgbClr r="0" g="0" b="0"/>
+      </a:effectRef>
+      <a:fontRef idx="minor">
+        <a:schemeClr val="lt1"/>
+      </a:fontRef>
+    </dgm:style>
+  </dgm:styleLbl>
+  <dgm:styleLbl name="parChTrans1D1">
+    <dgm:scene3d>
+      <a:camera prst="orthographicFront"/>
+      <a:lightRig rig="threePt" dir="t"/>
+    </dgm:scene3d>
+    <dgm:sp3d/>
+    <dgm:txPr/>
+    <dgm:style>
+      <a:lnRef idx="2">
+        <a:scrgbClr r="0" g="0" b="0"/>
+      </a:lnRef>
+      <a:fillRef idx="0">
+        <a:scrgbClr r="0" g="0" b="0"/>
+      </a:fillRef>
+      <a:effectRef idx="0">
+        <a:scrgbClr r="0" g="0" b="0"/>
+      </a:effectRef>
+      <a:fontRef idx="minor"/>
+    </dgm:style>
+  </dgm:styleLbl>
+  <dgm:styleLbl name="parChTrans1D2">
+    <dgm:scene3d>
+      <a:camera prst="orthographicFront"/>
+      <a:lightRig rig="threePt" dir="t"/>
+    </dgm:scene3d>
+    <dgm:sp3d/>
+    <dgm:txPr/>
+    <dgm:style>
+      <a:lnRef idx="2">
+        <a:scrgbClr r="0" g="0" b="0"/>
+      </a:lnRef>
+      <a:fillRef idx="0">
+        <a:scrgbClr r="0" g="0" b="0"/>
+      </a:fillRef>
+      <a:effectRef idx="0">
+        <a:scrgbClr r="0" g="0" b="0"/>
+      </a:effectRef>
+      <a:fontRef idx="minor"/>
+    </dgm:style>
+  </dgm:styleLbl>
+  <dgm:styleLbl name="parChTrans1D3">
+    <dgm:scene3d>
+      <a:camera prst="orthographicFront"/>
+      <a:lightRig rig="threePt" dir="t"/>
+    </dgm:scene3d>
+    <dgm:sp3d/>
+    <dgm:txPr/>
+    <dgm:style>
+      <a:lnRef idx="2">
+        <a:scrgbClr r="0" g="0" b="0"/>
+      </a:lnRef>
+      <a:fillRef idx="0">
+        <a:scrgbClr r="0" g="0" b="0"/>
+      </a:fillRef>
+      <a:effectRef idx="0">
+        <a:scrgbClr r="0" g="0" b="0"/>
+      </a:effectRef>
+      <a:fontRef idx="minor"/>
+    </dgm:style>
+  </dgm:styleLbl>
+  <dgm:styleLbl name="parChTrans1D4">
+    <dgm:scene3d>
+      <a:camera prst="orthographicFront"/>
+      <a:lightRig rig="threePt" dir="t"/>
+    </dgm:scene3d>
+    <dgm:sp3d/>
+    <dgm:txPr/>
+    <dgm:style>
+      <a:lnRef idx="2">
+        <a:scrgbClr r="0" g="0" b="0"/>
+      </a:lnRef>
+      <a:fillRef idx="0">
+        <a:scrgbClr r="0" g="0" b="0"/>
+      </a:fillRef>
+      <a:effectRef idx="0">
+        <a:scrgbClr r="0" g="0" b="0"/>
+      </a:effectRef>
+      <a:fontRef idx="minor"/>
+    </dgm:style>
+  </dgm:styleLbl>
+  <dgm:styleLbl name="fgAcc1">
+    <dgm:scene3d>
+      <a:camera prst="orthographicFront"/>
+      <a:lightRig rig="threePt" dir="t"/>
+    </dgm:scene3d>
+    <dgm:sp3d/>
+    <dgm:txPr/>
+    <dgm:style>
+      <a:lnRef idx="2">
+        <a:scrgbClr r="0" g="0" b="0"/>
+      </a:lnRef>
+      <a:fillRef idx="1">
+        <a:scrgbClr r="0" g="0" b="0"/>
+      </a:fillRef>
+      <a:effectRef idx="0">
+        <a:scrgbClr r="0" g="0" b="0"/>
+      </a:effectRef>
+      <a:fontRef idx="minor"/>
+    </dgm:style>
+  </dgm:styleLbl>
+  <dgm:styleLbl name="conFgAcc1">
+    <dgm:scene3d>
+      <a:camera prst="orthographicFront"/>
+      <a:lightRig rig="threePt" dir="t"/>
+    </dgm:scene3d>
+    <dgm:sp3d/>
+    <dgm:txPr/>
+    <dgm:style>
+      <a:lnRef idx="2">
+        <a:scrgbClr r="0" g="0" b="0"/>
+      </a:lnRef>
+      <a:fillRef idx="1">
+        <a:scrgbClr r="0" g="0" b="0"/>
+      </a:fillRef>
+      <a:effectRef idx="0">
+        <a:scrgbClr r="0" g="0" b="0"/>
+      </a:effectRef>
+      <a:fontRef idx="minor"/>
+    </dgm:style>
+  </dgm:styleLbl>
+  <dgm:styleLbl name="alignAcc1">
+    <dgm:scene3d>
+      <a:camera prst="orthographicFront"/>
+      <a:lightRig rig="threePt" dir="t"/>
+    </dgm:scene3d>
+    <dgm:sp3d/>
+    <dgm:txPr/>
+    <dgm:style>
+      <a:lnRef idx="2">
+        <a:scrgbClr r="0" g="0" b="0"/>
+      </a:lnRef>
+      <a:fillRef idx="1">
+        <a:scrgbClr r="0" g="0" b="0"/>
+      </a:fillRef>
+      <a:effectRef idx="0">
+        <a:scrgbClr r="0" g="0" b="0"/>
+      </a:effectRef>
+      <a:fontRef idx="minor"/>
+    </dgm:style>
+  </dgm:styleLbl>
+  <dgm:styleLbl name="trAlignAcc1">
+    <dgm:scene3d>
+      <a:camera prst="orthographicFront"/>
+      <a:lightRig rig="threePt" dir="t"/>
+    </dgm:scene3d>
+    <dgm:sp3d/>
+    <dgm:txPr/>
+    <dgm:style>
+      <a:lnRef idx="1">
+        <a:scrgbClr r="0" g="0" b="0"/>
+      </a:lnRef>
+      <a:fillRef idx="1">
+        <a:scrgbClr r="0" g="0" b="0"/>
+      </a:fillRef>
+      <a:effectRef idx="0">
+        <a:scrgbClr r="0" g="0" b="0"/>
+      </a:effectRef>
+      <a:fontRef idx="minor"/>
+    </dgm:style>
+  </dgm:styleLbl>
+  <dgm:styleLbl name="bgAcc1">
+    <dgm:scene3d>
+      <a:camera prst="orthographicFront"/>
+      <a:lightRig rig="threePt" dir="t"/>
+    </dgm:scene3d>
+    <dgm:sp3d/>
+    <dgm:txPr/>
+    <dgm:style>
+      <a:lnRef idx="2">
+        <a:scrgbClr r="0" g="0" b="0"/>
+      </a:lnRef>
+      <a:fillRef idx="1">
+        <a:scrgbClr r="0" g="0" b="0"/>
+      </a:fillRef>
+      <a:effectRef idx="0">
+        <a:scrgbClr r="0" g="0" b="0"/>
+      </a:effectRef>
+      <a:fontRef idx="minor"/>
+    </dgm:style>
+  </dgm:styleLbl>
+  <dgm:styleLbl name="solidFgAcc1">
+    <dgm:scene3d>
+      <a:camera prst="orthographicFront"/>
+      <a:lightRig rig="threePt" dir="t"/>
+    </dgm:scene3d>
+    <dgm:sp3d/>
+    <dgm:txPr/>
+    <dgm:style>
+      <a:lnRef idx="2">
+        <a:scrgbClr r="0" g="0" b="0"/>
+      </a:lnRef>
+      <a:fillRef idx="1">
+        <a:scrgbClr r="0" g="0" b="0"/>
+      </a:fillRef>
+      <a:effectRef idx="0">
+        <a:scrgbClr r="0" g="0" b="0"/>
+      </a:effectRef>
+      <a:fontRef idx="minor"/>
+    </dgm:style>
+  </dgm:styleLbl>
+  <dgm:styleLbl name="solidAlignAcc1">
+    <dgm:scene3d>
+      <a:camera prst="orthographicFront"/>
+      <a:lightRig rig="threePt" dir="t"/>
+    </dgm:scene3d>
+    <dgm:sp3d/>
+    <dgm:txPr/>
+    <dgm:style>
+      <a:lnRef idx="2">
+        <a:scrgbClr r="0" g="0" b="0"/>
+      </a:lnRef>
+      <a:fillRef idx="1">
+        <a:scrgbClr r="0" g="0" b="0"/>
+      </a:fillRef>
+      <a:effectRef idx="0">
+        <a:scrgbClr r="0" g="0" b="0"/>
+      </a:effectRef>
+      <a:fontRef idx="minor"/>
+    </dgm:style>
+  </dgm:styleLbl>
+  <dgm:styleLbl name="solidBgAcc1">
+    <dgm:scene3d>
+      <a:camera prst="orthographicFront"/>
+      <a:lightRig rig="threePt" dir="t"/>
+    </dgm:scene3d>
+    <dgm:sp3d/>
+    <dgm:txPr/>
+    <dgm:style>
+      <a:lnRef idx="2">
+        <a:scrgbClr r="0" g="0" b="0"/>
+      </a:lnRef>
+      <a:fillRef idx="1">
+        <a:scrgbClr r="0" g="0" b="0"/>
+      </a:fillRef>
+      <a:effectRef idx="0">
+        <a:scrgbClr r="0" g="0" b="0"/>
+      </a:effectRef>
+      <a:fontRef idx="minor"/>
+    </dgm:style>
+  </dgm:styleLbl>
+  <dgm:styleLbl name="fgAccFollowNode1">
+    <dgm:scene3d>
+      <a:camera prst="orthographicFront"/>
+      <a:lightRig rig="threePt" dir="t"/>
+    </dgm:scene3d>
+    <dgm:sp3d/>
+    <dgm:txPr/>
+    <dgm:style>
+      <a:lnRef idx="2">
+        <a:scrgbClr r="0" g="0" b="0"/>
+      </a:lnRef>
+      <a:fillRef idx="1">
+        <a:scrgbClr r="0" g="0" b="0"/>
+      </a:fillRef>
+      <a:effectRef idx="0">
+        <a:scrgbClr r="0" g="0" b="0"/>
+      </a:effectRef>
+      <a:fontRef idx="minor"/>
+    </dgm:style>
+  </dgm:styleLbl>
+  <dgm:styleLbl name="alignAccFollowNode1">
+    <dgm:scene3d>
+      <a:camera prst="orthographicFront"/>
+      <a:lightRig rig="threePt" dir="t"/>
+    </dgm:scene3d>
+    <dgm:sp3d/>
+    <dgm:txPr/>
+    <dgm:style>
+      <a:lnRef idx="2">
+        <a:scrgbClr r="0" g="0" b="0"/>
+      </a:lnRef>
+      <a:fillRef idx="1">
+        <a:scrgbClr r="0" g="0" b="0"/>
+      </a:fillRef>
+      <a:effectRef idx="0">
+        <a:scrgbClr r="0" g="0" b="0"/>
+      </a:effectRef>
+      <a:fontRef idx="minor"/>
+    </dgm:style>
+  </dgm:styleLbl>
+  <dgm:styleLbl name="bgAccFollowNode1">
+    <dgm:scene3d>
+      <a:camera prst="orthographicFront"/>
+      <a:lightRig rig="threePt" dir="t"/>
+    </dgm:scene3d>
+    <dgm:sp3d/>
+    <dgm:txPr/>
+    <dgm:style>
+      <a:lnRef idx="2">
+        <a:scrgbClr r="0" g="0" b="0"/>
+      </a:lnRef>
+      <a:fillRef idx="1">
+        <a:scrgbClr r="0" g="0" b="0"/>
+      </a:fillRef>
+      <a:effectRef idx="0">
+        <a:scrgbClr r="0" g="0" b="0"/>
+      </a:effectRef>
+      <a:fontRef idx="minor"/>
+    </dgm:style>
+  </dgm:styleLbl>
+  <dgm:styleLbl name="fgAcc0">
+    <dgm:scene3d>
+      <a:camera prst="orthographicFront"/>
+      <a:lightRig rig="threePt" dir="t"/>
+    </dgm:scene3d>
+    <dgm:sp3d/>
+    <dgm:txPr/>
+    <dgm:style>
+      <a:lnRef idx="2">
+        <a:scrgbClr r="0" g="0" b="0"/>
+      </a:lnRef>
+      <a:fillRef idx="1">
+        <a:scrgbClr r="0" g="0" b="0"/>
+      </a:fillRef>
+      <a:effectRef idx="0">
+        <a:scrgbClr r="0" g="0" b="0"/>
+      </a:effectRef>
+      <a:fontRef idx="minor"/>
+    </dgm:style>
+  </dgm:styleLbl>
+  <dgm:styleLbl name="fgAcc2">
+    <dgm:scene3d>
+      <a:camera prst="orthographicFront"/>
+      <a:lightRig rig="threePt" dir="t"/>
+    </dgm:scene3d>
+    <dgm:sp3d/>
+    <dgm:txPr/>
+    <dgm:style>
+      <a:lnRef idx="2">
+        <a:scrgbClr r="0" g="0" b="0"/>
+      </a:lnRef>
+      <a:fillRef idx="1">
+        <a:scrgbClr r="0" g="0" b="0"/>
+      </a:fillRef>
+      <a:effectRef idx="0">
+        <a:scrgbClr r="0" g="0" b="0"/>
+      </a:effectRef>
+      <a:fontRef idx="minor"/>
+    </dgm:style>
+  </dgm:styleLbl>
+  <dgm:styleLbl name="fgAcc3">
+    <dgm:scene3d>
+      <a:camera prst="orthographicFront"/>
+      <a:lightRig rig="threePt" dir="t"/>
+    </dgm:scene3d>
+    <dgm:sp3d/>
+    <dgm:txPr/>
+    <dgm:style>
+      <a:lnRef idx="2">
+        <a:scrgbClr r="0" g="0" b="0"/>
+      </a:lnRef>
+      <a:fillRef idx="1">
+        <a:scrgbClr r="0" g="0" b="0"/>
+      </a:fillRef>
+      <a:effectRef idx="0">
+        <a:scrgbClr r="0" g="0" b="0"/>
+      </a:effectRef>
+      <a:fontRef idx="minor"/>
+    </dgm:style>
+  </dgm:styleLbl>
+  <dgm:styleLbl name="fgAcc4">
+    <dgm:scene3d>
+      <a:camera prst="orthographicFront"/>
+      <a:lightRig rig="threePt" dir="t"/>
+    </dgm:scene3d>
+    <dgm:sp3d/>
+    <dgm:txPr/>
+    <dgm:style>
+      <a:lnRef idx="2">
+        <a:scrgbClr r="0" g="0" b="0"/>
+      </a:lnRef>
+      <a:fillRef idx="1">
+        <a:scrgbClr r="0" g="0" b="0"/>
+      </a:fillRef>
+      <a:effectRef idx="0">
+        <a:scrgbClr r="0" g="0" b="0"/>
+      </a:effectRef>
+      <a:fontRef idx="minor"/>
+    </dgm:style>
+  </dgm:styleLbl>
+  <dgm:styleLbl name="bgShp">
+    <dgm:scene3d>
+      <a:camera prst="orthographicFront"/>
+      <a:lightRig rig="threePt" dir="t"/>
+    </dgm:scene3d>
+    <dgm:sp3d/>
+    <dgm:txPr/>
+    <dgm:style>
+      <a:lnRef idx="0">
+        <a:scrgbClr r="0" g="0" b="0"/>
+      </a:lnRef>
+      <a:fillRef idx="1">
+        <a:scrgbClr r="0" g="0" b="0"/>
+      </a:fillRef>
+      <a:effectRef idx="0">
+        <a:scrgbClr r="0" g="0" b="0"/>
+      </a:effectRef>
+      <a:fontRef idx="minor"/>
+    </dgm:style>
+  </dgm:styleLbl>
+  <dgm:styleLbl name="dkBgShp">
+    <dgm:scene3d>
+      <a:camera prst="orthographicFront"/>
+      <a:lightRig rig="threePt" dir="t"/>
+    </dgm:scene3d>
+    <dgm:sp3d/>
+    <dgm:txPr/>
+    <dgm:style>
+      <a:lnRef idx="0">
+        <a:scrgbClr r="0" g="0" b="0"/>
+      </a:lnRef>
+      <a:fillRef idx="1">
+        <a:scrgbClr r="0" g="0" b="0"/>
+      </a:fillRef>
+      <a:effectRef idx="0">
+        <a:scrgbClr r="0" g="0" b="0"/>
+      </a:effectRef>
+      <a:fontRef idx="minor"/>
+    </dgm:style>
+  </dgm:styleLbl>
+  <dgm:styleLbl name="trBgShp">
+    <dgm:scene3d>
+      <a:camera prst="orthographicFront"/>
+      <a:lightRig rig="threePt" dir="t"/>
+    </dgm:scene3d>
+    <dgm:sp3d/>
+    <dgm:txPr/>
+    <dgm:style>
+      <a:lnRef idx="0">
+        <a:scrgbClr r="0" g="0" b="0"/>
+      </a:lnRef>
+      <a:fillRef idx="1">
+        <a:scrgbClr r="0" g="0" b="0"/>
+      </a:fillRef>
+      <a:effectRef idx="0">
+        <a:scrgbClr r="0" g="0" b="0"/>
+      </a:effectRef>
+      <a:fontRef idx="minor"/>
+    </dgm:style>
+  </dgm:styleLbl>
+  <dgm:styleLbl name="fgShp">
+    <dgm:scene3d>
+      <a:camera prst="orthographicFront"/>
+      <a:lightRig rig="threePt" dir="t"/>
+    </dgm:scene3d>
+    <dgm:sp3d/>
+    <dgm:txPr/>
+    <dgm:style>
+      <a:lnRef idx="2">
+        <a:scrgbClr r="0" g="0" b="0"/>
+      </a:lnRef>
+      <a:fillRef idx="1">
+        <a:scrgbClr r="0" g="0" b="0"/>
+      </a:fillRef>
+      <a:effectRef idx="0">
+        <a:scrgbClr r="0" g="0" b="0"/>
+      </a:effectRef>
+      <a:fontRef idx="minor"/>
+    </dgm:style>
+  </dgm:styleLbl>
+  <dgm:styleLbl name="revTx">
+    <dgm:scene3d>
+      <a:camera prst="orthographicFront"/>
+      <a:lightRig rig="threePt" dir="t"/>
+    </dgm:scene3d>
+    <dgm:sp3d/>
+    <dgm:txPr/>
+    <dgm:style>
+      <a:lnRef idx="0">
+        <a:scrgbClr r="0" g="0" b="0"/>
+      </a:lnRef>
+      <a:fillRef idx="0">
+        <a:scrgbClr r="0" g="0" b="0"/>
+      </a:fillRef>
+      <a:effectRef idx="0">
+        <a:scrgbClr r="0" g="0" b="0"/>
+      </a:effectRef>
+      <a:fontRef idx="minor"/>
+    </dgm:style>
+  </dgm:styleLbl>
+</dgm:styleDef>
 </file>
 
 <file path=ppt/slideLayouts/slideLayout1.xml><?xml version="1.0" encoding="utf-8"?>
@@ -246,7 +3300,7 @@
           <a:p>
             <a:fld id="{F9D3E6FF-AC24-BE43-AFD3-27417514DD0F}" type="datetimeFigureOut">
               <a:rPr lang="en-GB" smtClean="0"/>
-              <a:t>24/12/2019</a:t>
+              <a:t>10/01/2020</a:t>
             </a:fld>
             <a:endParaRPr lang="en-GB"/>
           </a:p>
@@ -416,7 +3470,7 @@
           <a:p>
             <a:fld id="{F9D3E6FF-AC24-BE43-AFD3-27417514DD0F}" type="datetimeFigureOut">
               <a:rPr lang="en-GB" smtClean="0"/>
-              <a:t>24/12/2019</a:t>
+              <a:t>10/01/2020</a:t>
             </a:fld>
             <a:endParaRPr lang="en-GB"/>
           </a:p>
@@ -596,7 +3650,7 @@
           <a:p>
             <a:fld id="{F9D3E6FF-AC24-BE43-AFD3-27417514DD0F}" type="datetimeFigureOut">
               <a:rPr lang="en-GB" smtClean="0"/>
-              <a:t>24/12/2019</a:t>
+              <a:t>10/01/2020</a:t>
             </a:fld>
             <a:endParaRPr lang="en-GB"/>
           </a:p>
@@ -766,7 +3820,7 @@
           <a:p>
             <a:fld id="{F9D3E6FF-AC24-BE43-AFD3-27417514DD0F}" type="datetimeFigureOut">
               <a:rPr lang="en-GB" smtClean="0"/>
-              <a:t>24/12/2019</a:t>
+              <a:t>10/01/2020</a:t>
             </a:fld>
             <a:endParaRPr lang="en-GB"/>
           </a:p>
@@ -1012,7 +4066,7 @@
           <a:p>
             <a:fld id="{F9D3E6FF-AC24-BE43-AFD3-27417514DD0F}" type="datetimeFigureOut">
               <a:rPr lang="en-GB" smtClean="0"/>
-              <a:t>24/12/2019</a:t>
+              <a:t>10/01/2020</a:t>
             </a:fld>
             <a:endParaRPr lang="en-GB"/>
           </a:p>
@@ -1244,7 +4298,7 @@
           <a:p>
             <a:fld id="{F9D3E6FF-AC24-BE43-AFD3-27417514DD0F}" type="datetimeFigureOut">
               <a:rPr lang="en-GB" smtClean="0"/>
-              <a:t>24/12/2019</a:t>
+              <a:t>10/01/2020</a:t>
             </a:fld>
             <a:endParaRPr lang="en-GB"/>
           </a:p>
@@ -1611,7 +4665,7 @@
           <a:p>
             <a:fld id="{F9D3E6FF-AC24-BE43-AFD3-27417514DD0F}" type="datetimeFigureOut">
               <a:rPr lang="en-GB" smtClean="0"/>
-              <a:t>24/12/2019</a:t>
+              <a:t>10/01/2020</a:t>
             </a:fld>
             <a:endParaRPr lang="en-GB"/>
           </a:p>
@@ -1729,7 +4783,7 @@
           <a:p>
             <a:fld id="{F9D3E6FF-AC24-BE43-AFD3-27417514DD0F}" type="datetimeFigureOut">
               <a:rPr lang="en-GB" smtClean="0"/>
-              <a:t>24/12/2019</a:t>
+              <a:t>10/01/2020</a:t>
             </a:fld>
             <a:endParaRPr lang="en-GB"/>
           </a:p>
@@ -1824,7 +4878,7 @@
           <a:p>
             <a:fld id="{F9D3E6FF-AC24-BE43-AFD3-27417514DD0F}" type="datetimeFigureOut">
               <a:rPr lang="en-GB" smtClean="0"/>
-              <a:t>24/12/2019</a:t>
+              <a:t>10/01/2020</a:t>
             </a:fld>
             <a:endParaRPr lang="en-GB"/>
           </a:p>
@@ -2101,7 +5155,7 @@
           <a:p>
             <a:fld id="{F9D3E6FF-AC24-BE43-AFD3-27417514DD0F}" type="datetimeFigureOut">
               <a:rPr lang="en-GB" smtClean="0"/>
-              <a:t>24/12/2019</a:t>
+              <a:t>10/01/2020</a:t>
             </a:fld>
             <a:endParaRPr lang="en-GB"/>
           </a:p>
@@ -2358,7 +5412,7 @@
           <a:p>
             <a:fld id="{F9D3E6FF-AC24-BE43-AFD3-27417514DD0F}" type="datetimeFigureOut">
               <a:rPr lang="en-GB" smtClean="0"/>
-              <a:t>24/12/2019</a:t>
+              <a:t>10/01/2020</a:t>
             </a:fld>
             <a:endParaRPr lang="en-GB"/>
           </a:p>
@@ -2571,7 +5625,7 @@
           <a:p>
             <a:fld id="{F9D3E6FF-AC24-BE43-AFD3-27417514DD0F}" type="datetimeFigureOut">
               <a:rPr lang="en-GB" smtClean="0"/>
-              <a:t>24/12/2019</a:t>
+              <a:t>10/01/2020</a:t>
             </a:fld>
             <a:endParaRPr lang="en-GB"/>
           </a:p>
@@ -22671,6 +25725,58 @@
 </p:sld>
 </file>
 
+<file path=ppt/slides/slide5.xml><?xml version="1.0" encoding="utf-8"?>
+<p:sld xmlns:a="http://schemas.openxmlformats.org/drawingml/2006/main" xmlns:r="http://schemas.openxmlformats.org/officeDocument/2006/relationships" xmlns:p="http://schemas.openxmlformats.org/presentationml/2006/main">
+  <p:cSld>
+    <p:spTree>
+      <p:nvGrpSpPr>
+        <p:cNvPr id="1" name=""/>
+        <p:cNvGrpSpPr/>
+        <p:nvPr/>
+      </p:nvGrpSpPr>
+      <p:grpSpPr>
+        <a:xfrm>
+          <a:off x="0" y="0"/>
+          <a:ext cx="0" cy="0"/>
+          <a:chOff x="0" y="0"/>
+          <a:chExt cx="0" cy="0"/>
+        </a:xfrm>
+      </p:grpSpPr>
+      <p:graphicFrame>
+        <p:nvGraphicFramePr>
+          <p:cNvPr id="2" name="Diagram 1">
+            <a:extLst>
+              <a:ext uri="{FF2B5EF4-FFF2-40B4-BE49-F238E27FC236}">
+                <a16:creationId xmlns:a16="http://schemas.microsoft.com/office/drawing/2014/main" id="{D0E8EB78-39BC-2244-A340-52E49B144D6D}"/>
+              </a:ext>
+            </a:extLst>
+          </p:cNvPr>
+          <p:cNvGraphicFramePr/>
+          <p:nvPr/>
+        </p:nvGraphicFramePr>
+        <p:xfrm>
+          <a:off x="513347" y="2598821"/>
+          <a:ext cx="17389642" cy="6610178"/>
+        </p:xfrm>
+        <a:graphic>
+          <a:graphicData uri="http://schemas.openxmlformats.org/drawingml/2006/diagram">
+            <dgm:relIds xmlns:dgm="http://schemas.openxmlformats.org/drawingml/2006/diagram" xmlns:r="http://schemas.openxmlformats.org/officeDocument/2006/relationships" r:dm="rId2" r:lo="rId3" r:qs="rId4" r:cs="rId5"/>
+          </a:graphicData>
+        </a:graphic>
+      </p:graphicFrame>
+    </p:spTree>
+    <p:extLst>
+      <p:ext uri="{BB962C8B-B14F-4D97-AF65-F5344CB8AC3E}">
+        <p14:creationId xmlns:p14="http://schemas.microsoft.com/office/powerpoint/2010/main" val="502639494"/>
+      </p:ext>
+    </p:extLst>
+  </p:cSld>
+  <p:clrMapOvr>
+    <a:masterClrMapping/>
+  </p:clrMapOvr>
+</p:sld>
+</file>
+
 <file path=ppt/theme/theme1.xml><?xml version="1.0" encoding="utf-8"?>
 <a:theme xmlns:a="http://schemas.openxmlformats.org/drawingml/2006/main" name="Office Theme">
   <a:themeElements>

</xml_diff>